<commit_message>
3.5. 2019 úprava prezentácie aj neuronovej siete
</commit_message>
<xml_diff>
--- a/Kysucky_prezentacia.pptx
+++ b/Kysucky_prezentacia.pptx
@@ -5,7 +5,7 @@
     <p:sldMasterId id="2147483690" r:id="rId1"/>
   </p:sldMasterIdLst>
   <p:notesMasterIdLst>
-    <p:notesMasterId r:id="rId17"/>
+    <p:notesMasterId r:id="rId18"/>
   </p:notesMasterIdLst>
   <p:sldIdLst>
     <p:sldId id="256" r:id="rId2"/>
@@ -19,10 +19,11 @@
     <p:sldId id="269" r:id="rId10"/>
     <p:sldId id="274" r:id="rId11"/>
     <p:sldId id="271" r:id="rId12"/>
-    <p:sldId id="272" r:id="rId13"/>
-    <p:sldId id="273" r:id="rId14"/>
-    <p:sldId id="264" r:id="rId15"/>
-    <p:sldId id="263" r:id="rId16"/>
+    <p:sldId id="275" r:id="rId13"/>
+    <p:sldId id="272" r:id="rId14"/>
+    <p:sldId id="273" r:id="rId15"/>
+    <p:sldId id="264" r:id="rId16"/>
+    <p:sldId id="263" r:id="rId17"/>
   </p:sldIdLst>
   <p:sldSz cx="12192000" cy="6858000"/>
   <p:notesSz cx="6858000" cy="9144000"/>
@@ -211,7 +212,7 @@
           <a:p>
             <a:fld id="{46A8F120-1D0A-4458-9AE0-951F6CA5DC5F}" type="datetimeFigureOut">
               <a:rPr lang="sk-SK" smtClean="0"/>
-              <a:t>22. 4. 2019</a:t>
+              <a:t>3. 5. 2019</a:t>
             </a:fld>
             <a:endParaRPr lang="sk-SK"/>
           </a:p>
@@ -554,6 +555,90 @@
     <p:extLst>
       <p:ext uri="{BB962C8B-B14F-4D97-AF65-F5344CB8AC3E}">
         <p14:creationId xmlns:p14="http://schemas.microsoft.com/office/powerpoint/2010/main" val="965166463"/>
+      </p:ext>
+    </p:extLst>
+  </p:cSld>
+  <p:clrMapOvr>
+    <a:masterClrMapping/>
+  </p:clrMapOvr>
+</p:notes>
+</file>
+
+<file path=ppt/notesSlides/notesSlide2.xml><?xml version="1.0" encoding="utf-8"?>
+<p:notes xmlns:a="http://schemas.openxmlformats.org/drawingml/2006/main" xmlns:r="http://schemas.openxmlformats.org/officeDocument/2006/relationships" xmlns:p="http://schemas.openxmlformats.org/presentationml/2006/main">
+  <p:cSld>
+    <p:spTree>
+      <p:nvGrpSpPr>
+        <p:cNvPr id="1" name=""/>
+        <p:cNvGrpSpPr/>
+        <p:nvPr/>
+      </p:nvGrpSpPr>
+      <p:grpSpPr>
+        <a:xfrm>
+          <a:off x="0" y="0"/>
+          <a:ext cx="0" cy="0"/>
+          <a:chOff x="0" y="0"/>
+          <a:chExt cx="0" cy="0"/>
+        </a:xfrm>
+      </p:grpSpPr>
+      <p:sp>
+        <p:nvSpPr>
+          <p:cNvPr id="2" name="Zástupný symbol obrazu snímky 1"/>
+          <p:cNvSpPr>
+            <a:spLocks noGrp="1" noRot="1" noChangeAspect="1"/>
+          </p:cNvSpPr>
+          <p:nvPr>
+            <p:ph type="sldImg"/>
+          </p:nvPr>
+        </p:nvSpPr>
+        <p:spPr/>
+      </p:sp>
+      <p:sp>
+        <p:nvSpPr>
+          <p:cNvPr id="3" name="Zástupný symbol poznámok 2"/>
+          <p:cNvSpPr>
+            <a:spLocks noGrp="1"/>
+          </p:cNvSpPr>
+          <p:nvPr>
+            <p:ph type="body" idx="1"/>
+          </p:nvPr>
+        </p:nvSpPr>
+        <p:spPr/>
+        <p:txBody>
+          <a:bodyPr/>
+          <a:lstStyle/>
+          <a:p>
+            <a:endParaRPr lang="sk-SK" dirty="0"/>
+          </a:p>
+        </p:txBody>
+      </p:sp>
+      <p:sp>
+        <p:nvSpPr>
+          <p:cNvPr id="4" name="Zástupný symbol čísla snímky 3"/>
+          <p:cNvSpPr>
+            <a:spLocks noGrp="1"/>
+          </p:cNvSpPr>
+          <p:nvPr>
+            <p:ph type="sldNum" sz="quarter" idx="10"/>
+          </p:nvPr>
+        </p:nvSpPr>
+        <p:spPr/>
+        <p:txBody>
+          <a:bodyPr/>
+          <a:lstStyle/>
+          <a:p>
+            <a:fld id="{4FC03B4A-B7B1-49D7-B27D-E3631D99B103}" type="slidenum">
+              <a:rPr lang="sk-SK" smtClean="0"/>
+              <a:t>15</a:t>
+            </a:fld>
+            <a:endParaRPr lang="sk-SK"/>
+          </a:p>
+        </p:txBody>
+      </p:sp>
+    </p:spTree>
+    <p:extLst>
+      <p:ext uri="{BB962C8B-B14F-4D97-AF65-F5344CB8AC3E}">
+        <p14:creationId xmlns:p14="http://schemas.microsoft.com/office/powerpoint/2010/main" val="200287786"/>
       </p:ext>
     </p:extLst>
   </p:cSld>
@@ -894,7 +979,7 @@
           <a:p>
             <a:fld id="{8D947004-56A1-4DA2-BCFE-7FFBE302870C}" type="datetimeFigureOut">
               <a:rPr lang="sk-SK" smtClean="0"/>
-              <a:t>22. 4. 2019</a:t>
+              <a:t>3. 5. 2019</a:t>
             </a:fld>
             <a:endParaRPr lang="sk-SK" dirty="0"/>
           </a:p>
@@ -1218,7 +1303,7 @@
           <a:p>
             <a:fld id="{8D947004-56A1-4DA2-BCFE-7FFBE302870C}" type="datetimeFigureOut">
               <a:rPr lang="sk-SK" smtClean="0"/>
-              <a:t>22. 4. 2019</a:t>
+              <a:t>3. 5. 2019</a:t>
             </a:fld>
             <a:endParaRPr lang="sk-SK" dirty="0"/>
           </a:p>
@@ -1466,7 +1551,7 @@
           <a:p>
             <a:fld id="{8D947004-56A1-4DA2-BCFE-7FFBE302870C}" type="datetimeFigureOut">
               <a:rPr lang="sk-SK" smtClean="0"/>
-              <a:t>22. 4. 2019</a:t>
+              <a:t>3. 5. 2019</a:t>
             </a:fld>
             <a:endParaRPr lang="sk-SK" dirty="0"/>
           </a:p>
@@ -1805,7 +1890,7 @@
           <a:p>
             <a:fld id="{8D947004-56A1-4DA2-BCFE-7FFBE302870C}" type="datetimeFigureOut">
               <a:rPr lang="sk-SK" smtClean="0"/>
-              <a:t>22. 4. 2019</a:t>
+              <a:t>3. 5. 2019</a:t>
             </a:fld>
             <a:endParaRPr lang="sk-SK" dirty="0"/>
           </a:p>
@@ -2152,7 +2237,7 @@
           <a:p>
             <a:fld id="{8D947004-56A1-4DA2-BCFE-7FFBE302870C}" type="datetimeFigureOut">
               <a:rPr lang="sk-SK" smtClean="0"/>
-              <a:t>22. 4. 2019</a:t>
+              <a:t>3. 5. 2019</a:t>
             </a:fld>
             <a:endParaRPr lang="sk-SK" dirty="0"/>
           </a:p>
@@ -2526,7 +2611,7 @@
           <a:p>
             <a:fld id="{8D947004-56A1-4DA2-BCFE-7FFBE302870C}" type="datetimeFigureOut">
               <a:rPr lang="sk-SK" smtClean="0"/>
-              <a:t>22. 4. 2019</a:t>
+              <a:t>3. 5. 2019</a:t>
             </a:fld>
             <a:endParaRPr lang="sk-SK" dirty="0"/>
           </a:p>
@@ -2996,7 +3081,7 @@
           <a:p>
             <a:fld id="{8D947004-56A1-4DA2-BCFE-7FFBE302870C}" type="datetimeFigureOut">
               <a:rPr lang="sk-SK" smtClean="0"/>
-              <a:t>22. 4. 2019</a:t>
+              <a:t>3. 5. 2019</a:t>
             </a:fld>
             <a:endParaRPr lang="sk-SK" dirty="0"/>
           </a:p>
@@ -3201,7 +3286,7 @@
           <a:p>
             <a:fld id="{8D947004-56A1-4DA2-BCFE-7FFBE302870C}" type="datetimeFigureOut">
               <a:rPr lang="sk-SK" smtClean="0"/>
-              <a:t>22. 4. 2019</a:t>
+              <a:t>3. 5. 2019</a:t>
             </a:fld>
             <a:endParaRPr lang="sk-SK" dirty="0"/>
           </a:p>
@@ -3412,7 +3497,7 @@
           <a:p>
             <a:fld id="{8D947004-56A1-4DA2-BCFE-7FFBE302870C}" type="datetimeFigureOut">
               <a:rPr lang="sk-SK" smtClean="0"/>
-              <a:t>22. 4. 2019</a:t>
+              <a:t>3. 5. 2019</a:t>
             </a:fld>
             <a:endParaRPr lang="sk-SK" dirty="0"/>
           </a:p>
@@ -3644,7 +3729,7 @@
           <a:p>
             <a:fld id="{8D947004-56A1-4DA2-BCFE-7FFBE302870C}" type="datetimeFigureOut">
               <a:rPr lang="sk-SK" smtClean="0"/>
-              <a:t>22. 4. 2019</a:t>
+              <a:t>3. 5. 2019</a:t>
             </a:fld>
             <a:endParaRPr lang="sk-SK" dirty="0"/>
           </a:p>
@@ -3892,7 +3977,7 @@
           <a:p>
             <a:fld id="{8D947004-56A1-4DA2-BCFE-7FFBE302870C}" type="datetimeFigureOut">
               <a:rPr lang="sk-SK" smtClean="0"/>
-              <a:t>22. 4. 2019</a:t>
+              <a:t>3. 5. 2019</a:t>
             </a:fld>
             <a:endParaRPr lang="sk-SK" dirty="0"/>
           </a:p>
@@ -4190,7 +4275,7 @@
           <a:p>
             <a:fld id="{8D947004-56A1-4DA2-BCFE-7FFBE302870C}" type="datetimeFigureOut">
               <a:rPr lang="sk-SK" smtClean="0"/>
-              <a:t>22. 4. 2019</a:t>
+              <a:t>3. 5. 2019</a:t>
             </a:fld>
             <a:endParaRPr lang="sk-SK" dirty="0"/>
           </a:p>
@@ -4584,7 +4669,7 @@
           <a:p>
             <a:fld id="{8D947004-56A1-4DA2-BCFE-7FFBE302870C}" type="datetimeFigureOut">
               <a:rPr lang="sk-SK" smtClean="0"/>
-              <a:t>22. 4. 2019</a:t>
+              <a:t>3. 5. 2019</a:t>
             </a:fld>
             <a:endParaRPr lang="sk-SK" dirty="0"/>
           </a:p>
@@ -4733,7 +4818,7 @@
           <a:p>
             <a:fld id="{8D947004-56A1-4DA2-BCFE-7FFBE302870C}" type="datetimeFigureOut">
               <a:rPr lang="sk-SK" smtClean="0"/>
-              <a:t>22. 4. 2019</a:t>
+              <a:t>3. 5. 2019</a:t>
             </a:fld>
             <a:endParaRPr lang="sk-SK" dirty="0"/>
           </a:p>
@@ -4859,7 +4944,7 @@
           <a:p>
             <a:fld id="{8D947004-56A1-4DA2-BCFE-7FFBE302870C}" type="datetimeFigureOut">
               <a:rPr lang="sk-SK" smtClean="0"/>
-              <a:t>22. 4. 2019</a:t>
+              <a:t>3. 5. 2019</a:t>
             </a:fld>
             <a:endParaRPr lang="sk-SK" dirty="0"/>
           </a:p>
@@ -5114,7 +5199,7 @@
           <a:p>
             <a:fld id="{8D947004-56A1-4DA2-BCFE-7FFBE302870C}" type="datetimeFigureOut">
               <a:rPr lang="sk-SK" smtClean="0"/>
-              <a:t>22. 4. 2019</a:t>
+              <a:t>3. 5. 2019</a:t>
             </a:fld>
             <a:endParaRPr lang="sk-SK" dirty="0"/>
           </a:p>
@@ -5429,7 +5514,7 @@
           <a:p>
             <a:fld id="{8D947004-56A1-4DA2-BCFE-7FFBE302870C}" type="datetimeFigureOut">
               <a:rPr lang="sk-SK" smtClean="0"/>
-              <a:t>22. 4. 2019</a:t>
+              <a:t>3. 5. 2019</a:t>
             </a:fld>
             <a:endParaRPr lang="sk-SK" dirty="0"/>
           </a:p>
@@ -5780,7 +5865,7 @@
           <a:p>
             <a:fld id="{8D947004-56A1-4DA2-BCFE-7FFBE302870C}" type="datetimeFigureOut">
               <a:rPr lang="sk-SK" smtClean="0"/>
-              <a:t>22. 4. 2019</a:t>
+              <a:t>3. 5. 2019</a:t>
             </a:fld>
             <a:endParaRPr lang="sk-SK" dirty="0"/>
           </a:p>
@@ -6794,11 +6879,6 @@
               </a:rPr>
               <a:t>2</a:t>
             </a:r>
-            <a:endParaRPr lang="sk-SK" b="1" dirty="0">
-              <a:solidFill>
-                <a:srgbClr val="FF0000"/>
-              </a:solidFill>
-            </a:endParaRPr>
           </a:p>
         </p:txBody>
       </p:sp>
@@ -6983,14 +7063,121 @@
             <p:ph type="title"/>
           </p:nvPr>
         </p:nvSpPr>
+        <p:spPr>
+          <a:xfrm>
+            <a:off x="1076692" y="982132"/>
+            <a:ext cx="10268241" cy="1303867"/>
+          </a:xfrm>
+        </p:spPr>
+        <p:txBody>
+          <a:bodyPr>
+            <a:normAutofit fontScale="90000"/>
+          </a:bodyPr>
+          <a:lstStyle/>
+          <a:p>
+            <a:r>
+              <a:rPr lang="sk-SK" dirty="0" smtClean="0"/>
+              <a:t>Vzorce</a:t>
+            </a:r>
+            <a:r>
+              <a:rPr lang="en-US" dirty="0" smtClean="0"/>
+              <a:t> </a:t>
+            </a:r>
+            <a:r>
+              <a:rPr lang="sk-SK" dirty="0" smtClean="0"/>
+              <a:t>na</a:t>
+            </a:r>
+            <a:r>
+              <a:rPr lang="en-US" dirty="0" smtClean="0"/>
+              <a:t> v</a:t>
+            </a:r>
+            <a:r>
+              <a:rPr lang="sk-SK" dirty="0" smtClean="0"/>
+              <a:t>výpočet jednotlivých metód</a:t>
+            </a:r>
+            <a:r>
+              <a:rPr lang="en-US" dirty="0" smtClean="0"/>
+              <a:t> </a:t>
+            </a:r>
+            <a:r>
+              <a:rPr lang="sk-SK" dirty="0" smtClean="0"/>
+              <a:t>vo</a:t>
+            </a:r>
+            <a:r>
+              <a:rPr lang="en-US" dirty="0" smtClean="0"/>
+              <a:t> </a:t>
+            </a:r>
+            <a:r>
+              <a:rPr lang="sk-SK" dirty="0" smtClean="0"/>
+              <a:t>výstupe</a:t>
+            </a:r>
+            <a:endParaRPr lang="sk-SK" dirty="0"/>
+          </a:p>
+        </p:txBody>
+      </p:sp>
+      <p:sp>
+        <p:nvSpPr>
+          <p:cNvPr id="8" name="Zástupný symbol obsahu 7"/>
+          <p:cNvSpPr>
+            <a:spLocks noGrp="1"/>
+          </p:cNvSpPr>
+          <p:nvPr>
+            <p:ph idx="1"/>
+          </p:nvPr>
+        </p:nvSpPr>
         <p:spPr/>
         <p:txBody>
           <a:bodyPr/>
           <a:lstStyle/>
           <a:p>
             <a:r>
+              <a:rPr lang="sk-SK" dirty="0"/>
+              <a:t>Miera falošného objavovania (</a:t>
+            </a:r>
+            <a:r>
+              <a:rPr lang="sk-SK" dirty="0" err="1"/>
+              <a:t>FDR</a:t>
+            </a:r>
+            <a:r>
               <a:rPr lang="sk-SK" dirty="0" smtClean="0"/>
-              <a:t>Výstup z programu</a:t>
+              <a:t>)</a:t>
+            </a:r>
+            <a:endParaRPr lang="en-US" dirty="0" smtClean="0"/>
+          </a:p>
+          <a:p>
+            <a:r>
+              <a:rPr lang="sk-SK" dirty="0"/>
+              <a:t>Falošne negatívne hodnotenie (</a:t>
+            </a:r>
+            <a:r>
+              <a:rPr lang="sk-SK" dirty="0" err="1"/>
+              <a:t>FNR</a:t>
+            </a:r>
+            <a:r>
+              <a:rPr lang="sk-SK" dirty="0" smtClean="0"/>
+              <a:t>)</a:t>
+            </a:r>
+            <a:endParaRPr lang="en-US" dirty="0" smtClean="0"/>
+          </a:p>
+          <a:p>
+            <a:r>
+              <a:rPr lang="sk-SK" dirty="0"/>
+              <a:t>Špecifikácia alebo </a:t>
+            </a:r>
+            <a:r>
+              <a:rPr lang="sk-SK" dirty="0" err="1" smtClean="0"/>
+              <a:t>TNR</a:t>
+            </a:r>
+            <a:endParaRPr lang="en-US" dirty="0" smtClean="0"/>
+          </a:p>
+          <a:p>
+            <a:r>
+              <a:rPr lang="sk-SK" dirty="0"/>
+              <a:t>Citlivosť alebo </a:t>
+            </a:r>
+            <a:r>
+              <a:rPr lang="sk-SK" dirty="0" err="1"/>
+              <a:t>TPR</a:t>
             </a:r>
             <a:endParaRPr lang="sk-SK" dirty="0"/>
           </a:p>
@@ -6998,13 +7185,11 @@
       </p:sp>
       <p:pic>
         <p:nvPicPr>
-          <p:cNvPr id="4" name="Zástupný symbol obsahu 3"/>
+          <p:cNvPr id="9" name="Obrázok 8"/>
           <p:cNvPicPr>
-            <a:picLocks noGrp="1" noChangeAspect="1"/>
+            <a:picLocks noChangeAspect="1"/>
           </p:cNvPicPr>
-          <p:nvPr>
-            <p:ph idx="1"/>
-          </p:nvPr>
+          <p:nvPr/>
         </p:nvPicPr>
         <p:blipFill>
           <a:blip r:embed="rId2"/>
@@ -7014,8 +7199,8 @@
         </p:blipFill>
         <p:spPr>
           <a:xfrm>
-            <a:off x="7209572" y="3685962"/>
-            <a:ext cx="4199956" cy="2543341"/>
+            <a:off x="6095999" y="2556932"/>
+            <a:ext cx="2286000" cy="438150"/>
           </a:xfrm>
           <a:prstGeom prst="rect">
             <a:avLst/>
@@ -7024,7 +7209,7 @@
       </p:pic>
       <p:pic>
         <p:nvPicPr>
-          <p:cNvPr id="6" name="Obrázok 5"/>
+          <p:cNvPr id="10" name="Obrázok 9"/>
           <p:cNvPicPr>
             <a:picLocks noChangeAspect="1"/>
           </p:cNvPicPr>
@@ -7038,8 +7223,8 @@
         </p:blipFill>
         <p:spPr>
           <a:xfrm>
-            <a:off x="964868" y="2571537"/>
-            <a:ext cx="8515350" cy="1114425"/>
+            <a:off x="6095999" y="2995082"/>
+            <a:ext cx="2752725" cy="476250"/>
           </a:xfrm>
           <a:prstGeom prst="rect">
             <a:avLst/>
@@ -7048,7 +7233,7 @@
       </p:pic>
       <p:pic>
         <p:nvPicPr>
-          <p:cNvPr id="7" name="Obrázok 6"/>
+          <p:cNvPr id="12" name="Obrázok 11"/>
           <p:cNvPicPr>
             <a:picLocks noChangeAspect="1"/>
           </p:cNvPicPr>
@@ -7062,8 +7247,8 @@
         </p:blipFill>
         <p:spPr>
           <a:xfrm>
-            <a:off x="964868" y="3525115"/>
-            <a:ext cx="4629150" cy="2105025"/>
+            <a:off x="6095999" y="3536948"/>
+            <a:ext cx="2733675" cy="419100"/>
           </a:xfrm>
           <a:prstGeom prst="rect">
             <a:avLst/>
@@ -7072,7 +7257,7 @@
       </p:pic>
       <p:pic>
         <p:nvPicPr>
-          <p:cNvPr id="9" name="Obrázok 8"/>
+          <p:cNvPr id="13" name="Obrázok 12"/>
           <p:cNvPicPr>
             <a:picLocks noChangeAspect="1"/>
           </p:cNvPicPr>
@@ -7086,8 +7271,8 @@
         </p:blipFill>
         <p:spPr>
           <a:xfrm>
-            <a:off x="964868" y="5885691"/>
-            <a:ext cx="4010025" cy="304800"/>
+            <a:off x="6095998" y="4021664"/>
+            <a:ext cx="2733675" cy="457200"/>
           </a:xfrm>
           <a:prstGeom prst="rect">
             <a:avLst/>
@@ -7097,20 +7282,13 @@
     </p:spTree>
     <p:extLst>
       <p:ext uri="{BB962C8B-B14F-4D97-AF65-F5344CB8AC3E}">
-        <p14:creationId xmlns:p14="http://schemas.microsoft.com/office/powerpoint/2010/main" val="365760380"/>
+        <p14:creationId xmlns:p14="http://schemas.microsoft.com/office/powerpoint/2010/main" val="452084966"/>
       </p:ext>
     </p:extLst>
   </p:cSld>
   <p:clrMapOvr>
     <a:masterClrMapping/>
   </p:clrMapOvr>
-  <p:timing>
-    <p:tnLst>
-      <p:par>
-        <p:cTn id="1" dur="indefinite" restart="never" nodeType="tmRoot"/>
-      </p:par>
-    </p:tnLst>
-  </p:timing>
 </p:sld>
 </file>
 
@@ -7147,56 +7325,8 @@
           <a:lstStyle/>
           <a:p>
             <a:r>
-              <a:rPr lang="sk-SK" dirty="0" err="1" smtClean="0"/>
-              <a:t>Confusion</a:t>
-            </a:r>
-            <a:r>
               <a:rPr lang="sk-SK" dirty="0" smtClean="0"/>
-              <a:t> </a:t>
-            </a:r>
-            <a:r>
-              <a:rPr lang="sk-SK" dirty="0" err="1" smtClean="0"/>
-              <a:t>Matrix</a:t>
-            </a:r>
-            <a:endParaRPr lang="sk-SK" dirty="0"/>
-          </a:p>
-        </p:txBody>
-      </p:sp>
-      <p:sp>
-        <p:nvSpPr>
-          <p:cNvPr id="5" name="Zástupný symbol obsahu 4"/>
-          <p:cNvSpPr>
-            <a:spLocks noGrp="1"/>
-          </p:cNvSpPr>
-          <p:nvPr>
-            <p:ph idx="1"/>
-          </p:nvPr>
-        </p:nvSpPr>
-        <p:spPr>
-          <a:xfrm>
-            <a:off x="985912" y="3539064"/>
-            <a:ext cx="9601196" cy="3318936"/>
-          </a:xfrm>
-        </p:spPr>
-        <p:txBody>
-          <a:bodyPr/>
-          <a:lstStyle/>
-          <a:p>
-            <a:r>
-              <a:rPr lang="sk-SK" dirty="0" smtClean="0"/>
-              <a:t>Tiež zvaná chybová matica</a:t>
-            </a:r>
-          </a:p>
-          <a:p>
-            <a:r>
-              <a:rPr lang="sk-SK" dirty="0" smtClean="0"/>
-              <a:t>Graf pre znázornenie presnosti</a:t>
-            </a:r>
-          </a:p>
-          <a:p>
-            <a:r>
-              <a:rPr lang="sk-SK" dirty="0" smtClean="0"/>
-              <a:t>Farebná interpretácia hodnôt </a:t>
+              <a:t>Výstup z programu</a:t>
             </a:r>
             <a:endParaRPr lang="sk-SK" dirty="0"/>
           </a:p>
@@ -7218,27 +7348,17 @@
         </p:blipFill>
         <p:spPr>
           <a:xfrm>
-            <a:off x="6095999" y="2728036"/>
-            <a:ext cx="4666198" cy="3147832"/>
+            <a:off x="964868" y="2571537"/>
+            <a:ext cx="8515350" cy="1114425"/>
           </a:xfrm>
           <a:prstGeom prst="rect">
             <a:avLst/>
           </a:prstGeom>
-          <a:ln>
-            <a:noFill/>
-          </a:ln>
-          <a:effectLst>
-            <a:outerShdw blurRad="292100" dist="139700" dir="2700000" algn="tl" rotWithShape="0">
-              <a:srgbClr val="333333">
-                <a:alpha val="65000"/>
-              </a:srgbClr>
-            </a:outerShdw>
-          </a:effectLst>
         </p:spPr>
       </p:pic>
       <p:pic>
         <p:nvPicPr>
-          <p:cNvPr id="3" name="Obrázok 2"/>
+          <p:cNvPr id="9" name="Obrázok 8"/>
           <p:cNvPicPr>
             <a:picLocks noChangeAspect="1"/>
           </p:cNvPicPr>
@@ -7252,8 +7372,56 @@
         </p:blipFill>
         <p:spPr>
           <a:xfrm>
-            <a:off x="1295402" y="2445806"/>
-            <a:ext cx="3257550" cy="933450"/>
+            <a:off x="964868" y="5885691"/>
+            <a:ext cx="4010025" cy="304800"/>
+          </a:xfrm>
+          <a:prstGeom prst="rect">
+            <a:avLst/>
+          </a:prstGeom>
+        </p:spPr>
+      </p:pic>
+      <p:pic>
+        <p:nvPicPr>
+          <p:cNvPr id="3" name="Obrázok 2"/>
+          <p:cNvPicPr>
+            <a:picLocks noChangeAspect="1"/>
+          </p:cNvPicPr>
+          <p:nvPr/>
+        </p:nvPicPr>
+        <p:blipFill>
+          <a:blip r:embed="rId4"/>
+          <a:stretch>
+            <a:fillRect/>
+          </a:stretch>
+        </p:blipFill>
+        <p:spPr>
+          <a:xfrm>
+            <a:off x="752695" y="3573745"/>
+            <a:ext cx="5172075" cy="1514475"/>
+          </a:xfrm>
+          <a:prstGeom prst="rect">
+            <a:avLst/>
+          </a:prstGeom>
+        </p:spPr>
+      </p:pic>
+      <p:pic>
+        <p:nvPicPr>
+          <p:cNvPr id="8" name="Obrázok 7"/>
+          <p:cNvPicPr>
+            <a:picLocks noChangeAspect="1"/>
+          </p:cNvPicPr>
+          <p:nvPr/>
+        </p:nvPicPr>
+        <p:blipFill>
+          <a:blip r:embed="rId5"/>
+          <a:stretch>
+            <a:fillRect/>
+          </a:stretch>
+        </p:blipFill>
+        <p:spPr>
+          <a:xfrm>
+            <a:off x="6181722" y="3611876"/>
+            <a:ext cx="4714875" cy="2466975"/>
           </a:xfrm>
           <a:prstGeom prst="rect">
             <a:avLst/>
@@ -7263,7 +7431,7 @@
     </p:spTree>
     <p:extLst>
       <p:ext uri="{BB962C8B-B14F-4D97-AF65-F5344CB8AC3E}">
-        <p14:creationId xmlns:p14="http://schemas.microsoft.com/office/powerpoint/2010/main" val="1319470410"/>
+        <p14:creationId xmlns:p14="http://schemas.microsoft.com/office/powerpoint/2010/main" val="365760380"/>
       </p:ext>
     </p:extLst>
   </p:cSld>
@@ -7313,6 +7481,172 @@
           <a:lstStyle/>
           <a:p>
             <a:r>
+              <a:rPr lang="sk-SK" dirty="0" err="1" smtClean="0"/>
+              <a:t>Confusion</a:t>
+            </a:r>
+            <a:r>
+              <a:rPr lang="sk-SK" dirty="0" smtClean="0"/>
+              <a:t> </a:t>
+            </a:r>
+            <a:r>
+              <a:rPr lang="sk-SK" dirty="0" err="1" smtClean="0"/>
+              <a:t>Matrix</a:t>
+            </a:r>
+            <a:endParaRPr lang="sk-SK" dirty="0"/>
+          </a:p>
+        </p:txBody>
+      </p:sp>
+      <p:sp>
+        <p:nvSpPr>
+          <p:cNvPr id="5" name="Zástupný symbol obsahu 4"/>
+          <p:cNvSpPr>
+            <a:spLocks noGrp="1"/>
+          </p:cNvSpPr>
+          <p:nvPr>
+            <p:ph idx="1"/>
+          </p:nvPr>
+        </p:nvSpPr>
+        <p:spPr>
+          <a:xfrm>
+            <a:off x="985912" y="3539064"/>
+            <a:ext cx="9601196" cy="3318936"/>
+          </a:xfrm>
+        </p:spPr>
+        <p:txBody>
+          <a:bodyPr/>
+          <a:lstStyle/>
+          <a:p>
+            <a:r>
+              <a:rPr lang="sk-SK" dirty="0" smtClean="0"/>
+              <a:t>Tiež zvaná chybová matica</a:t>
+            </a:r>
+          </a:p>
+          <a:p>
+            <a:r>
+              <a:rPr lang="sk-SK" dirty="0" smtClean="0"/>
+              <a:t>Graf pre znázornenie presnosti</a:t>
+            </a:r>
+          </a:p>
+          <a:p>
+            <a:r>
+              <a:rPr lang="sk-SK" dirty="0" smtClean="0"/>
+              <a:t>Farebná interpretácia hodnôt </a:t>
+            </a:r>
+            <a:endParaRPr lang="sk-SK" dirty="0"/>
+          </a:p>
+        </p:txBody>
+      </p:sp>
+      <p:pic>
+        <p:nvPicPr>
+          <p:cNvPr id="6" name="Obrázok 5"/>
+          <p:cNvPicPr>
+            <a:picLocks noChangeAspect="1"/>
+          </p:cNvPicPr>
+          <p:nvPr/>
+        </p:nvPicPr>
+        <p:blipFill>
+          <a:blip r:embed="rId2"/>
+          <a:stretch>
+            <a:fillRect/>
+          </a:stretch>
+        </p:blipFill>
+        <p:spPr>
+          <a:xfrm>
+            <a:off x="6095999" y="2728036"/>
+            <a:ext cx="4666198" cy="3147832"/>
+          </a:xfrm>
+          <a:prstGeom prst="rect">
+            <a:avLst/>
+          </a:prstGeom>
+          <a:ln>
+            <a:noFill/>
+          </a:ln>
+          <a:effectLst>
+            <a:outerShdw blurRad="292100" dist="139700" dir="2700000" algn="tl" rotWithShape="0">
+              <a:srgbClr val="333333">
+                <a:alpha val="65000"/>
+              </a:srgbClr>
+            </a:outerShdw>
+          </a:effectLst>
+        </p:spPr>
+      </p:pic>
+      <p:pic>
+        <p:nvPicPr>
+          <p:cNvPr id="3" name="Obrázok 2"/>
+          <p:cNvPicPr>
+            <a:picLocks noChangeAspect="1"/>
+          </p:cNvPicPr>
+          <p:nvPr/>
+        </p:nvPicPr>
+        <p:blipFill>
+          <a:blip r:embed="rId3"/>
+          <a:stretch>
+            <a:fillRect/>
+          </a:stretch>
+        </p:blipFill>
+        <p:spPr>
+          <a:xfrm>
+            <a:off x="1295402" y="2445806"/>
+            <a:ext cx="3257550" cy="933450"/>
+          </a:xfrm>
+          <a:prstGeom prst="rect">
+            <a:avLst/>
+          </a:prstGeom>
+        </p:spPr>
+      </p:pic>
+    </p:spTree>
+    <p:extLst>
+      <p:ext uri="{BB962C8B-B14F-4D97-AF65-F5344CB8AC3E}">
+        <p14:creationId xmlns:p14="http://schemas.microsoft.com/office/powerpoint/2010/main" val="1319470410"/>
+      </p:ext>
+    </p:extLst>
+  </p:cSld>
+  <p:clrMapOvr>
+    <a:masterClrMapping/>
+  </p:clrMapOvr>
+  <p:timing>
+    <p:tnLst>
+      <p:par>
+        <p:cTn id="1" dur="indefinite" restart="never" nodeType="tmRoot"/>
+      </p:par>
+    </p:tnLst>
+  </p:timing>
+</p:sld>
+</file>
+
+<file path=ppt/slides/slide15.xml><?xml version="1.0" encoding="utf-8"?>
+<p:sld xmlns:a="http://schemas.openxmlformats.org/drawingml/2006/main" xmlns:r="http://schemas.openxmlformats.org/officeDocument/2006/relationships" xmlns:p="http://schemas.openxmlformats.org/presentationml/2006/main">
+  <p:cSld>
+    <p:spTree>
+      <p:nvGrpSpPr>
+        <p:cNvPr id="1" name=""/>
+        <p:cNvGrpSpPr/>
+        <p:nvPr/>
+      </p:nvGrpSpPr>
+      <p:grpSpPr>
+        <a:xfrm>
+          <a:off x="0" y="0"/>
+          <a:ext cx="0" cy="0"/>
+          <a:chOff x="0" y="0"/>
+          <a:chExt cx="0" cy="0"/>
+        </a:xfrm>
+      </p:grpSpPr>
+      <p:sp>
+        <p:nvSpPr>
+          <p:cNvPr id="2" name="Nadpis 1"/>
+          <p:cNvSpPr>
+            <a:spLocks noGrp="1"/>
+          </p:cNvSpPr>
+          <p:nvPr>
+            <p:ph type="title"/>
+          </p:nvPr>
+        </p:nvSpPr>
+        <p:spPr/>
+        <p:txBody>
+          <a:bodyPr/>
+          <a:lstStyle/>
+          <a:p>
+            <a:r>
               <a:rPr lang="sk-SK" dirty="0" smtClean="0"/>
               <a:t>Použité zdroje</a:t>
             </a:r>
@@ -7333,24 +7667,9 @@
         <p:spPr/>
         <p:txBody>
           <a:bodyPr>
-            <a:normAutofit fontScale="92500" lnSpcReduction="10000"/>
+            <a:normAutofit fontScale="70000" lnSpcReduction="20000"/>
           </a:bodyPr>
           <a:lstStyle/>
-          <a:p>
-            <a:r>
-              <a:rPr lang="sk-SK" dirty="0">
-                <a:hlinkClick r:id="rId2"/>
-              </a:rPr>
-              <a:t>https://</a:t>
-            </a:r>
-            <a:r>
-              <a:rPr lang="sk-SK" dirty="0" smtClean="0">
-                <a:hlinkClick r:id="rId2"/>
-              </a:rPr>
-              <a:t>www.researchgate.net/publication/224163164_Breast_Cancer_diagnosis_using_Artificial_Neural_Network_models</a:t>
-            </a:r>
-            <a:endParaRPr lang="sk-SK" dirty="0" smtClean="0"/>
-          </a:p>
           <a:p>
             <a:r>
               <a:rPr lang="sk-SK" dirty="0">
@@ -7362,7 +7681,7 @@
               <a:rPr lang="sk-SK" dirty="0" smtClean="0">
                 <a:hlinkClick r:id="rId3"/>
               </a:rPr>
-              <a:t>github.com/bhavaniprasad73/Artificial-Neural-Network/blob/master/ANN.py</a:t>
+              <a:t>www.researchgate.net/publication/224163164_Breast_Cancer_diagnosis_using_Artificial_Neural_Network_models</a:t>
             </a:r>
             <a:endParaRPr lang="sk-SK" dirty="0" smtClean="0"/>
           </a:p>
@@ -7377,7 +7696,7 @@
               <a:rPr lang="sk-SK" dirty="0" smtClean="0">
                 <a:hlinkClick r:id="rId4"/>
               </a:rPr>
-              <a:t>www.kaggle.com/uciml/breast-cancer-wisconsin-data/home</a:t>
+              <a:t>github.com/bhavaniprasad73/Artificial-Neural-Network/blob/master/ANN.py</a:t>
             </a:r>
             <a:endParaRPr lang="sk-SK" dirty="0" smtClean="0"/>
           </a:p>
@@ -7392,24 +7711,90 @@
               <a:rPr lang="sk-SK" dirty="0" smtClean="0">
                 <a:hlinkClick r:id="rId5"/>
               </a:rPr>
-              <a:t>arxiv.org/pdf/1711.07831.pdf</a:t>
+              <a:t>www.kaggle.com/uciml/breast-cancer-wisconsin-data/home</a:t>
             </a:r>
             <a:endParaRPr lang="sk-SK" dirty="0" smtClean="0"/>
           </a:p>
           <a:p>
             <a:r>
               <a:rPr lang="sk-SK" dirty="0">
-                <a:hlinkClick r:id="rId2"/>
+                <a:hlinkClick r:id="rId6"/>
               </a:rPr>
               <a:t>https://</a:t>
             </a:r>
             <a:r>
               <a:rPr lang="sk-SK" dirty="0" smtClean="0">
-                <a:hlinkClick r:id="rId2"/>
+                <a:hlinkClick r:id="rId6"/>
+              </a:rPr>
+              <a:t>arxiv.org/pdf/1711.07831.pdf</a:t>
+            </a:r>
+            <a:endParaRPr lang="sk-SK" dirty="0" smtClean="0"/>
+          </a:p>
+          <a:p>
+            <a:r>
+              <a:rPr lang="sk-SK" dirty="0">
+                <a:hlinkClick r:id="rId3"/>
+              </a:rPr>
+              <a:t>https://</a:t>
+            </a:r>
+            <a:r>
+              <a:rPr lang="sk-SK" dirty="0" smtClean="0">
+                <a:hlinkClick r:id="rId3"/>
               </a:rPr>
               <a:t>www.researchgate.net/publication/224163164_Breast_Cancer_diagnosis_using_Artificial_Neural_Network_models</a:t>
             </a:r>
             <a:endParaRPr lang="sk-SK" dirty="0" smtClean="0"/>
+          </a:p>
+          <a:p>
+            <a:r>
+              <a:rPr lang="sk-SK" dirty="0">
+                <a:hlinkClick r:id="rId7"/>
+              </a:rPr>
+              <a:t>http://ics.upjs.sk/~</a:t>
+            </a:r>
+            <a:r>
+              <a:rPr lang="sk-SK" dirty="0" smtClean="0">
+                <a:hlinkClick r:id="rId7"/>
+              </a:rPr>
+              <a:t>andrejkova/vyucba/PIV/PIV15_05.pdf</a:t>
+            </a:r>
+            <a:endParaRPr lang="en-US" dirty="0" smtClean="0"/>
+          </a:p>
+          <a:p>
+            <a:r>
+              <a:rPr lang="sk-SK" dirty="0">
+                <a:hlinkClick r:id="rId8"/>
+              </a:rPr>
+              <a:t>https://</a:t>
+            </a:r>
+            <a:r>
+              <a:rPr lang="sk-SK" dirty="0" smtClean="0">
+                <a:hlinkClick r:id="rId8"/>
+              </a:rPr>
+              <a:t>github.com/bhavaniprasad73/Artificial-Neural-Network/blob/master/Final%20report.pdf</a:t>
+            </a:r>
+            <a:endParaRPr lang="sk-SK" dirty="0" smtClean="0"/>
+          </a:p>
+          <a:p>
+            <a:r>
+              <a:rPr lang="sk-SK" dirty="0">
+                <a:hlinkClick r:id="rId9"/>
+              </a:rPr>
+              <a:t>https://</a:t>
+            </a:r>
+            <a:r>
+              <a:rPr lang="sk-SK" dirty="0" smtClean="0">
+                <a:hlinkClick r:id="rId9"/>
+              </a:rPr>
+              <a:t>en.wikipedia.org/wiki/Sensitivity_and_specificity</a:t>
+            </a:r>
+            <a:endParaRPr lang="en-US" dirty="0" smtClean="0"/>
+          </a:p>
+          <a:p>
+            <a:endParaRPr lang="sk-SK" dirty="0"/>
+          </a:p>
+          <a:p>
+            <a:endParaRPr lang="en-US" dirty="0" smtClean="0"/>
           </a:p>
           <a:p>
             <a:endParaRPr lang="sk-SK" dirty="0" smtClean="0"/>
@@ -7442,7 +7827,7 @@
 </p:sld>
 </file>
 
-<file path=ppt/slides/slide15.xml><?xml version="1.0" encoding="utf-8"?>
+<file path=ppt/slides/slide16.xml><?xml version="1.0" encoding="utf-8"?>
 <p:sld xmlns:a="http://schemas.openxmlformats.org/drawingml/2006/main" xmlns:r="http://schemas.openxmlformats.org/officeDocument/2006/relationships" xmlns:p="http://schemas.openxmlformats.org/presentationml/2006/main">
   <p:cSld>
     <p:spTree>
@@ -7587,11 +7972,7 @@
             </a:r>
             <a:r>
               <a:rPr lang="sk-SK" dirty="0" smtClean="0"/>
-              <a:t> určiť pravdepodobnosť výskytu rakoviny </a:t>
-            </a:r>
-            <a:r>
-              <a:rPr lang="sk-SK" dirty="0" smtClean="0"/>
-              <a:t>prsníka</a:t>
+              <a:t> určiť pravdepodobnosť výskytu rakoviny prsníka</a:t>
             </a:r>
           </a:p>
           <a:p>
@@ -7631,7 +8012,6 @@
               <a:rPr lang="sk-SK" dirty="0" smtClean="0"/>
               <a:t>. </a:t>
             </a:r>
-            <a:endParaRPr lang="sk-SK" dirty="0" smtClean="0"/>
           </a:p>
           <a:p>
             <a:r>
@@ -7653,8 +8033,12 @@
               <a:t> v</a:t>
             </a:r>
             <a:r>
+              <a:rPr lang="sk-SK" dirty="0" err="1" smtClean="0"/>
+              <a:t>ýsledkov</a:t>
+            </a:r>
+            <a:r>
               <a:rPr lang="sk-SK" dirty="0" smtClean="0"/>
-              <a:t>výsledkov </a:t>
+              <a:t> </a:t>
             </a:r>
           </a:p>
           <a:p>
@@ -7718,19 +8102,7 @@
           <a:p>
             <a:r>
               <a:rPr lang="sk-SK" dirty="0" smtClean="0"/>
-              <a:t>Rakovina </a:t>
-            </a:r>
-            <a:r>
-              <a:rPr lang="sk-SK" dirty="0" smtClean="0"/>
-              <a:t>prsníka a umelé </a:t>
-            </a:r>
-            <a:r>
-              <a:rPr lang="sk-SK" dirty="0" smtClean="0"/>
-              <a:t>neurónové </a:t>
-            </a:r>
-            <a:r>
-              <a:rPr lang="sk-SK" dirty="0" smtClean="0"/>
-              <a:t>siete</a:t>
+              <a:t>Rakovina prsníka a umelé neurónové siete</a:t>
             </a:r>
             <a:br>
               <a:rPr lang="sk-SK" dirty="0" smtClean="0"/>
@@ -7753,7 +8125,12 @@
             <p:ph idx="1"/>
           </p:nvPr>
         </p:nvSpPr>
-        <p:spPr/>
+        <p:spPr>
+          <a:xfrm>
+            <a:off x="1295402" y="2447750"/>
+            <a:ext cx="9601196" cy="3318936"/>
+          </a:xfrm>
+        </p:spPr>
         <p:txBody>
           <a:bodyPr/>
           <a:lstStyle/>
@@ -7802,12 +8179,52 @@
             </a:r>
             <a:r>
               <a:rPr lang="sk-SK" dirty="0" smtClean="0"/>
-              <a:t>rozšírené.</a:t>
-            </a:r>
-            <a:endParaRPr lang="en-US" dirty="0" smtClean="0"/>
-          </a:p>
-        </p:txBody>
-      </p:sp>
+              <a:t>rozšírené</a:t>
+            </a:r>
+            <a:r>
+              <a:rPr lang="sk-SK" dirty="0" smtClean="0"/>
+              <a:t>.</a:t>
+            </a:r>
+          </a:p>
+        </p:txBody>
+      </p:sp>
+      <p:pic>
+        <p:nvPicPr>
+          <p:cNvPr id="4" name="Zástupný symbol obsahu 3"/>
+          <p:cNvPicPr>
+            <a:picLocks noChangeAspect="1"/>
+          </p:cNvPicPr>
+          <p:nvPr/>
+        </p:nvPicPr>
+        <p:blipFill>
+          <a:blip r:embed="rId2"/>
+          <a:stretch>
+            <a:fillRect/>
+          </a:stretch>
+        </p:blipFill>
+        <p:spPr>
+          <a:xfrm>
+            <a:off x="4902486" y="4107218"/>
+            <a:ext cx="4858603" cy="1889900"/>
+          </a:xfrm>
+          <a:prstGeom prst="roundRect">
+            <a:avLst>
+              <a:gd name="adj" fmla="val 8594"/>
+            </a:avLst>
+          </a:prstGeom>
+          <a:solidFill>
+            <a:srgbClr val="FFFFFF">
+              <a:shade val="85000"/>
+            </a:srgbClr>
+          </a:solidFill>
+          <a:ln>
+            <a:noFill/>
+          </a:ln>
+          <a:effectLst>
+            <a:reflection blurRad="12700" stA="38000" endPos="28000" dist="5000" dir="5400000" sy="-100000" algn="bl" rotWithShape="0"/>
+          </a:effectLst>
+        </p:spPr>
+      </p:pic>
     </p:spTree>
     <p:extLst>
       <p:ext uri="{BB962C8B-B14F-4D97-AF65-F5344CB8AC3E}">
@@ -7855,7 +8272,12 @@
             <p:ph type="title"/>
           </p:nvPr>
         </p:nvSpPr>
-        <p:spPr/>
+        <p:spPr>
+          <a:xfrm>
+            <a:off x="1295402" y="718815"/>
+            <a:ext cx="9601196" cy="1303867"/>
+          </a:xfrm>
+        </p:spPr>
         <p:txBody>
           <a:bodyPr/>
           <a:lstStyle/>
@@ -7880,8 +8302,8 @@
         </p:nvSpPr>
         <p:spPr>
           <a:xfrm>
-            <a:off x="1295401" y="2101755"/>
-            <a:ext cx="9601196" cy="4053385"/>
+            <a:off x="802446" y="2419644"/>
+            <a:ext cx="10587108" cy="3713893"/>
           </a:xfrm>
         </p:spPr>
         <p:txBody>
@@ -7925,6 +8347,7 @@
               <a:rPr lang="sk-SK" dirty="0" smtClean="0"/>
               <a:t>.</a:t>
             </a:r>
+            <a:endParaRPr lang="sk-SK" dirty="0" smtClean="0"/>
           </a:p>
           <a:p>
             <a:r>
@@ -7945,11 +8368,7 @@
             </a:r>
             <a:r>
               <a:rPr lang="sk-SK" dirty="0" smtClean="0"/>
-              <a:t>(zhubný</a:t>
-            </a:r>
-            <a:r>
-              <a:rPr lang="sk-SK" dirty="0" smtClean="0"/>
-              <a:t>) </a:t>
+              <a:t>(zhubný) </a:t>
             </a:r>
             <a:r>
               <a:rPr lang="sk-SK" dirty="0"/>
@@ -7959,7 +8378,6 @@
               <a:rPr lang="sk-SK" dirty="0" smtClean="0"/>
               <a:t>(nezhubný).</a:t>
             </a:r>
-            <a:endParaRPr lang="sk-SK" dirty="0" smtClean="0"/>
           </a:p>
         </p:txBody>
       </p:sp>
@@ -7971,29 +8389,31 @@
           </p:cNvPicPr>
           <p:nvPr/>
         </p:nvPicPr>
-        <p:blipFill>
+        <p:blipFill rotWithShape="1">
           <a:blip r:embed="rId3"/>
-          <a:stretch>
-            <a:fillRect/>
-          </a:stretch>
+          <a:srcRect r="3333"/>
+          <a:stretch/>
         </p:blipFill>
         <p:spPr>
           <a:xfrm>
-            <a:off x="6206564" y="4379542"/>
-            <a:ext cx="4344206" cy="1736242"/>
-          </a:xfrm>
-          <a:prstGeom prst="rect">
-            <a:avLst/>
+            <a:off x="4557932" y="4608103"/>
+            <a:ext cx="6654019" cy="1525434"/>
+          </a:xfrm>
+          <a:prstGeom prst="roundRect">
+            <a:avLst>
+              <a:gd name="adj" fmla="val 8594"/>
+            </a:avLst>
           </a:prstGeom>
+          <a:solidFill>
+            <a:srgbClr val="FFFFFF">
+              <a:shade val="85000"/>
+            </a:srgbClr>
+          </a:solidFill>
           <a:ln>
             <a:noFill/>
           </a:ln>
           <a:effectLst>
-            <a:outerShdw blurRad="292100" dist="139700" dir="2700000" algn="tl" rotWithShape="0">
-              <a:srgbClr val="333333">
-                <a:alpha val="65000"/>
-              </a:srgbClr>
-            </a:outerShdw>
+            <a:reflection blurRad="12700" stA="38000" endPos="28000" dist="5000" dir="5400000" sy="-100000" algn="bl" rotWithShape="0"/>
           </a:effectLst>
         </p:spPr>
       </p:pic>
@@ -8051,33 +8471,269 @@
           <a:p>
             <a:r>
               <a:rPr lang="sk-SK" dirty="0" smtClean="0"/>
-              <a:t>Princíp </a:t>
+              <a:t>Princíp fungovania našej </a:t>
             </a:r>
             <a:r>
               <a:rPr lang="sk-SK" dirty="0" smtClean="0"/>
-              <a:t>fungovania </a:t>
-            </a:r>
+              <a:t>neurónovej siete</a:t>
+            </a:r>
+            <a:endParaRPr lang="sk-SK" dirty="0"/>
+          </a:p>
+        </p:txBody>
+      </p:sp>
+      <p:sp>
+        <p:nvSpPr>
+          <p:cNvPr id="7" name="Title 1">
+            <a:extLst>
+              <a:ext uri="{FF2B5EF4-FFF2-40B4-BE49-F238E27FC236}">
+                <a16:creationId xmlns:a16="http://schemas.microsoft.com/office/drawing/2014/main" xmlns="" id="{463A027C-73C1-4981-9828-05E25E0A63F0}"/>
+              </a:ext>
+            </a:extLst>
+          </p:cNvPr>
+          <p:cNvSpPr txBox="1">
+            <a:spLocks/>
+          </p:cNvSpPr>
+          <p:nvPr/>
+        </p:nvSpPr>
+        <p:spPr>
+          <a:xfrm>
+            <a:off x="892074" y="2395181"/>
+            <a:ext cx="8370930" cy="3932775"/>
+          </a:xfrm>
+          <a:prstGeom prst="rect">
+            <a:avLst/>
+          </a:prstGeom>
+          <a:effectLst/>
+        </p:spPr>
+        <p:txBody>
+          <a:bodyPr vert="horz" lIns="91440" tIns="45720" rIns="91440" bIns="45720" rtlCol="0" anchor="ctr">
+            <a:normAutofit fontScale="62500" lnSpcReduction="20000"/>
+          </a:bodyPr>
+          <a:lstStyle>
+            <a:lvl1pPr algn="ctr" defTabSz="457200" rtl="0" eaLnBrk="1" latinLnBrk="0" hangingPunct="1">
+              <a:spcBef>
+                <a:spcPct val="0"/>
+              </a:spcBef>
+              <a:buNone/>
+              <a:defRPr sz="4400" kern="1200" cap="none">
+                <a:ln w="3175" cmpd="sng">
+                  <a:noFill/>
+                </a:ln>
+                <a:solidFill>
+                  <a:schemeClr val="tx1">
+                    <a:lumMod val="85000"/>
+                    <a:lumOff val="15000"/>
+                  </a:schemeClr>
+                </a:solidFill>
+                <a:effectLst/>
+                <a:latin typeface="+mj-lt"/>
+                <a:ea typeface="+mj-ea"/>
+                <a:cs typeface="+mj-cs"/>
+              </a:defRPr>
+            </a:lvl1pPr>
+            <a:lvl2pPr eaLnBrk="1" hangingPunct="1">
+              <a:defRPr>
+                <a:solidFill>
+                  <a:schemeClr val="tx2"/>
+                </a:solidFill>
+              </a:defRPr>
+            </a:lvl2pPr>
+            <a:lvl3pPr eaLnBrk="1" hangingPunct="1">
+              <a:defRPr>
+                <a:solidFill>
+                  <a:schemeClr val="tx2"/>
+                </a:solidFill>
+              </a:defRPr>
+            </a:lvl3pPr>
+            <a:lvl4pPr eaLnBrk="1" hangingPunct="1">
+              <a:defRPr>
+                <a:solidFill>
+                  <a:schemeClr val="tx2"/>
+                </a:solidFill>
+              </a:defRPr>
+            </a:lvl4pPr>
+            <a:lvl5pPr eaLnBrk="1" hangingPunct="1">
+              <a:defRPr>
+                <a:solidFill>
+                  <a:schemeClr val="tx2"/>
+                </a:solidFill>
+              </a:defRPr>
+            </a:lvl5pPr>
+            <a:lvl6pPr eaLnBrk="1" hangingPunct="1">
+              <a:defRPr>
+                <a:solidFill>
+                  <a:schemeClr val="tx2"/>
+                </a:solidFill>
+              </a:defRPr>
+            </a:lvl6pPr>
+            <a:lvl7pPr eaLnBrk="1" hangingPunct="1">
+              <a:defRPr>
+                <a:solidFill>
+                  <a:schemeClr val="tx2"/>
+                </a:solidFill>
+              </a:defRPr>
+            </a:lvl7pPr>
+            <a:lvl8pPr eaLnBrk="1" hangingPunct="1">
+              <a:defRPr>
+                <a:solidFill>
+                  <a:schemeClr val="tx2"/>
+                </a:solidFill>
+              </a:defRPr>
+            </a:lvl8pPr>
+            <a:lvl9pPr eaLnBrk="1" hangingPunct="1">
+              <a:defRPr>
+                <a:solidFill>
+                  <a:schemeClr val="tx2"/>
+                </a:solidFill>
+              </a:defRPr>
+            </a:lvl9pPr>
+          </a:lstStyle>
+          <a:p>
+            <a:pPr algn="l"/>
+            <a:r>
+              <a:rPr lang="en-US" dirty="0" smtClean="0"/>
+              <a:t/>
+            </a:r>
+            <a:br>
+              <a:rPr lang="en-US" dirty="0" smtClean="0"/>
+            </a:br>
             <a:r>
               <a:rPr lang="sk-SK" dirty="0" smtClean="0"/>
-              <a:t>neurónovej </a:t>
+              <a:t>Inicializácia </a:t>
             </a:r>
             <a:r>
               <a:rPr lang="sk-SK" dirty="0" smtClean="0"/>
-              <a:t>siete</a:t>
-            </a:r>
-            <a:endParaRPr lang="sk-SK" dirty="0"/>
+              <a:t>siet</a:t>
+            </a:r>
+            <a:r>
+              <a:rPr lang="en-US" dirty="0" smtClean="0"/>
+              <a:t>e</a:t>
+            </a:r>
+            <a:br>
+              <a:rPr lang="en-US" dirty="0" smtClean="0"/>
+            </a:br>
+            <a:r>
+              <a:rPr lang="en-US" dirty="0" smtClean="0"/>
+              <a:t>           </a:t>
+            </a:r>
+            <a:r>
+              <a:rPr lang="en-US" sz="2500" dirty="0" smtClean="0"/>
+              <a:t>a)  Data</a:t>
+            </a:r>
+            <a:br>
+              <a:rPr lang="en-US" sz="2500" dirty="0" smtClean="0"/>
+            </a:br>
+            <a:r>
+              <a:rPr lang="en-US" sz="2500" dirty="0" smtClean="0"/>
+              <a:t>                   b) </a:t>
+            </a:r>
+            <a:r>
+              <a:rPr lang="sk-SK" sz="2500" dirty="0" smtClean="0"/>
+              <a:t>Parametre</a:t>
+            </a:r>
+            <a:r>
+              <a:rPr lang="en-US" sz="2500" dirty="0" smtClean="0"/>
+              <a:t/>
+            </a:r>
+            <a:br>
+              <a:rPr lang="en-US" sz="2500" dirty="0" smtClean="0"/>
+            </a:br>
+            <a:r>
+              <a:rPr lang="en-US" sz="2500" dirty="0" smtClean="0"/>
+              <a:t>                   </a:t>
+            </a:r>
+            <a:r>
+              <a:rPr lang="sk-SK" sz="2500" dirty="0" smtClean="0"/>
+              <a:t>c</a:t>
+            </a:r>
+            <a:r>
+              <a:rPr lang="en-US" sz="2500" dirty="0" smtClean="0"/>
+              <a:t>) </a:t>
+            </a:r>
+            <a:r>
+              <a:rPr lang="sk-SK" sz="2500" dirty="0" smtClean="0"/>
+              <a:t>Váhy</a:t>
+            </a:r>
+            <a:r>
+              <a:rPr lang="en-US" sz="2500" dirty="0" smtClean="0"/>
+              <a:t/>
+            </a:r>
+            <a:br>
+              <a:rPr lang="en-US" sz="2500" dirty="0" smtClean="0"/>
+            </a:br>
+            <a:r>
+              <a:rPr lang="sk-SK" dirty="0" smtClean="0"/>
+              <a:t>Trénovanie</a:t>
+            </a:r>
+            <a:r>
+              <a:rPr lang="en-US" dirty="0" smtClean="0"/>
+              <a:t/>
+            </a:r>
+            <a:br>
+              <a:rPr lang="en-US" dirty="0" smtClean="0"/>
+            </a:br>
+            <a:r>
+              <a:rPr lang="en-US" dirty="0" smtClean="0"/>
+              <a:t>           </a:t>
+            </a:r>
+            <a:r>
+              <a:rPr lang="en-US" sz="2500" dirty="0" smtClean="0"/>
+              <a:t>a) Forward Propagation </a:t>
+            </a:r>
+            <a:br>
+              <a:rPr lang="en-US" sz="2500" dirty="0" smtClean="0"/>
+            </a:br>
+            <a:r>
+              <a:rPr lang="en-US" sz="2500" dirty="0" smtClean="0"/>
+              <a:t>                   b) Backward Propagation </a:t>
+            </a:r>
+            <a:br>
+              <a:rPr lang="en-US" sz="2500" dirty="0" smtClean="0"/>
+            </a:br>
+            <a:r>
+              <a:rPr lang="en-US" sz="2500" dirty="0" smtClean="0"/>
+              <a:t>                   c) </a:t>
+            </a:r>
+            <a:r>
+              <a:rPr lang="sk-SK" sz="2500" dirty="0" smtClean="0"/>
+              <a:t>Aktualizácia váh</a:t>
+            </a:r>
+            <a:r>
+              <a:rPr lang="en-US" dirty="0" smtClean="0"/>
+              <a:t/>
+            </a:r>
+            <a:br>
+              <a:rPr lang="en-US" dirty="0" smtClean="0"/>
+            </a:br>
+            <a:r>
+              <a:rPr lang="sk-SK" dirty="0" smtClean="0"/>
+              <a:t>Testovanie a vyhodnotenie</a:t>
+            </a:r>
+            <a:r>
+              <a:rPr lang="en-US" dirty="0" smtClean="0"/>
+              <a:t/>
+            </a:r>
+            <a:br>
+              <a:rPr lang="en-US" dirty="0" smtClean="0"/>
+            </a:br>
+            <a:r>
+              <a:rPr lang="en-US" dirty="0" smtClean="0"/>
+              <a:t/>
+            </a:r>
+            <a:br>
+              <a:rPr lang="en-US" dirty="0" smtClean="0"/>
+            </a:br>
+            <a:endParaRPr lang="en-US" dirty="0"/>
           </a:p>
         </p:txBody>
       </p:sp>
       <p:pic>
         <p:nvPicPr>
-          <p:cNvPr id="4" name="Zástupný symbol obsahu 3"/>
+          <p:cNvPr id="9" name="Obrázok 8"/>
           <p:cNvPicPr>
-            <a:picLocks noGrp="1" noChangeAspect="1"/>
+            <a:picLocks noChangeAspect="1"/>
           </p:cNvPicPr>
-          <p:nvPr>
-            <p:ph idx="1"/>
-          </p:nvPr>
+          <p:nvPr/>
         </p:nvPicPr>
         <p:blipFill>
           <a:blip r:embed="rId2"/>
@@ -8087,123 +8743,14 @@
         </p:blipFill>
         <p:spPr>
           <a:xfrm>
-            <a:off x="5585292" y="2488561"/>
-            <a:ext cx="5311306" cy="2758688"/>
+            <a:off x="5153080" y="2695788"/>
+            <a:ext cx="4513251" cy="2654134"/>
           </a:xfrm>
           <a:prstGeom prst="rect">
             <a:avLst/>
           </a:prstGeom>
         </p:spPr>
       </p:pic>
-      <p:sp>
-        <p:nvSpPr>
-          <p:cNvPr id="5" name="BlokTextu 4"/>
-          <p:cNvSpPr txBox="1"/>
-          <p:nvPr/>
-        </p:nvSpPr>
-        <p:spPr>
-          <a:xfrm>
-            <a:off x="1172991" y="2814588"/>
-            <a:ext cx="4162863" cy="2308324"/>
-          </a:xfrm>
-          <a:prstGeom prst="rect">
-            <a:avLst/>
-          </a:prstGeom>
-          <a:noFill/>
-        </p:spPr>
-        <p:txBody>
-          <a:bodyPr wrap="square" rtlCol="0">
-            <a:spAutoFit/>
-          </a:bodyPr>
-          <a:lstStyle/>
-          <a:p>
-            <a:r>
-              <a:rPr lang="sk-SK" sz="2400" dirty="0" smtClean="0"/>
-              <a:t>1. </a:t>
-            </a:r>
-            <a:r>
-              <a:rPr lang="sk-SK" sz="2400" dirty="0" smtClean="0"/>
-              <a:t>Viacvrstvový </a:t>
-            </a:r>
-            <a:r>
-              <a:rPr lang="sk-SK" sz="2400" dirty="0" err="1" smtClean="0"/>
-              <a:t>perceptron</a:t>
-            </a:r>
-            <a:r>
-              <a:rPr lang="sk-SK" sz="2400" dirty="0"/>
-              <a:t/>
-            </a:r>
-            <a:br>
-              <a:rPr lang="sk-SK" sz="2400" dirty="0"/>
-            </a:br>
-            <a:r>
-              <a:rPr lang="sk-SK" sz="2400" dirty="0"/>
-              <a:t>2. Forward </a:t>
-            </a:r>
-            <a:r>
-              <a:rPr lang="sk-SK" sz="2400" dirty="0" err="1"/>
-              <a:t>Propagation</a:t>
-            </a:r>
-            <a:r>
-              <a:rPr lang="sk-SK" sz="2400" dirty="0"/>
-              <a:t/>
-            </a:r>
-            <a:br>
-              <a:rPr lang="sk-SK" sz="2400" dirty="0"/>
-            </a:br>
-            <a:r>
-              <a:rPr lang="sk-SK" sz="2400" dirty="0"/>
-              <a:t>3. </a:t>
-            </a:r>
-            <a:r>
-              <a:rPr lang="sk-SK" sz="2400" dirty="0" err="1"/>
-              <a:t>Back</a:t>
-            </a:r>
-            <a:r>
-              <a:rPr lang="sk-SK" sz="2400" dirty="0"/>
-              <a:t> </a:t>
-            </a:r>
-            <a:r>
-              <a:rPr lang="sk-SK" sz="2400" dirty="0" err="1"/>
-              <a:t>Propagation</a:t>
-            </a:r>
-            <a:r>
-              <a:rPr lang="sk-SK" sz="2400" dirty="0"/>
-              <a:t/>
-            </a:r>
-            <a:br>
-              <a:rPr lang="sk-SK" sz="2400" dirty="0"/>
-            </a:br>
-            <a:r>
-              <a:rPr lang="sk-SK" sz="2400" dirty="0"/>
-              <a:t>4. </a:t>
-            </a:r>
-            <a:r>
-              <a:rPr lang="sk-SK" sz="2400" dirty="0" smtClean="0"/>
-              <a:t>Aktualizácia váhy</a:t>
-            </a:r>
-            <a:r>
-              <a:rPr lang="sk-SK" sz="2400" dirty="0"/>
-              <a:t/>
-            </a:r>
-            <a:br>
-              <a:rPr lang="sk-SK" sz="2400" dirty="0"/>
-            </a:br>
-            <a:r>
-              <a:rPr lang="sk-SK" sz="2400" dirty="0"/>
-              <a:t>5. Testovanie a </a:t>
-            </a:r>
-            <a:r>
-              <a:rPr lang="sk-SK" sz="2400" dirty="0" smtClean="0"/>
-              <a:t>vyhodnotenie</a:t>
-            </a:r>
-            <a:endParaRPr lang="sk-SK" sz="2400" dirty="0"/>
-          </a:p>
-          <a:p>
-            <a:endParaRPr lang="sk-SK" sz="2400" dirty="0"/>
-          </a:p>
-        </p:txBody>
-      </p:sp>
     </p:spTree>
     <p:extLst>
       <p:ext uri="{BB962C8B-B14F-4D97-AF65-F5344CB8AC3E}">
@@ -8313,23 +8860,18 @@
             </a:r>
             <a:r>
               <a:rPr lang="sk-SK" dirty="0" smtClean="0"/>
-              <a:t>funkciu. Hodnoty </a:t>
+              <a:t>funkciu. </a:t>
+            </a:r>
+          </a:p>
+          <a:p>
+            <a:r>
+              <a:rPr lang="sk-SK" dirty="0" smtClean="0"/>
+              <a:t>Výpočty </a:t>
             </a:r>
             <a:r>
               <a:rPr lang="sk-SK" dirty="0"/>
-              <a:t>budú vstupom pre ďalšiu vrstvu a potom sa vynásobia nasledujúcimi váhami vrstvy</a:t>
-            </a:r>
-            <a:r>
-              <a:rPr lang="sk-SK" dirty="0" smtClean="0"/>
-              <a:t>.</a:t>
-            </a:r>
-          </a:p>
-          <a:p>
-            <a:r>
-              <a:rPr lang="sk-SK" dirty="0"/>
-              <a:t>Výpočty sa vykonali takto:</a:t>
-            </a:r>
-            <a:endParaRPr lang="sk-SK" dirty="0"/>
+              <a:t>sa vykonali takto:</a:t>
+            </a:r>
           </a:p>
         </p:txBody>
       </p:sp>
@@ -8349,7 +8891,7 @@
         </p:blipFill>
         <p:spPr>
           <a:xfrm>
-            <a:off x="1456742" y="4216400"/>
+            <a:off x="1628557" y="3973521"/>
             <a:ext cx="2364631" cy="1902347"/>
           </a:xfrm>
           <a:prstGeom prst="rect">
@@ -8367,8 +8909,8 @@
         </p:nvSpPr>
         <p:spPr>
           <a:xfrm>
-            <a:off x="4954138" y="3803429"/>
-            <a:ext cx="6545236" cy="2343372"/>
+            <a:off x="5431809" y="3626874"/>
+            <a:ext cx="6545236" cy="1730379"/>
           </a:xfrm>
           <a:prstGeom prst="rect">
             <a:avLst/>
@@ -8376,7 +8918,7 @@
         </p:spPr>
         <p:txBody>
           <a:bodyPr vert="horz" lIns="91440" tIns="45720" rIns="91440" bIns="45720" rtlCol="0" anchor="t">
-            <a:normAutofit/>
+            <a:normAutofit fontScale="85000" lnSpcReduction="20000"/>
           </a:bodyPr>
           <a:lstStyle>
             <a:lvl1pPr marL="285750" indent="-285750" algn="l" defTabSz="457200" rtl="0" eaLnBrk="1" latinLnBrk="0" hangingPunct="1">
@@ -8789,11 +9331,7 @@
             </a:r>
             <a:r>
               <a:rPr lang="sk-SK" dirty="0" smtClean="0"/>
-              <a:t> funkcia</a:t>
-            </a:r>
-            <a:r>
-              <a:rPr lang="sk-SK" dirty="0" smtClean="0"/>
-              <a:t>.</a:t>
+              <a:t> funkcia.</a:t>
             </a:r>
           </a:p>
           <a:p>
@@ -8877,11 +9415,7 @@
           <a:p>
             <a:r>
               <a:rPr lang="sk-SK" dirty="0" smtClean="0"/>
-              <a:t>vracia </a:t>
-            </a:r>
-            <a:r>
-              <a:rPr lang="sk-SK" dirty="0" smtClean="0"/>
-              <a:t>0, alebo 1</a:t>
+              <a:t>vracia 0, alebo 1</a:t>
             </a:r>
             <a:endParaRPr lang="sk-SK" dirty="0"/>
           </a:p>
@@ -9346,11 +9880,6 @@
               </a:rPr>
               <a:t>2</a:t>
             </a:r>
-            <a:endParaRPr lang="sk-SK" b="1" dirty="0">
-              <a:solidFill>
-                <a:srgbClr val="FF0000"/>
-              </a:solidFill>
-            </a:endParaRPr>
           </a:p>
         </p:txBody>
       </p:sp>
@@ -9470,11 +9999,6 @@
               </a:rPr>
               <a:t>4</a:t>
             </a:r>
-            <a:endParaRPr lang="sk-SK" b="1" dirty="0">
-              <a:solidFill>
-                <a:srgbClr val="FF0000"/>
-              </a:solidFill>
-            </a:endParaRPr>
           </a:p>
         </p:txBody>
       </p:sp>
@@ -9570,11 +10094,6 @@
               </a:rPr>
               <a:t>6</a:t>
             </a:r>
-            <a:endParaRPr lang="sk-SK" b="1" dirty="0">
-              <a:solidFill>
-                <a:srgbClr val="FF0000"/>
-              </a:solidFill>
-            </a:endParaRPr>
           </a:p>
         </p:txBody>
       </p:sp>
@@ -9632,11 +10151,6 @@
               </a:rPr>
               <a:t>7</a:t>
             </a:r>
-            <a:endParaRPr lang="sk-SK" b="1" dirty="0">
-              <a:solidFill>
-                <a:srgbClr val="FF0000"/>
-              </a:solidFill>
-            </a:endParaRPr>
           </a:p>
         </p:txBody>
       </p:sp>

</xml_diff>

<commit_message>
Upravená prezentácia, a projekt v pythone, doplnení popis k výkladu o Perceptrone
</commit_message>
<xml_diff>
--- a/Kysucky_prezentacia.pptx
+++ b/Kysucky_prezentacia.pptx
@@ -5,25 +5,23 @@
     <p:sldMasterId id="2147483690" r:id="rId1"/>
   </p:sldMasterIdLst>
   <p:notesMasterIdLst>
-    <p:notesMasterId r:id="rId18"/>
+    <p:notesMasterId r:id="rId16"/>
   </p:notesMasterIdLst>
   <p:sldIdLst>
     <p:sldId id="256" r:id="rId2"/>
     <p:sldId id="257" r:id="rId3"/>
-    <p:sldId id="266" r:id="rId4"/>
-    <p:sldId id="258" r:id="rId5"/>
-    <p:sldId id="267" r:id="rId6"/>
-    <p:sldId id="270" r:id="rId7"/>
-    <p:sldId id="265" r:id="rId8"/>
-    <p:sldId id="268" r:id="rId9"/>
-    <p:sldId id="269" r:id="rId10"/>
-    <p:sldId id="274" r:id="rId11"/>
-    <p:sldId id="271" r:id="rId12"/>
+    <p:sldId id="258" r:id="rId4"/>
+    <p:sldId id="267" r:id="rId5"/>
+    <p:sldId id="270" r:id="rId6"/>
+    <p:sldId id="265" r:id="rId7"/>
+    <p:sldId id="268" r:id="rId8"/>
+    <p:sldId id="269" r:id="rId9"/>
+    <p:sldId id="274" r:id="rId10"/>
+    <p:sldId id="271" r:id="rId11"/>
+    <p:sldId id="272" r:id="rId12"/>
     <p:sldId id="275" r:id="rId13"/>
-    <p:sldId id="272" r:id="rId14"/>
-    <p:sldId id="273" r:id="rId15"/>
-    <p:sldId id="264" r:id="rId16"/>
-    <p:sldId id="263" r:id="rId17"/>
+    <p:sldId id="264" r:id="rId14"/>
+    <p:sldId id="263" r:id="rId15"/>
   </p:sldIdLst>
   <p:sldSz cx="12192000" cy="6858000"/>
   <p:notesSz cx="6858000" cy="9144000"/>
@@ -212,7 +210,7 @@
           <a:p>
             <a:fld id="{46A8F120-1D0A-4458-9AE0-951F6CA5DC5F}" type="datetimeFigureOut">
               <a:rPr lang="sk-SK" smtClean="0"/>
-              <a:t>3. 5. 2019</a:t>
+              <a:t>10. 5. 2019</a:t>
             </a:fld>
             <a:endParaRPr lang="sk-SK"/>
           </a:p>
@@ -545,7 +543,7 @@
           <a:p>
             <a:fld id="{4FC03B4A-B7B1-49D7-B27D-E3631D99B103}" type="slidenum">
               <a:rPr lang="sk-SK" smtClean="0"/>
-              <a:t>4</a:t>
+              <a:t>3</a:t>
             </a:fld>
             <a:endParaRPr lang="sk-SK"/>
           </a:p>
@@ -629,7 +627,7 @@
           <a:p>
             <a:fld id="{4FC03B4A-B7B1-49D7-B27D-E3631D99B103}" type="slidenum">
               <a:rPr lang="sk-SK" smtClean="0"/>
-              <a:t>15</a:t>
+              <a:t>13</a:t>
             </a:fld>
             <a:endParaRPr lang="sk-SK"/>
           </a:p>
@@ -979,7 +977,7 @@
           <a:p>
             <a:fld id="{8D947004-56A1-4DA2-BCFE-7FFBE302870C}" type="datetimeFigureOut">
               <a:rPr lang="sk-SK" smtClean="0"/>
-              <a:t>3. 5. 2019</a:t>
+              <a:t>10. 5. 2019</a:t>
             </a:fld>
             <a:endParaRPr lang="sk-SK" dirty="0"/>
           </a:p>
@@ -1077,6 +1075,14 @@
   <p:clrMapOvr>
     <a:masterClrMapping/>
   </p:clrMapOvr>
+  <mc:AlternateContent xmlns:mc="http://schemas.openxmlformats.org/markup-compatibility/2006" xmlns:p14="http://schemas.microsoft.com/office/powerpoint/2010/main">
+    <mc:Choice Requires="p14">
+      <p:transition p14:dur="0"/>
+    </mc:Choice>
+    <mc:Fallback xmlns="">
+      <p:transition/>
+    </mc:Fallback>
+  </mc:AlternateContent>
 </p:sldLayout>
 </file>
 
@@ -1303,7 +1309,7 @@
           <a:p>
             <a:fld id="{8D947004-56A1-4DA2-BCFE-7FFBE302870C}" type="datetimeFigureOut">
               <a:rPr lang="sk-SK" smtClean="0"/>
-              <a:t>3. 5. 2019</a:t>
+              <a:t>10. 5. 2019</a:t>
             </a:fld>
             <a:endParaRPr lang="sk-SK" dirty="0"/>
           </a:p>
@@ -1361,6 +1367,14 @@
   <p:clrMapOvr>
     <a:masterClrMapping/>
   </p:clrMapOvr>
+  <mc:AlternateContent xmlns:mc="http://schemas.openxmlformats.org/markup-compatibility/2006" xmlns:p14="http://schemas.microsoft.com/office/powerpoint/2010/main">
+    <mc:Choice Requires="p14">
+      <p:transition p14:dur="0"/>
+    </mc:Choice>
+    <mc:Fallback xmlns="">
+      <p:transition/>
+    </mc:Fallback>
+  </mc:AlternateContent>
 </p:sldLayout>
 </file>
 
@@ -1551,7 +1565,7 @@
           <a:p>
             <a:fld id="{8D947004-56A1-4DA2-BCFE-7FFBE302870C}" type="datetimeFigureOut">
               <a:rPr lang="sk-SK" smtClean="0"/>
-              <a:t>3. 5. 2019</a:t>
+              <a:t>10. 5. 2019</a:t>
             </a:fld>
             <a:endParaRPr lang="sk-SK" dirty="0"/>
           </a:p>
@@ -1640,6 +1654,14 @@
   <p:clrMapOvr>
     <a:masterClrMapping/>
   </p:clrMapOvr>
+  <mc:AlternateContent xmlns:mc="http://schemas.openxmlformats.org/markup-compatibility/2006" xmlns:p14="http://schemas.microsoft.com/office/powerpoint/2010/main">
+    <mc:Choice Requires="p14">
+      <p:transition p14:dur="0"/>
+    </mc:Choice>
+    <mc:Fallback xmlns="">
+      <p:transition/>
+    </mc:Fallback>
+  </mc:AlternateContent>
 </p:sldLayout>
 </file>
 
@@ -1890,7 +1912,7 @@
           <a:p>
             <a:fld id="{8D947004-56A1-4DA2-BCFE-7FFBE302870C}" type="datetimeFigureOut">
               <a:rPr lang="sk-SK" smtClean="0"/>
-              <a:t>3. 5. 2019</a:t>
+              <a:t>10. 5. 2019</a:t>
             </a:fld>
             <a:endParaRPr lang="sk-SK" dirty="0"/>
           </a:p>
@@ -2047,6 +2069,14 @@
   <p:clrMapOvr>
     <a:masterClrMapping/>
   </p:clrMapOvr>
+  <mc:AlternateContent xmlns:mc="http://schemas.openxmlformats.org/markup-compatibility/2006" xmlns:p14="http://schemas.microsoft.com/office/powerpoint/2010/main">
+    <mc:Choice Requires="p14">
+      <p:transition p14:dur="0"/>
+    </mc:Choice>
+    <mc:Fallback xmlns="">
+      <p:transition/>
+    </mc:Fallback>
+  </mc:AlternateContent>
 </p:sldLayout>
 </file>
 
@@ -2237,7 +2267,7 @@
           <a:p>
             <a:fld id="{8D947004-56A1-4DA2-BCFE-7FFBE302870C}" type="datetimeFigureOut">
               <a:rPr lang="sk-SK" smtClean="0"/>
-              <a:t>3. 5. 2019</a:t>
+              <a:t>10. 5. 2019</a:t>
             </a:fld>
             <a:endParaRPr lang="sk-SK" dirty="0"/>
           </a:p>
@@ -2295,6 +2325,14 @@
   <p:clrMapOvr>
     <a:masterClrMapping/>
   </p:clrMapOvr>
+  <mc:AlternateContent xmlns:mc="http://schemas.openxmlformats.org/markup-compatibility/2006" xmlns:p14="http://schemas.microsoft.com/office/powerpoint/2010/main">
+    <mc:Choice Requires="p14">
+      <p:transition p14:dur="0"/>
+    </mc:Choice>
+    <mc:Fallback xmlns="">
+      <p:transition/>
+    </mc:Fallback>
+  </mc:AlternateContent>
 </p:sldLayout>
 </file>
 
@@ -2611,7 +2649,7 @@
           <a:p>
             <a:fld id="{8D947004-56A1-4DA2-BCFE-7FFBE302870C}" type="datetimeFigureOut">
               <a:rPr lang="sk-SK" smtClean="0"/>
-              <a:t>3. 5. 2019</a:t>
+              <a:t>10. 5. 2019</a:t>
             </a:fld>
             <a:endParaRPr lang="sk-SK" dirty="0"/>
           </a:p>
@@ -2768,6 +2806,14 @@
   <p:clrMapOvr>
     <a:masterClrMapping/>
   </p:clrMapOvr>
+  <mc:AlternateContent xmlns:mc="http://schemas.openxmlformats.org/markup-compatibility/2006" xmlns:p14="http://schemas.microsoft.com/office/powerpoint/2010/main">
+    <mc:Choice Requires="p14">
+      <p:transition p14:dur="0"/>
+    </mc:Choice>
+    <mc:Fallback xmlns="">
+      <p:transition/>
+    </mc:Fallback>
+  </mc:AlternateContent>
 </p:sldLayout>
 </file>
 
@@ -3081,7 +3127,7 @@
           <a:p>
             <a:fld id="{8D947004-56A1-4DA2-BCFE-7FFBE302870C}" type="datetimeFigureOut">
               <a:rPr lang="sk-SK" smtClean="0"/>
-              <a:t>3. 5. 2019</a:t>
+              <a:t>10. 5. 2019</a:t>
             </a:fld>
             <a:endParaRPr lang="sk-SK" dirty="0"/>
           </a:p>
@@ -3170,6 +3216,14 @@
   <p:clrMapOvr>
     <a:masterClrMapping/>
   </p:clrMapOvr>
+  <mc:AlternateContent xmlns:mc="http://schemas.openxmlformats.org/markup-compatibility/2006" xmlns:p14="http://schemas.microsoft.com/office/powerpoint/2010/main">
+    <mc:Choice Requires="p14">
+      <p:transition p14:dur="0"/>
+    </mc:Choice>
+    <mc:Fallback xmlns="">
+      <p:transition/>
+    </mc:Fallback>
+  </mc:AlternateContent>
 </p:sldLayout>
 </file>
 
@@ -3286,7 +3340,7 @@
           <a:p>
             <a:fld id="{8D947004-56A1-4DA2-BCFE-7FFBE302870C}" type="datetimeFigureOut">
               <a:rPr lang="sk-SK" smtClean="0"/>
-              <a:t>3. 5. 2019</a:t>
+              <a:t>10. 5. 2019</a:t>
             </a:fld>
             <a:endParaRPr lang="sk-SK" dirty="0"/>
           </a:p>
@@ -3375,6 +3429,14 @@
   <p:clrMapOvr>
     <a:masterClrMapping/>
   </p:clrMapOvr>
+  <mc:AlternateContent xmlns:mc="http://schemas.openxmlformats.org/markup-compatibility/2006" xmlns:p14="http://schemas.microsoft.com/office/powerpoint/2010/main">
+    <mc:Choice Requires="p14">
+      <p:transition p14:dur="0"/>
+    </mc:Choice>
+    <mc:Fallback xmlns="">
+      <p:transition/>
+    </mc:Fallback>
+  </mc:AlternateContent>
 </p:sldLayout>
 </file>
 
@@ -3497,7 +3559,7 @@
           <a:p>
             <a:fld id="{8D947004-56A1-4DA2-BCFE-7FFBE302870C}" type="datetimeFigureOut">
               <a:rPr lang="sk-SK" smtClean="0"/>
-              <a:t>3. 5. 2019</a:t>
+              <a:t>10. 5. 2019</a:t>
             </a:fld>
             <a:endParaRPr lang="sk-SK" dirty="0"/>
           </a:p>
@@ -3586,6 +3648,14 @@
   <p:clrMapOvr>
     <a:masterClrMapping/>
   </p:clrMapOvr>
+  <mc:AlternateContent xmlns:mc="http://schemas.openxmlformats.org/markup-compatibility/2006" xmlns:p14="http://schemas.microsoft.com/office/powerpoint/2010/main">
+    <mc:Choice Requires="p14">
+      <p:transition p14:dur="0"/>
+    </mc:Choice>
+    <mc:Fallback xmlns="">
+      <p:transition/>
+    </mc:Fallback>
+  </mc:AlternateContent>
 </p:sldLayout>
 </file>
 
@@ -3729,7 +3799,7 @@
           <a:p>
             <a:fld id="{8D947004-56A1-4DA2-BCFE-7FFBE302870C}" type="datetimeFigureOut">
               <a:rPr lang="sk-SK" smtClean="0"/>
-              <a:t>3. 5. 2019</a:t>
+              <a:t>10. 5. 2019</a:t>
             </a:fld>
             <a:endParaRPr lang="sk-SK" dirty="0"/>
           </a:p>
@@ -3787,6 +3857,14 @@
   <p:clrMapOvr>
     <a:masterClrMapping/>
   </p:clrMapOvr>
+  <mc:AlternateContent xmlns:mc="http://schemas.openxmlformats.org/markup-compatibility/2006" xmlns:p14="http://schemas.microsoft.com/office/powerpoint/2010/main">
+    <mc:Choice Requires="p14">
+      <p:transition p14:dur="0"/>
+    </mc:Choice>
+    <mc:Fallback xmlns="">
+      <p:transition/>
+    </mc:Fallback>
+  </mc:AlternateContent>
 </p:sldLayout>
 </file>
 
@@ -3977,7 +4055,7 @@
           <a:p>
             <a:fld id="{8D947004-56A1-4DA2-BCFE-7FFBE302870C}" type="datetimeFigureOut">
               <a:rPr lang="sk-SK" smtClean="0"/>
-              <a:t>3. 5. 2019</a:t>
+              <a:t>10. 5. 2019</a:t>
             </a:fld>
             <a:endParaRPr lang="sk-SK" dirty="0"/>
           </a:p>
@@ -4066,6 +4144,14 @@
   <p:clrMapOvr>
     <a:masterClrMapping/>
   </p:clrMapOvr>
+  <mc:AlternateContent xmlns:mc="http://schemas.openxmlformats.org/markup-compatibility/2006" xmlns:p14="http://schemas.microsoft.com/office/powerpoint/2010/main">
+    <mc:Choice Requires="p14">
+      <p:transition p14:dur="0"/>
+    </mc:Choice>
+    <mc:Fallback xmlns="">
+      <p:transition/>
+    </mc:Fallback>
+  </mc:AlternateContent>
 </p:sldLayout>
 </file>
 
@@ -4275,7 +4361,7 @@
           <a:p>
             <a:fld id="{8D947004-56A1-4DA2-BCFE-7FFBE302870C}" type="datetimeFigureOut">
               <a:rPr lang="sk-SK" smtClean="0"/>
-              <a:t>3. 5. 2019</a:t>
+              <a:t>10. 5. 2019</a:t>
             </a:fld>
             <a:endParaRPr lang="sk-SK" dirty="0"/>
           </a:p>
@@ -4333,6 +4419,14 @@
   <p:clrMapOvr>
     <a:masterClrMapping/>
   </p:clrMapOvr>
+  <mc:AlternateContent xmlns:mc="http://schemas.openxmlformats.org/markup-compatibility/2006" xmlns:p14="http://schemas.microsoft.com/office/powerpoint/2010/main">
+    <mc:Choice Requires="p14">
+      <p:transition p14:dur="0"/>
+    </mc:Choice>
+    <mc:Fallback xmlns="">
+      <p:transition/>
+    </mc:Fallback>
+  </mc:AlternateContent>
 </p:sldLayout>
 </file>
 
@@ -4669,7 +4763,7 @@
           <a:p>
             <a:fld id="{8D947004-56A1-4DA2-BCFE-7FFBE302870C}" type="datetimeFigureOut">
               <a:rPr lang="sk-SK" smtClean="0"/>
-              <a:t>3. 5. 2019</a:t>
+              <a:t>10. 5. 2019</a:t>
             </a:fld>
             <a:endParaRPr lang="sk-SK" dirty="0"/>
           </a:p>
@@ -4758,6 +4852,14 @@
   <p:clrMapOvr>
     <a:masterClrMapping/>
   </p:clrMapOvr>
+  <mc:AlternateContent xmlns:mc="http://schemas.openxmlformats.org/markup-compatibility/2006" xmlns:p14="http://schemas.microsoft.com/office/powerpoint/2010/main">
+    <mc:Choice Requires="p14">
+      <p:transition p14:dur="0"/>
+    </mc:Choice>
+    <mc:Fallback xmlns="">
+      <p:transition/>
+    </mc:Fallback>
+  </mc:AlternateContent>
 </p:sldLayout>
 </file>
 
@@ -4818,7 +4920,7 @@
           <a:p>
             <a:fld id="{8D947004-56A1-4DA2-BCFE-7FFBE302870C}" type="datetimeFigureOut">
               <a:rPr lang="sk-SK" smtClean="0"/>
-              <a:t>3. 5. 2019</a:t>
+              <a:t>10. 5. 2019</a:t>
             </a:fld>
             <a:endParaRPr lang="sk-SK" dirty="0"/>
           </a:p>
@@ -4907,6 +5009,14 @@
   <p:clrMapOvr>
     <a:masterClrMapping/>
   </p:clrMapOvr>
+  <mc:AlternateContent xmlns:mc="http://schemas.openxmlformats.org/markup-compatibility/2006" xmlns:p14="http://schemas.microsoft.com/office/powerpoint/2010/main">
+    <mc:Choice Requires="p14">
+      <p:transition p14:dur="0"/>
+    </mc:Choice>
+    <mc:Fallback xmlns="">
+      <p:transition/>
+    </mc:Fallback>
+  </mc:AlternateContent>
 </p:sldLayout>
 </file>
 
@@ -4944,7 +5054,7 @@
           <a:p>
             <a:fld id="{8D947004-56A1-4DA2-BCFE-7FFBE302870C}" type="datetimeFigureOut">
               <a:rPr lang="sk-SK" smtClean="0"/>
-              <a:t>3. 5. 2019</a:t>
+              <a:t>10. 5. 2019</a:t>
             </a:fld>
             <a:endParaRPr lang="sk-SK" dirty="0"/>
           </a:p>
@@ -5002,6 +5112,14 @@
   <p:clrMapOvr>
     <a:masterClrMapping/>
   </p:clrMapOvr>
+  <mc:AlternateContent xmlns:mc="http://schemas.openxmlformats.org/markup-compatibility/2006" xmlns:p14="http://schemas.microsoft.com/office/powerpoint/2010/main">
+    <mc:Choice Requires="p14">
+      <p:transition p14:dur="0"/>
+    </mc:Choice>
+    <mc:Fallback xmlns="">
+      <p:transition/>
+    </mc:Fallback>
+  </mc:AlternateContent>
 </p:sldLayout>
 </file>
 
@@ -5199,7 +5317,7 @@
           <a:p>
             <a:fld id="{8D947004-56A1-4DA2-BCFE-7FFBE302870C}" type="datetimeFigureOut">
               <a:rPr lang="sk-SK" smtClean="0"/>
-              <a:t>3. 5. 2019</a:t>
+              <a:t>10. 5. 2019</a:t>
             </a:fld>
             <a:endParaRPr lang="sk-SK" dirty="0"/>
           </a:p>
@@ -5288,6 +5406,14 @@
   <p:clrMapOvr>
     <a:masterClrMapping/>
   </p:clrMapOvr>
+  <mc:AlternateContent xmlns:mc="http://schemas.openxmlformats.org/markup-compatibility/2006" xmlns:p14="http://schemas.microsoft.com/office/powerpoint/2010/main">
+    <mc:Choice Requires="p14">
+      <p:transition p14:dur="0"/>
+    </mc:Choice>
+    <mc:Fallback xmlns="">
+      <p:transition/>
+    </mc:Fallback>
+  </mc:AlternateContent>
 </p:sldLayout>
 </file>
 
@@ -5514,7 +5640,7 @@
           <a:p>
             <a:fld id="{8D947004-56A1-4DA2-BCFE-7FFBE302870C}" type="datetimeFigureOut">
               <a:rPr lang="sk-SK" smtClean="0"/>
-              <a:t>3. 5. 2019</a:t>
+              <a:t>10. 5. 2019</a:t>
             </a:fld>
             <a:endParaRPr lang="sk-SK" dirty="0"/>
           </a:p>
@@ -5572,6 +5698,14 @@
   <p:clrMapOvr>
     <a:masterClrMapping/>
   </p:clrMapOvr>
+  <mc:AlternateContent xmlns:mc="http://schemas.openxmlformats.org/markup-compatibility/2006" xmlns:p14="http://schemas.microsoft.com/office/powerpoint/2010/main">
+    <mc:Choice Requires="p14">
+      <p:transition p14:dur="0"/>
+    </mc:Choice>
+    <mc:Fallback xmlns="">
+      <p:transition/>
+    </mc:Fallback>
+  </mc:AlternateContent>
 </p:sldLayout>
 </file>
 
@@ -5865,7 +5999,7 @@
           <a:p>
             <a:fld id="{8D947004-56A1-4DA2-BCFE-7FFBE302870C}" type="datetimeFigureOut">
               <a:rPr lang="sk-SK" smtClean="0"/>
-              <a:t>3. 5. 2019</a:t>
+              <a:t>10. 5. 2019</a:t>
             </a:fld>
             <a:endParaRPr lang="sk-SK" dirty="0"/>
           </a:p>
@@ -5976,6 +6110,14 @@
     <p:sldLayoutId id="2147483706" r:id="rId16"/>
     <p:sldLayoutId id="2147483707" r:id="rId17"/>
   </p:sldLayoutIdLst>
+  <mc:AlternateContent xmlns:mc="http://schemas.openxmlformats.org/markup-compatibility/2006" xmlns:p14="http://schemas.microsoft.com/office/powerpoint/2010/main">
+    <mc:Choice Requires="p14">
+      <p:transition p14:dur="0"/>
+    </mc:Choice>
+    <mc:Fallback xmlns="">
+      <p:transition/>
+    </mc:Fallback>
+  </mc:AlternateContent>
   <p:txStyles>
     <p:titleStyle>
       <a:lvl1pPr algn="ctr" defTabSz="457200" rtl="0" eaLnBrk="1" latinLnBrk="0" hangingPunct="1">
@@ -6617,6 +6759,14 @@
   <p:clrMapOvr>
     <a:masterClrMapping/>
   </p:clrMapOvr>
+  <mc:AlternateContent xmlns:mc="http://schemas.openxmlformats.org/markup-compatibility/2006" xmlns:p14="http://schemas.microsoft.com/office/powerpoint/2010/main">
+    <mc:Choice Requires="p14">
+      <p:transition p14:dur="0"/>
+    </mc:Choice>
+    <mc:Fallback xmlns="">
+      <p:transition/>
+    </mc:Fallback>
+  </mc:AlternateContent>
   <p:timing>
     <p:tnLst>
       <p:par>
@@ -6661,7 +6811,7 @@
           <a:p>
             <a:r>
               <a:rPr lang="sk-SK" dirty="0" smtClean="0"/>
-              <a:t>Vytvorenie neurónovej siete</a:t>
+              <a:t>Testovanie</a:t>
             </a:r>
             <a:endParaRPr lang="sk-SK" dirty="0"/>
           </a:p>
@@ -6669,11 +6819,13 @@
       </p:sp>
       <p:pic>
         <p:nvPicPr>
-          <p:cNvPr id="6" name="Obrázok 5"/>
+          <p:cNvPr id="4" name="Zástupný symbol obsahu 3"/>
           <p:cNvPicPr>
-            <a:picLocks noChangeAspect="1"/>
+            <a:picLocks noGrp="1" noChangeAspect="1"/>
           </p:cNvPicPr>
-          <p:nvPr/>
+          <p:nvPr>
+            <p:ph idx="1"/>
+          </p:nvPr>
         </p:nvPicPr>
         <p:blipFill>
           <a:blip r:embed="rId2"/>
@@ -6683,55 +6835,17 @@
         </p:blipFill>
         <p:spPr>
           <a:xfrm>
-            <a:off x="1279477" y="2489293"/>
-            <a:ext cx="7362825" cy="371475"/>
+            <a:off x="2056547" y="2564168"/>
+            <a:ext cx="6910032" cy="3496786"/>
           </a:xfrm>
           <a:prstGeom prst="rect">
             <a:avLst/>
           </a:prstGeom>
         </p:spPr>
       </p:pic>
-      <p:sp>
-        <p:nvSpPr>
-          <p:cNvPr id="7" name="BlokTextu 6"/>
-          <p:cNvSpPr txBox="1"/>
-          <p:nvPr/>
-        </p:nvSpPr>
-        <p:spPr>
-          <a:xfrm>
-            <a:off x="941696" y="2535721"/>
-            <a:ext cx="928048" cy="369332"/>
-          </a:xfrm>
-          <a:prstGeom prst="rect">
-            <a:avLst/>
-          </a:prstGeom>
-          <a:noFill/>
-        </p:spPr>
-        <p:txBody>
-          <a:bodyPr wrap="square" rtlCol="0">
-            <a:spAutoFit/>
-          </a:bodyPr>
-          <a:lstStyle/>
-          <a:p>
-            <a:r>
-              <a:rPr lang="sk-SK" b="1" dirty="0" smtClean="0">
-                <a:solidFill>
-                  <a:srgbClr val="FF0000"/>
-                </a:solidFill>
-              </a:rPr>
-              <a:t>1</a:t>
-            </a:r>
-            <a:endParaRPr lang="sk-SK" b="1" dirty="0">
-              <a:solidFill>
-                <a:srgbClr val="FF0000"/>
-              </a:solidFill>
-            </a:endParaRPr>
-          </a:p>
-        </p:txBody>
-      </p:sp>
       <p:pic>
         <p:nvPicPr>
-          <p:cNvPr id="8" name="Obrázok 7"/>
+          <p:cNvPr id="6" name="Obrázok 5"/>
           <p:cNvPicPr>
             <a:picLocks noChangeAspect="1"/>
           </p:cNvPicPr>
@@ -6745,161 +6859,8 @@
         </p:blipFill>
         <p:spPr>
           <a:xfrm>
-            <a:off x="1245428" y="2945251"/>
-            <a:ext cx="1724025" cy="704850"/>
-          </a:xfrm>
-          <a:prstGeom prst="rect">
-            <a:avLst/>
-          </a:prstGeom>
-        </p:spPr>
-      </p:pic>
-      <p:pic>
-        <p:nvPicPr>
-          <p:cNvPr id="9" name="Obrázok 8"/>
-          <p:cNvPicPr>
-            <a:picLocks noChangeAspect="1"/>
-          </p:cNvPicPr>
-          <p:nvPr/>
-        </p:nvPicPr>
-        <p:blipFill>
-          <a:blip r:embed="rId4"/>
-          <a:stretch>
-            <a:fillRect/>
-          </a:stretch>
-        </p:blipFill>
-        <p:spPr>
-          <a:xfrm>
-            <a:off x="1131698" y="3626646"/>
-            <a:ext cx="3324225" cy="1000125"/>
-          </a:xfrm>
-          <a:prstGeom prst="rect">
-            <a:avLst/>
-          </a:prstGeom>
-        </p:spPr>
-      </p:pic>
-      <p:pic>
-        <p:nvPicPr>
-          <p:cNvPr id="10" name="Obrázok 9"/>
-          <p:cNvPicPr>
-            <a:picLocks noChangeAspect="1"/>
-          </p:cNvPicPr>
-          <p:nvPr/>
-        </p:nvPicPr>
-        <p:blipFill>
-          <a:blip r:embed="rId5"/>
-          <a:stretch>
-            <a:fillRect/>
-          </a:stretch>
-        </p:blipFill>
-        <p:spPr>
-          <a:xfrm>
-            <a:off x="1279477" y="4626771"/>
-            <a:ext cx="5086350" cy="476250"/>
-          </a:xfrm>
-          <a:prstGeom prst="rect">
-            <a:avLst/>
-          </a:prstGeom>
-        </p:spPr>
-      </p:pic>
-      <p:pic>
-        <p:nvPicPr>
-          <p:cNvPr id="11" name="Obrázok 10"/>
-          <p:cNvPicPr>
-            <a:picLocks noChangeAspect="1"/>
-          </p:cNvPicPr>
-          <p:nvPr/>
-        </p:nvPicPr>
-        <p:blipFill>
-          <a:blip r:embed="rId6"/>
-          <a:stretch>
-            <a:fillRect/>
-          </a:stretch>
-        </p:blipFill>
-        <p:spPr>
-          <a:xfrm>
-            <a:off x="1186997" y="5143473"/>
-            <a:ext cx="1733550" cy="400050"/>
-          </a:xfrm>
-          <a:prstGeom prst="rect">
-            <a:avLst/>
-          </a:prstGeom>
-        </p:spPr>
-      </p:pic>
-      <p:pic>
-        <p:nvPicPr>
-          <p:cNvPr id="12" name="Obrázok 11"/>
-          <p:cNvPicPr>
-            <a:picLocks noChangeAspect="1"/>
-          </p:cNvPicPr>
-          <p:nvPr/>
-        </p:nvPicPr>
-        <p:blipFill>
-          <a:blip r:embed="rId7"/>
-          <a:stretch>
-            <a:fillRect/>
-          </a:stretch>
-        </p:blipFill>
-        <p:spPr>
-          <a:xfrm>
-            <a:off x="2210579" y="5416104"/>
-            <a:ext cx="2409825" cy="710497"/>
-          </a:xfrm>
-          <a:prstGeom prst="rect">
-            <a:avLst/>
-          </a:prstGeom>
-        </p:spPr>
-      </p:pic>
-      <p:sp>
-        <p:nvSpPr>
-          <p:cNvPr id="13" name="BlokTextu 12"/>
-          <p:cNvSpPr txBox="1"/>
-          <p:nvPr/>
-        </p:nvSpPr>
-        <p:spPr>
-          <a:xfrm>
-            <a:off x="5329165" y="3493503"/>
-            <a:ext cx="928048" cy="369332"/>
-          </a:xfrm>
-          <a:prstGeom prst="rect">
-            <a:avLst/>
-          </a:prstGeom>
-          <a:noFill/>
-        </p:spPr>
-        <p:txBody>
-          <a:bodyPr wrap="square" rtlCol="0">
-            <a:spAutoFit/>
-          </a:bodyPr>
-          <a:lstStyle/>
-          <a:p>
-            <a:r>
-              <a:rPr lang="sk-SK" b="1" dirty="0">
-                <a:solidFill>
-                  <a:srgbClr val="FF0000"/>
-                </a:solidFill>
-              </a:rPr>
-              <a:t>2</a:t>
-            </a:r>
-          </a:p>
-        </p:txBody>
-      </p:sp>
-      <p:pic>
-        <p:nvPicPr>
-          <p:cNvPr id="15" name="Obrázok 14"/>
-          <p:cNvPicPr>
-            <a:picLocks noChangeAspect="1"/>
-          </p:cNvPicPr>
-          <p:nvPr/>
-        </p:nvPicPr>
-        <p:blipFill>
-          <a:blip r:embed="rId8"/>
-          <a:stretch>
-            <a:fillRect/>
-          </a:stretch>
-        </p:blipFill>
-        <p:spPr>
-          <a:xfrm>
-            <a:off x="5643986" y="3580602"/>
-            <a:ext cx="5710951" cy="2190750"/>
+            <a:off x="2518936" y="5965704"/>
+            <a:ext cx="7781925" cy="190500"/>
           </a:xfrm>
           <a:prstGeom prst="rect">
             <a:avLst/>
@@ -6909,13 +6870,21 @@
     </p:spTree>
     <p:extLst>
       <p:ext uri="{BB962C8B-B14F-4D97-AF65-F5344CB8AC3E}">
-        <p14:creationId xmlns:p14="http://schemas.microsoft.com/office/powerpoint/2010/main" val="1691866668"/>
+        <p14:creationId xmlns:p14="http://schemas.microsoft.com/office/powerpoint/2010/main" val="4238164515"/>
       </p:ext>
     </p:extLst>
   </p:cSld>
   <p:clrMapOvr>
     <a:masterClrMapping/>
   </p:clrMapOvr>
+  <mc:AlternateContent xmlns:mc="http://schemas.openxmlformats.org/markup-compatibility/2006" xmlns:p14="http://schemas.microsoft.com/office/powerpoint/2010/main">
+    <mc:Choice Requires="p14">
+      <p:transition p14:dur="0"/>
+    </mc:Choice>
+    <mc:Fallback xmlns="">
+      <p:transition/>
+    </mc:Fallback>
+  </mc:AlternateContent>
   <p:timing>
     <p:tnLst>
       <p:par>
@@ -6960,7 +6929,7 @@
           <a:p>
             <a:r>
               <a:rPr lang="sk-SK" dirty="0" smtClean="0"/>
-              <a:t>Testovanie</a:t>
+              <a:t>Výstup z programu</a:t>
             </a:r>
             <a:endParaRPr lang="sk-SK" dirty="0"/>
           </a:p>
@@ -6968,13 +6937,11 @@
       </p:sp>
       <p:pic>
         <p:nvPicPr>
-          <p:cNvPr id="4" name="Zástupný symbol obsahu 3"/>
+          <p:cNvPr id="9" name="Obrázok 8"/>
           <p:cNvPicPr>
-            <a:picLocks noGrp="1" noChangeAspect="1"/>
+            <a:picLocks noChangeAspect="1"/>
           </p:cNvPicPr>
-          <p:nvPr>
-            <p:ph idx="1"/>
-          </p:nvPr>
+          <p:nvPr/>
         </p:nvPicPr>
         <p:blipFill>
           <a:blip r:embed="rId2"/>
@@ -6984,8 +6951,8 @@
         </p:blipFill>
         <p:spPr>
           <a:xfrm>
-            <a:off x="2056547" y="2564168"/>
-            <a:ext cx="6910032" cy="3496786"/>
+            <a:off x="940629" y="3987683"/>
+            <a:ext cx="4010025" cy="304800"/>
           </a:xfrm>
           <a:prstGeom prst="rect">
             <a:avLst/>
@@ -6994,7 +6961,7 @@
       </p:pic>
       <p:pic>
         <p:nvPicPr>
-          <p:cNvPr id="6" name="Obrázok 5"/>
+          <p:cNvPr id="4" name="Obrázok 3"/>
           <p:cNvPicPr>
             <a:picLocks noChangeAspect="1"/>
           </p:cNvPicPr>
@@ -7008,24 +6975,162 @@
         </p:blipFill>
         <p:spPr>
           <a:xfrm>
-            <a:off x="2518936" y="5965704"/>
-            <a:ext cx="7781925" cy="190500"/>
+            <a:off x="869334" y="4406995"/>
+            <a:ext cx="4688434" cy="1718634"/>
           </a:xfrm>
           <a:prstGeom prst="rect">
             <a:avLst/>
           </a:prstGeom>
         </p:spPr>
       </p:pic>
+      <p:pic>
+        <p:nvPicPr>
+          <p:cNvPr id="5" name="Obrázok 4"/>
+          <p:cNvPicPr>
+            <a:picLocks noChangeAspect="1"/>
+          </p:cNvPicPr>
+          <p:nvPr/>
+        </p:nvPicPr>
+        <p:blipFill>
+          <a:blip r:embed="rId4"/>
+          <a:stretch>
+            <a:fillRect/>
+          </a:stretch>
+        </p:blipFill>
+        <p:spPr>
+          <a:xfrm>
+            <a:off x="869334" y="2489141"/>
+            <a:ext cx="8601075" cy="1009650"/>
+          </a:xfrm>
+          <a:prstGeom prst="rect">
+            <a:avLst/>
+          </a:prstGeom>
+        </p:spPr>
+      </p:pic>
+      <p:pic>
+        <p:nvPicPr>
+          <p:cNvPr id="7" name="Obrázok 6"/>
+          <p:cNvPicPr>
+            <a:picLocks noChangeAspect="1"/>
+          </p:cNvPicPr>
+          <p:nvPr/>
+        </p:nvPicPr>
+        <p:blipFill>
+          <a:blip r:embed="rId5"/>
+          <a:stretch>
+            <a:fillRect/>
+          </a:stretch>
+        </p:blipFill>
+        <p:spPr>
+          <a:xfrm>
+            <a:off x="773799" y="3282833"/>
+            <a:ext cx="3667125" cy="838200"/>
+          </a:xfrm>
+          <a:prstGeom prst="rect">
+            <a:avLst/>
+          </a:prstGeom>
+        </p:spPr>
+      </p:pic>
+      <p:pic>
+        <p:nvPicPr>
+          <p:cNvPr id="11" name="Obrázok 10"/>
+          <p:cNvPicPr>
+            <a:picLocks noChangeAspect="1"/>
+          </p:cNvPicPr>
+          <p:nvPr/>
+        </p:nvPicPr>
+        <p:blipFill>
+          <a:blip r:embed="rId6"/>
+          <a:stretch>
+            <a:fillRect/>
+          </a:stretch>
+        </p:blipFill>
+        <p:spPr>
+          <a:xfrm>
+            <a:off x="6873919" y="3464934"/>
+            <a:ext cx="3566617" cy="2241448"/>
+          </a:xfrm>
+          <a:prstGeom prst="rect">
+            <a:avLst/>
+          </a:prstGeom>
+          <a:ln>
+            <a:noFill/>
+          </a:ln>
+          <a:effectLst>
+            <a:outerShdw blurRad="292100" dist="139700" dir="2700000" algn="tl" rotWithShape="0">
+              <a:srgbClr val="333333">
+                <a:alpha val="65000"/>
+              </a:srgbClr>
+            </a:outerShdw>
+          </a:effectLst>
+        </p:spPr>
+      </p:pic>
+      <p:sp>
+        <p:nvSpPr>
+          <p:cNvPr id="12" name="BlokTextu 11"/>
+          <p:cNvSpPr txBox="1"/>
+          <p:nvPr/>
+        </p:nvSpPr>
+        <p:spPr>
+          <a:xfrm>
+            <a:off x="6523631" y="5802463"/>
+            <a:ext cx="5131558" cy="646331"/>
+          </a:xfrm>
+          <a:prstGeom prst="rect">
+            <a:avLst/>
+          </a:prstGeom>
+          <a:noFill/>
+        </p:spPr>
+        <p:txBody>
+          <a:bodyPr wrap="square" rtlCol="0">
+            <a:spAutoFit/>
+          </a:bodyPr>
+          <a:lstStyle/>
+          <a:p>
+            <a:r>
+              <a:rPr lang="sk-SK" dirty="0" err="1"/>
+              <a:t>Confusion</a:t>
+            </a:r>
+            <a:r>
+              <a:rPr lang="sk-SK" dirty="0"/>
+              <a:t> </a:t>
+            </a:r>
+            <a:r>
+              <a:rPr lang="sk-SK" dirty="0" err="1" smtClean="0"/>
+              <a:t>Matrix</a:t>
+            </a:r>
+            <a:r>
+              <a:rPr lang="en-US" dirty="0" smtClean="0"/>
+              <a:t> - </a:t>
+            </a:r>
+            <a:r>
+              <a:rPr lang="sk-SK" dirty="0"/>
+              <a:t>Farebná interpretácia hodnôt </a:t>
+            </a:r>
+          </a:p>
+          <a:p>
+            <a:endParaRPr lang="sk-SK" dirty="0"/>
+          </a:p>
+        </p:txBody>
+      </p:sp>
     </p:spTree>
     <p:extLst>
       <p:ext uri="{BB962C8B-B14F-4D97-AF65-F5344CB8AC3E}">
-        <p14:creationId xmlns:p14="http://schemas.microsoft.com/office/powerpoint/2010/main" val="4238164515"/>
+        <p14:creationId xmlns:p14="http://schemas.microsoft.com/office/powerpoint/2010/main" val="365760380"/>
       </p:ext>
     </p:extLst>
   </p:cSld>
   <p:clrMapOvr>
     <a:masterClrMapping/>
   </p:clrMapOvr>
+  <mc:AlternateContent xmlns:mc="http://schemas.openxmlformats.org/markup-compatibility/2006" xmlns:p14="http://schemas.microsoft.com/office/powerpoint/2010/main">
+    <mc:Choice Requires="p14">
+      <p:transition p14:dur="0"/>
+    </mc:Choice>
+    <mc:Fallback xmlns="">
+      <p:transition/>
+    </mc:Fallback>
+  </mc:AlternateContent>
   <p:timing>
     <p:tnLst>
       <p:par>
@@ -7063,21 +7168,37 @@
             <p:ph type="title"/>
           </p:nvPr>
         </p:nvSpPr>
-        <p:spPr>
-          <a:xfrm>
-            <a:off x="1076692" y="982132"/>
-            <a:ext cx="10268241" cy="1303867"/>
-          </a:xfrm>
-        </p:spPr>
-        <p:txBody>
-          <a:bodyPr>
-            <a:normAutofit fontScale="90000"/>
-          </a:bodyPr>
+        <p:spPr/>
+        <p:txBody>
+          <a:bodyPr/>
           <a:lstStyle/>
           <a:p>
             <a:r>
               <a:rPr lang="sk-SK" dirty="0" smtClean="0"/>
-              <a:t>Vzorce</a:t>
+              <a:t>Záver</a:t>
+            </a:r>
+            <a:endParaRPr lang="sk-SK" dirty="0"/>
+          </a:p>
+        </p:txBody>
+      </p:sp>
+      <p:sp>
+        <p:nvSpPr>
+          <p:cNvPr id="3" name="Zástupný symbol obsahu 2"/>
+          <p:cNvSpPr>
+            <a:spLocks noGrp="1"/>
+          </p:cNvSpPr>
+          <p:nvPr>
+            <p:ph idx="1"/>
+          </p:nvPr>
+        </p:nvSpPr>
+        <p:spPr/>
+        <p:txBody>
+          <a:bodyPr/>
+          <a:lstStyle/>
+          <a:p>
+            <a:r>
+              <a:rPr lang="sk-SK" dirty="0" smtClean="0"/>
+              <a:t>Výsledky</a:t>
             </a:r>
             <a:r>
               <a:rPr lang="en-US" dirty="0" smtClean="0"/>
@@ -7085,210 +7206,60 @@
             </a:r>
             <a:r>
               <a:rPr lang="sk-SK" dirty="0" smtClean="0"/>
-              <a:t>na</a:t>
-            </a:r>
-            <a:r>
-              <a:rPr lang="en-US" dirty="0" smtClean="0"/>
-              <a:t> v</a:t>
+              <a:t>ukázali, </a:t>
+            </a:r>
+            <a:r>
+              <a:rPr lang="sk-SK" dirty="0"/>
+              <a:t>že tento model funguje </a:t>
             </a:r>
             <a:r>
               <a:rPr lang="sk-SK" dirty="0" smtClean="0"/>
-              <a:t>výpočet jednotlivých metód</a:t>
-            </a:r>
-            <a:r>
-              <a:rPr lang="en-US" dirty="0" smtClean="0"/>
-              <a:t> </a:t>
-            </a:r>
+              <a:t>s vysokou presnosťou pri </a:t>
+            </a:r>
+            <a:r>
+              <a:rPr lang="sk-SK" dirty="0"/>
+              <a:t>predpovedaní rakoviny. </a:t>
+            </a:r>
+            <a:endParaRPr lang="en-US" dirty="0" smtClean="0"/>
+          </a:p>
+          <a:p>
             <a:r>
               <a:rPr lang="sk-SK" dirty="0" smtClean="0"/>
-              <a:t>vo</a:t>
-            </a:r>
-            <a:r>
-              <a:rPr lang="en-US" dirty="0" smtClean="0"/>
-              <a:t> </a:t>
+              <a:t>Môže </a:t>
+            </a:r>
+            <a:r>
+              <a:rPr lang="sk-SK" dirty="0"/>
+              <a:t>byť použitý ako inteligentný komponent </a:t>
             </a:r>
             <a:r>
               <a:rPr lang="sk-SK" dirty="0" smtClean="0"/>
-              <a:t>výstupe</a:t>
-            </a:r>
-            <a:endParaRPr lang="sk-SK" dirty="0"/>
-          </a:p>
-        </p:txBody>
-      </p:sp>
-      <p:sp>
-        <p:nvSpPr>
-          <p:cNvPr id="8" name="Zástupný symbol obsahu 7"/>
-          <p:cNvSpPr>
-            <a:spLocks noGrp="1"/>
-          </p:cNvSpPr>
-          <p:nvPr>
-            <p:ph idx="1"/>
-          </p:nvPr>
-        </p:nvSpPr>
-        <p:spPr/>
-        <p:txBody>
-          <a:bodyPr/>
-          <a:lstStyle/>
-          <a:p>
+              <a:t>v lekárskom </a:t>
+            </a:r>
             <a:r>
               <a:rPr lang="sk-SK" dirty="0"/>
-              <a:t>Miera falošného objavovania (</a:t>
-            </a:r>
-            <a:r>
-              <a:rPr lang="sk-SK" dirty="0" err="1"/>
-              <a:t>FDR</a:t>
-            </a:r>
-            <a:r>
-              <a:rPr lang="sk-SK" dirty="0" smtClean="0"/>
-              <a:t>)</a:t>
-            </a:r>
-            <a:endParaRPr lang="en-US" dirty="0" smtClean="0"/>
-          </a:p>
-          <a:p>
-            <a:r>
-              <a:rPr lang="sk-SK" dirty="0"/>
-              <a:t>Falošne negatívne hodnotenie (</a:t>
-            </a:r>
-            <a:r>
-              <a:rPr lang="sk-SK" dirty="0" err="1"/>
-              <a:t>FNR</a:t>
-            </a:r>
-            <a:r>
-              <a:rPr lang="sk-SK" dirty="0" smtClean="0"/>
-              <a:t>)</a:t>
-            </a:r>
-            <a:endParaRPr lang="en-US" dirty="0" smtClean="0"/>
-          </a:p>
-          <a:p>
-            <a:r>
-              <a:rPr lang="sk-SK" dirty="0"/>
-              <a:t>Špecifikácia alebo </a:t>
-            </a:r>
-            <a:r>
-              <a:rPr lang="sk-SK" dirty="0" err="1" smtClean="0"/>
-              <a:t>TNR</a:t>
-            </a:r>
-            <a:endParaRPr lang="en-US" dirty="0" smtClean="0"/>
-          </a:p>
-          <a:p>
-            <a:r>
-              <a:rPr lang="sk-SK" dirty="0"/>
-              <a:t>Citlivosť alebo </a:t>
-            </a:r>
-            <a:r>
-              <a:rPr lang="sk-SK" dirty="0" err="1"/>
-              <a:t>TPR</a:t>
-            </a:r>
-            <a:endParaRPr lang="sk-SK" dirty="0"/>
-          </a:p>
-        </p:txBody>
-      </p:sp>
-      <p:pic>
-        <p:nvPicPr>
-          <p:cNvPr id="9" name="Obrázok 8"/>
-          <p:cNvPicPr>
-            <a:picLocks noChangeAspect="1"/>
-          </p:cNvPicPr>
-          <p:nvPr/>
-        </p:nvPicPr>
-        <p:blipFill>
-          <a:blip r:embed="rId2"/>
-          <a:stretch>
-            <a:fillRect/>
-          </a:stretch>
-        </p:blipFill>
-        <p:spPr>
-          <a:xfrm>
-            <a:off x="6095999" y="2556932"/>
-            <a:ext cx="2286000" cy="438150"/>
-          </a:xfrm>
-          <a:prstGeom prst="rect">
-            <a:avLst/>
-          </a:prstGeom>
-        </p:spPr>
-      </p:pic>
-      <p:pic>
-        <p:nvPicPr>
-          <p:cNvPr id="10" name="Obrázok 9"/>
-          <p:cNvPicPr>
-            <a:picLocks noChangeAspect="1"/>
-          </p:cNvPicPr>
-          <p:nvPr/>
-        </p:nvPicPr>
-        <p:blipFill>
-          <a:blip r:embed="rId3"/>
-          <a:stretch>
-            <a:fillRect/>
-          </a:stretch>
-        </p:blipFill>
-        <p:spPr>
-          <a:xfrm>
-            <a:off x="6095999" y="2995082"/>
-            <a:ext cx="2752725" cy="476250"/>
-          </a:xfrm>
-          <a:prstGeom prst="rect">
-            <a:avLst/>
-          </a:prstGeom>
-        </p:spPr>
-      </p:pic>
-      <p:pic>
-        <p:nvPicPr>
-          <p:cNvPr id="12" name="Obrázok 11"/>
-          <p:cNvPicPr>
-            <a:picLocks noChangeAspect="1"/>
-          </p:cNvPicPr>
-          <p:nvPr/>
-        </p:nvPicPr>
-        <p:blipFill>
-          <a:blip r:embed="rId4"/>
-          <a:stretch>
-            <a:fillRect/>
-          </a:stretch>
-        </p:blipFill>
-        <p:spPr>
-          <a:xfrm>
-            <a:off x="6095999" y="3536948"/>
-            <a:ext cx="2733675" cy="419100"/>
-          </a:xfrm>
-          <a:prstGeom prst="rect">
-            <a:avLst/>
-          </a:prstGeom>
-        </p:spPr>
-      </p:pic>
-      <p:pic>
-        <p:nvPicPr>
-          <p:cNvPr id="13" name="Obrázok 12"/>
-          <p:cNvPicPr>
-            <a:picLocks noChangeAspect="1"/>
-          </p:cNvPicPr>
-          <p:nvPr/>
-        </p:nvPicPr>
-        <p:blipFill>
-          <a:blip r:embed="rId5"/>
-          <a:stretch>
-            <a:fillRect/>
-          </a:stretch>
-        </p:blipFill>
-        <p:spPr>
-          <a:xfrm>
-            <a:off x="6095998" y="4021664"/>
-            <a:ext cx="2733675" cy="457200"/>
-          </a:xfrm>
-          <a:prstGeom prst="rect">
-            <a:avLst/>
-          </a:prstGeom>
-        </p:spPr>
-      </p:pic>
+              <a:t>rozhodovaní.</a:t>
+            </a:r>
+          </a:p>
+        </p:txBody>
+      </p:sp>
     </p:spTree>
     <p:extLst>
       <p:ext uri="{BB962C8B-B14F-4D97-AF65-F5344CB8AC3E}">
-        <p14:creationId xmlns:p14="http://schemas.microsoft.com/office/powerpoint/2010/main" val="452084966"/>
+        <p14:creationId xmlns:p14="http://schemas.microsoft.com/office/powerpoint/2010/main" val="2036769674"/>
       </p:ext>
     </p:extLst>
   </p:cSld>
   <p:clrMapOvr>
     <a:masterClrMapping/>
   </p:clrMapOvr>
+  <mc:AlternateContent xmlns:mc="http://schemas.openxmlformats.org/markup-compatibility/2006" xmlns:p14="http://schemas.microsoft.com/office/powerpoint/2010/main">
+    <mc:Choice Requires="p14">
+      <p:transition p14:dur="0"/>
+    </mc:Choice>
+    <mc:Fallback xmlns="">
+      <p:transition/>
+    </mc:Fallback>
+  </mc:AlternateContent>
 </p:sld>
 </file>
 
@@ -7326,118 +7297,159 @@
           <a:p>
             <a:r>
               <a:rPr lang="sk-SK" dirty="0" smtClean="0"/>
-              <a:t>Výstup z programu</a:t>
+              <a:t>Použité zdroje</a:t>
             </a:r>
             <a:endParaRPr lang="sk-SK" dirty="0"/>
           </a:p>
         </p:txBody>
       </p:sp>
-      <p:pic>
-        <p:nvPicPr>
-          <p:cNvPr id="6" name="Obrázok 5"/>
-          <p:cNvPicPr>
-            <a:picLocks noChangeAspect="1"/>
-          </p:cNvPicPr>
-          <p:nvPr/>
-        </p:nvPicPr>
-        <p:blipFill>
-          <a:blip r:embed="rId2"/>
-          <a:stretch>
-            <a:fillRect/>
-          </a:stretch>
-        </p:blipFill>
-        <p:spPr>
-          <a:xfrm>
-            <a:off x="964868" y="2571537"/>
-            <a:ext cx="8515350" cy="1114425"/>
-          </a:xfrm>
-          <a:prstGeom prst="rect">
-            <a:avLst/>
-          </a:prstGeom>
-        </p:spPr>
-      </p:pic>
-      <p:pic>
-        <p:nvPicPr>
-          <p:cNvPr id="9" name="Obrázok 8"/>
-          <p:cNvPicPr>
-            <a:picLocks noChangeAspect="1"/>
-          </p:cNvPicPr>
-          <p:nvPr/>
-        </p:nvPicPr>
-        <p:blipFill>
-          <a:blip r:embed="rId3"/>
-          <a:stretch>
-            <a:fillRect/>
-          </a:stretch>
-        </p:blipFill>
-        <p:spPr>
-          <a:xfrm>
-            <a:off x="964868" y="5885691"/>
-            <a:ext cx="4010025" cy="304800"/>
-          </a:xfrm>
-          <a:prstGeom prst="rect">
-            <a:avLst/>
-          </a:prstGeom>
-        </p:spPr>
-      </p:pic>
-      <p:pic>
-        <p:nvPicPr>
-          <p:cNvPr id="3" name="Obrázok 2"/>
-          <p:cNvPicPr>
-            <a:picLocks noChangeAspect="1"/>
-          </p:cNvPicPr>
-          <p:nvPr/>
-        </p:nvPicPr>
-        <p:blipFill>
-          <a:blip r:embed="rId4"/>
-          <a:stretch>
-            <a:fillRect/>
-          </a:stretch>
-        </p:blipFill>
-        <p:spPr>
-          <a:xfrm>
-            <a:off x="752695" y="3573745"/>
-            <a:ext cx="5172075" cy="1514475"/>
-          </a:xfrm>
-          <a:prstGeom prst="rect">
-            <a:avLst/>
-          </a:prstGeom>
-        </p:spPr>
-      </p:pic>
-      <p:pic>
-        <p:nvPicPr>
-          <p:cNvPr id="8" name="Obrázok 7"/>
-          <p:cNvPicPr>
-            <a:picLocks noChangeAspect="1"/>
-          </p:cNvPicPr>
-          <p:nvPr/>
-        </p:nvPicPr>
-        <p:blipFill>
-          <a:blip r:embed="rId5"/>
-          <a:stretch>
-            <a:fillRect/>
-          </a:stretch>
-        </p:blipFill>
-        <p:spPr>
-          <a:xfrm>
-            <a:off x="6181722" y="3611876"/>
-            <a:ext cx="4714875" cy="2466975"/>
-          </a:xfrm>
-          <a:prstGeom prst="rect">
-            <a:avLst/>
-          </a:prstGeom>
-        </p:spPr>
-      </p:pic>
+      <p:sp>
+        <p:nvSpPr>
+          <p:cNvPr id="3" name="Zástupný symbol obsahu 2"/>
+          <p:cNvSpPr>
+            <a:spLocks noGrp="1"/>
+          </p:cNvSpPr>
+          <p:nvPr>
+            <p:ph idx="1"/>
+          </p:nvPr>
+        </p:nvSpPr>
+        <p:spPr/>
+        <p:txBody>
+          <a:bodyPr>
+            <a:normAutofit fontScale="85000" lnSpcReduction="20000"/>
+          </a:bodyPr>
+          <a:lstStyle/>
+          <a:p>
+            <a:r>
+              <a:rPr lang="sk-SK" dirty="0">
+                <a:hlinkClick r:id="rId3"/>
+              </a:rPr>
+              <a:t>https://</a:t>
+            </a:r>
+            <a:r>
+              <a:rPr lang="sk-SK" dirty="0" smtClean="0">
+                <a:hlinkClick r:id="rId3"/>
+              </a:rPr>
+              <a:t>www.researchgate.net/publication/224163164_Breast_Cancer_diagnosis_using_Artificial_Neural_Network_models</a:t>
+            </a:r>
+            <a:endParaRPr lang="sk-SK" dirty="0" smtClean="0"/>
+          </a:p>
+          <a:p>
+            <a:r>
+              <a:rPr lang="sk-SK" dirty="0">
+                <a:hlinkClick r:id="rId4"/>
+              </a:rPr>
+              <a:t>https://</a:t>
+            </a:r>
+            <a:r>
+              <a:rPr lang="sk-SK" dirty="0" smtClean="0">
+                <a:hlinkClick r:id="rId4"/>
+              </a:rPr>
+              <a:t>github.com/bhavaniprasad73/Artificial-Neural-Network/blob/master/ANN.py</a:t>
+            </a:r>
+            <a:endParaRPr lang="sk-SK" dirty="0" smtClean="0"/>
+          </a:p>
+          <a:p>
+            <a:r>
+              <a:rPr lang="sk-SK" dirty="0">
+                <a:hlinkClick r:id="rId5"/>
+              </a:rPr>
+              <a:t>https://</a:t>
+            </a:r>
+            <a:r>
+              <a:rPr lang="sk-SK" dirty="0" smtClean="0">
+                <a:hlinkClick r:id="rId5"/>
+              </a:rPr>
+              <a:t>www.kaggle.com/uciml/breast-cancer-wisconsin-data/home</a:t>
+            </a:r>
+            <a:endParaRPr lang="sk-SK" dirty="0" smtClean="0"/>
+          </a:p>
+          <a:p>
+            <a:r>
+              <a:rPr lang="sk-SK" dirty="0">
+                <a:hlinkClick r:id="rId6"/>
+              </a:rPr>
+              <a:t>https://</a:t>
+            </a:r>
+            <a:r>
+              <a:rPr lang="sk-SK" dirty="0" smtClean="0">
+                <a:hlinkClick r:id="rId6"/>
+              </a:rPr>
+              <a:t>arxiv.org/pdf/1711.07831.pdf</a:t>
+            </a:r>
+            <a:endParaRPr lang="sk-SK" dirty="0" smtClean="0"/>
+          </a:p>
+          <a:p>
+            <a:r>
+              <a:rPr lang="sk-SK" dirty="0">
+                <a:hlinkClick r:id="rId3"/>
+              </a:rPr>
+              <a:t>https://</a:t>
+            </a:r>
+            <a:r>
+              <a:rPr lang="sk-SK" dirty="0" smtClean="0">
+                <a:hlinkClick r:id="rId3"/>
+              </a:rPr>
+              <a:t>www.researchgate.net/publication/224163164_Breast_Cancer_diagnosis_using_Artificial_Neural_Network_models</a:t>
+            </a:r>
+            <a:endParaRPr lang="sk-SK" dirty="0" smtClean="0"/>
+          </a:p>
+          <a:p>
+            <a:r>
+              <a:rPr lang="sk-SK" dirty="0" smtClean="0">
+                <a:hlinkClick r:id="rId7"/>
+              </a:rPr>
+              <a:t>https</a:t>
+            </a:r>
+            <a:r>
+              <a:rPr lang="sk-SK" dirty="0">
+                <a:hlinkClick r:id="rId7"/>
+              </a:rPr>
+              <a:t>://</a:t>
+            </a:r>
+            <a:r>
+              <a:rPr lang="sk-SK" dirty="0" smtClean="0">
+                <a:hlinkClick r:id="rId7"/>
+              </a:rPr>
+              <a:t>github.com/bhavaniprasad73/Artificial-Neural-Network/blob/master/Final%20report.pdf</a:t>
+            </a:r>
+            <a:endParaRPr lang="sk-SK" dirty="0" smtClean="0"/>
+          </a:p>
+          <a:p>
+            <a:endParaRPr lang="sk-SK" dirty="0"/>
+          </a:p>
+          <a:p>
+            <a:endParaRPr lang="en-US" dirty="0" smtClean="0"/>
+          </a:p>
+          <a:p>
+            <a:endParaRPr lang="sk-SK" dirty="0" smtClean="0"/>
+          </a:p>
+          <a:p>
+            <a:endParaRPr lang="sk-SK" dirty="0" smtClean="0"/>
+          </a:p>
+          <a:p>
+            <a:endParaRPr lang="sk-SK" dirty="0"/>
+          </a:p>
+        </p:txBody>
+      </p:sp>
     </p:spTree>
     <p:extLst>
       <p:ext uri="{BB962C8B-B14F-4D97-AF65-F5344CB8AC3E}">
-        <p14:creationId xmlns:p14="http://schemas.microsoft.com/office/powerpoint/2010/main" val="365760380"/>
+        <p14:creationId xmlns:p14="http://schemas.microsoft.com/office/powerpoint/2010/main" val="4133270707"/>
       </p:ext>
     </p:extLst>
   </p:cSld>
   <p:clrMapOvr>
     <a:masterClrMapping/>
   </p:clrMapOvr>
+  <mc:AlternateContent xmlns:mc="http://schemas.openxmlformats.org/markup-compatibility/2006" xmlns:p14="http://schemas.microsoft.com/office/powerpoint/2010/main">
+    <mc:Choice Requires="p14">
+      <p:transition p14:dur="0"/>
+    </mc:Choice>
+    <mc:Fallback xmlns="">
+      <p:transition/>
+    </mc:Fallback>
+  </mc:AlternateContent>
   <p:timing>
     <p:tnLst>
       <p:par>
@@ -7475,385 +7487,6 @@
             <p:ph type="title"/>
           </p:nvPr>
         </p:nvSpPr>
-        <p:spPr/>
-        <p:txBody>
-          <a:bodyPr/>
-          <a:lstStyle/>
-          <a:p>
-            <a:r>
-              <a:rPr lang="sk-SK" dirty="0" err="1" smtClean="0"/>
-              <a:t>Confusion</a:t>
-            </a:r>
-            <a:r>
-              <a:rPr lang="sk-SK" dirty="0" smtClean="0"/>
-              <a:t> </a:t>
-            </a:r>
-            <a:r>
-              <a:rPr lang="sk-SK" dirty="0" err="1" smtClean="0"/>
-              <a:t>Matrix</a:t>
-            </a:r>
-            <a:endParaRPr lang="sk-SK" dirty="0"/>
-          </a:p>
-        </p:txBody>
-      </p:sp>
-      <p:sp>
-        <p:nvSpPr>
-          <p:cNvPr id="5" name="Zástupný symbol obsahu 4"/>
-          <p:cNvSpPr>
-            <a:spLocks noGrp="1"/>
-          </p:cNvSpPr>
-          <p:nvPr>
-            <p:ph idx="1"/>
-          </p:nvPr>
-        </p:nvSpPr>
-        <p:spPr>
-          <a:xfrm>
-            <a:off x="985912" y="3539064"/>
-            <a:ext cx="9601196" cy="3318936"/>
-          </a:xfrm>
-        </p:spPr>
-        <p:txBody>
-          <a:bodyPr/>
-          <a:lstStyle/>
-          <a:p>
-            <a:r>
-              <a:rPr lang="sk-SK" dirty="0" smtClean="0"/>
-              <a:t>Tiež zvaná chybová matica</a:t>
-            </a:r>
-          </a:p>
-          <a:p>
-            <a:r>
-              <a:rPr lang="sk-SK" dirty="0" smtClean="0"/>
-              <a:t>Graf pre znázornenie presnosti</a:t>
-            </a:r>
-          </a:p>
-          <a:p>
-            <a:r>
-              <a:rPr lang="sk-SK" dirty="0" smtClean="0"/>
-              <a:t>Farebná interpretácia hodnôt </a:t>
-            </a:r>
-            <a:endParaRPr lang="sk-SK" dirty="0"/>
-          </a:p>
-        </p:txBody>
-      </p:sp>
-      <p:pic>
-        <p:nvPicPr>
-          <p:cNvPr id="6" name="Obrázok 5"/>
-          <p:cNvPicPr>
-            <a:picLocks noChangeAspect="1"/>
-          </p:cNvPicPr>
-          <p:nvPr/>
-        </p:nvPicPr>
-        <p:blipFill>
-          <a:blip r:embed="rId2"/>
-          <a:stretch>
-            <a:fillRect/>
-          </a:stretch>
-        </p:blipFill>
-        <p:spPr>
-          <a:xfrm>
-            <a:off x="6095999" y="2728036"/>
-            <a:ext cx="4666198" cy="3147832"/>
-          </a:xfrm>
-          <a:prstGeom prst="rect">
-            <a:avLst/>
-          </a:prstGeom>
-          <a:ln>
-            <a:noFill/>
-          </a:ln>
-          <a:effectLst>
-            <a:outerShdw blurRad="292100" dist="139700" dir="2700000" algn="tl" rotWithShape="0">
-              <a:srgbClr val="333333">
-                <a:alpha val="65000"/>
-              </a:srgbClr>
-            </a:outerShdw>
-          </a:effectLst>
-        </p:spPr>
-      </p:pic>
-      <p:pic>
-        <p:nvPicPr>
-          <p:cNvPr id="3" name="Obrázok 2"/>
-          <p:cNvPicPr>
-            <a:picLocks noChangeAspect="1"/>
-          </p:cNvPicPr>
-          <p:nvPr/>
-        </p:nvPicPr>
-        <p:blipFill>
-          <a:blip r:embed="rId3"/>
-          <a:stretch>
-            <a:fillRect/>
-          </a:stretch>
-        </p:blipFill>
-        <p:spPr>
-          <a:xfrm>
-            <a:off x="1295402" y="2445806"/>
-            <a:ext cx="3257550" cy="933450"/>
-          </a:xfrm>
-          <a:prstGeom prst="rect">
-            <a:avLst/>
-          </a:prstGeom>
-        </p:spPr>
-      </p:pic>
-    </p:spTree>
-    <p:extLst>
-      <p:ext uri="{BB962C8B-B14F-4D97-AF65-F5344CB8AC3E}">
-        <p14:creationId xmlns:p14="http://schemas.microsoft.com/office/powerpoint/2010/main" val="1319470410"/>
-      </p:ext>
-    </p:extLst>
-  </p:cSld>
-  <p:clrMapOvr>
-    <a:masterClrMapping/>
-  </p:clrMapOvr>
-  <p:timing>
-    <p:tnLst>
-      <p:par>
-        <p:cTn id="1" dur="indefinite" restart="never" nodeType="tmRoot"/>
-      </p:par>
-    </p:tnLst>
-  </p:timing>
-</p:sld>
-</file>
-
-<file path=ppt/slides/slide15.xml><?xml version="1.0" encoding="utf-8"?>
-<p:sld xmlns:a="http://schemas.openxmlformats.org/drawingml/2006/main" xmlns:r="http://schemas.openxmlformats.org/officeDocument/2006/relationships" xmlns:p="http://schemas.openxmlformats.org/presentationml/2006/main">
-  <p:cSld>
-    <p:spTree>
-      <p:nvGrpSpPr>
-        <p:cNvPr id="1" name=""/>
-        <p:cNvGrpSpPr/>
-        <p:nvPr/>
-      </p:nvGrpSpPr>
-      <p:grpSpPr>
-        <a:xfrm>
-          <a:off x="0" y="0"/>
-          <a:ext cx="0" cy="0"/>
-          <a:chOff x="0" y="0"/>
-          <a:chExt cx="0" cy="0"/>
-        </a:xfrm>
-      </p:grpSpPr>
-      <p:sp>
-        <p:nvSpPr>
-          <p:cNvPr id="2" name="Nadpis 1"/>
-          <p:cNvSpPr>
-            <a:spLocks noGrp="1"/>
-          </p:cNvSpPr>
-          <p:nvPr>
-            <p:ph type="title"/>
-          </p:nvPr>
-        </p:nvSpPr>
-        <p:spPr/>
-        <p:txBody>
-          <a:bodyPr/>
-          <a:lstStyle/>
-          <a:p>
-            <a:r>
-              <a:rPr lang="sk-SK" dirty="0" smtClean="0"/>
-              <a:t>Použité zdroje</a:t>
-            </a:r>
-            <a:endParaRPr lang="sk-SK" dirty="0"/>
-          </a:p>
-        </p:txBody>
-      </p:sp>
-      <p:sp>
-        <p:nvSpPr>
-          <p:cNvPr id="3" name="Zástupný symbol obsahu 2"/>
-          <p:cNvSpPr>
-            <a:spLocks noGrp="1"/>
-          </p:cNvSpPr>
-          <p:nvPr>
-            <p:ph idx="1"/>
-          </p:nvPr>
-        </p:nvSpPr>
-        <p:spPr/>
-        <p:txBody>
-          <a:bodyPr>
-            <a:normAutofit fontScale="70000" lnSpcReduction="20000"/>
-          </a:bodyPr>
-          <a:lstStyle/>
-          <a:p>
-            <a:r>
-              <a:rPr lang="sk-SK" dirty="0">
-                <a:hlinkClick r:id="rId3"/>
-              </a:rPr>
-              <a:t>https://</a:t>
-            </a:r>
-            <a:r>
-              <a:rPr lang="sk-SK" dirty="0" smtClean="0">
-                <a:hlinkClick r:id="rId3"/>
-              </a:rPr>
-              <a:t>www.researchgate.net/publication/224163164_Breast_Cancer_diagnosis_using_Artificial_Neural_Network_models</a:t>
-            </a:r>
-            <a:endParaRPr lang="sk-SK" dirty="0" smtClean="0"/>
-          </a:p>
-          <a:p>
-            <a:r>
-              <a:rPr lang="sk-SK" dirty="0">
-                <a:hlinkClick r:id="rId4"/>
-              </a:rPr>
-              <a:t>https://</a:t>
-            </a:r>
-            <a:r>
-              <a:rPr lang="sk-SK" dirty="0" smtClean="0">
-                <a:hlinkClick r:id="rId4"/>
-              </a:rPr>
-              <a:t>github.com/bhavaniprasad73/Artificial-Neural-Network/blob/master/ANN.py</a:t>
-            </a:r>
-            <a:endParaRPr lang="sk-SK" dirty="0" smtClean="0"/>
-          </a:p>
-          <a:p>
-            <a:r>
-              <a:rPr lang="sk-SK" dirty="0">
-                <a:hlinkClick r:id="rId5"/>
-              </a:rPr>
-              <a:t>https://</a:t>
-            </a:r>
-            <a:r>
-              <a:rPr lang="sk-SK" dirty="0" smtClean="0">
-                <a:hlinkClick r:id="rId5"/>
-              </a:rPr>
-              <a:t>www.kaggle.com/uciml/breast-cancer-wisconsin-data/home</a:t>
-            </a:r>
-            <a:endParaRPr lang="sk-SK" dirty="0" smtClean="0"/>
-          </a:p>
-          <a:p>
-            <a:r>
-              <a:rPr lang="sk-SK" dirty="0">
-                <a:hlinkClick r:id="rId6"/>
-              </a:rPr>
-              <a:t>https://</a:t>
-            </a:r>
-            <a:r>
-              <a:rPr lang="sk-SK" dirty="0" smtClean="0">
-                <a:hlinkClick r:id="rId6"/>
-              </a:rPr>
-              <a:t>arxiv.org/pdf/1711.07831.pdf</a:t>
-            </a:r>
-            <a:endParaRPr lang="sk-SK" dirty="0" smtClean="0"/>
-          </a:p>
-          <a:p>
-            <a:r>
-              <a:rPr lang="sk-SK" dirty="0">
-                <a:hlinkClick r:id="rId3"/>
-              </a:rPr>
-              <a:t>https://</a:t>
-            </a:r>
-            <a:r>
-              <a:rPr lang="sk-SK" dirty="0" smtClean="0">
-                <a:hlinkClick r:id="rId3"/>
-              </a:rPr>
-              <a:t>www.researchgate.net/publication/224163164_Breast_Cancer_diagnosis_using_Artificial_Neural_Network_models</a:t>
-            </a:r>
-            <a:endParaRPr lang="sk-SK" dirty="0" smtClean="0"/>
-          </a:p>
-          <a:p>
-            <a:r>
-              <a:rPr lang="sk-SK" dirty="0">
-                <a:hlinkClick r:id="rId7"/>
-              </a:rPr>
-              <a:t>http://ics.upjs.sk/~</a:t>
-            </a:r>
-            <a:r>
-              <a:rPr lang="sk-SK" dirty="0" smtClean="0">
-                <a:hlinkClick r:id="rId7"/>
-              </a:rPr>
-              <a:t>andrejkova/vyucba/PIV/PIV15_05.pdf</a:t>
-            </a:r>
-            <a:endParaRPr lang="en-US" dirty="0" smtClean="0"/>
-          </a:p>
-          <a:p>
-            <a:r>
-              <a:rPr lang="sk-SK" dirty="0">
-                <a:hlinkClick r:id="rId8"/>
-              </a:rPr>
-              <a:t>https://</a:t>
-            </a:r>
-            <a:r>
-              <a:rPr lang="sk-SK" dirty="0" smtClean="0">
-                <a:hlinkClick r:id="rId8"/>
-              </a:rPr>
-              <a:t>github.com/bhavaniprasad73/Artificial-Neural-Network/blob/master/Final%20report.pdf</a:t>
-            </a:r>
-            <a:endParaRPr lang="sk-SK" dirty="0" smtClean="0"/>
-          </a:p>
-          <a:p>
-            <a:r>
-              <a:rPr lang="sk-SK" dirty="0">
-                <a:hlinkClick r:id="rId9"/>
-              </a:rPr>
-              <a:t>https://</a:t>
-            </a:r>
-            <a:r>
-              <a:rPr lang="sk-SK" dirty="0" smtClean="0">
-                <a:hlinkClick r:id="rId9"/>
-              </a:rPr>
-              <a:t>en.wikipedia.org/wiki/Sensitivity_and_specificity</a:t>
-            </a:r>
-            <a:endParaRPr lang="en-US" dirty="0" smtClean="0"/>
-          </a:p>
-          <a:p>
-            <a:endParaRPr lang="sk-SK" dirty="0"/>
-          </a:p>
-          <a:p>
-            <a:endParaRPr lang="en-US" dirty="0" smtClean="0"/>
-          </a:p>
-          <a:p>
-            <a:endParaRPr lang="sk-SK" dirty="0" smtClean="0"/>
-          </a:p>
-          <a:p>
-            <a:endParaRPr lang="sk-SK" dirty="0" smtClean="0"/>
-          </a:p>
-          <a:p>
-            <a:endParaRPr lang="sk-SK" dirty="0"/>
-          </a:p>
-        </p:txBody>
-      </p:sp>
-    </p:spTree>
-    <p:extLst>
-      <p:ext uri="{BB962C8B-B14F-4D97-AF65-F5344CB8AC3E}">
-        <p14:creationId xmlns:p14="http://schemas.microsoft.com/office/powerpoint/2010/main" val="4133270707"/>
-      </p:ext>
-    </p:extLst>
-  </p:cSld>
-  <p:clrMapOvr>
-    <a:masterClrMapping/>
-  </p:clrMapOvr>
-  <p:timing>
-    <p:tnLst>
-      <p:par>
-        <p:cTn id="1" dur="indefinite" restart="never" nodeType="tmRoot"/>
-      </p:par>
-    </p:tnLst>
-  </p:timing>
-</p:sld>
-</file>
-
-<file path=ppt/slides/slide16.xml><?xml version="1.0" encoding="utf-8"?>
-<p:sld xmlns:a="http://schemas.openxmlformats.org/drawingml/2006/main" xmlns:r="http://schemas.openxmlformats.org/officeDocument/2006/relationships" xmlns:p="http://schemas.openxmlformats.org/presentationml/2006/main">
-  <p:cSld>
-    <p:spTree>
-      <p:nvGrpSpPr>
-        <p:cNvPr id="1" name=""/>
-        <p:cNvGrpSpPr/>
-        <p:nvPr/>
-      </p:nvGrpSpPr>
-      <p:grpSpPr>
-        <a:xfrm>
-          <a:off x="0" y="0"/>
-          <a:ext cx="0" cy="0"/>
-          <a:chOff x="0" y="0"/>
-          <a:chExt cx="0" cy="0"/>
-        </a:xfrm>
-      </p:grpSpPr>
-      <p:sp>
-        <p:nvSpPr>
-          <p:cNvPr id="2" name="Nadpis 1"/>
-          <p:cNvSpPr>
-            <a:spLocks noGrp="1"/>
-          </p:cNvSpPr>
-          <p:nvPr>
-            <p:ph type="title"/>
-          </p:nvPr>
-        </p:nvSpPr>
         <p:spPr>
           <a:xfrm>
             <a:off x="872322" y="722825"/>
@@ -7885,6 +7518,14 @@
   <p:clrMapOvr>
     <a:masterClrMapping/>
   </p:clrMapOvr>
+  <mc:AlternateContent xmlns:mc="http://schemas.openxmlformats.org/markup-compatibility/2006" xmlns:p14="http://schemas.microsoft.com/office/powerpoint/2010/main">
+    <mc:Choice Requires="p14">
+      <p:transition p14:dur="0"/>
+    </mc:Choice>
+    <mc:Fallback xmlns="">
+      <p:transition/>
+    </mc:Fallback>
+  </mc:AlternateContent>
   <p:timing>
     <p:tnLst>
       <p:par>
@@ -7959,42 +7600,69 @@
           </a:p>
           <a:p>
             <a:r>
+              <a:rPr lang="sk-SK" dirty="0" smtClean="0"/>
+              <a:t>Využitie neurónových </a:t>
+            </a:r>
+            <a:r>
+              <a:rPr lang="sk-SK" dirty="0"/>
+              <a:t>sieti na základe hlbokého učenia </a:t>
+            </a:r>
+            <a:r>
+              <a:rPr lang="en-US" dirty="0"/>
+              <a:t>(Deep learning)</a:t>
+            </a:r>
+          </a:p>
+          <a:p>
+            <a:r>
               <a:rPr lang="en-US" dirty="0" smtClean="0"/>
               <a:t>Na </a:t>
             </a:r>
             <a:r>
+              <a:rPr lang="sk-SK" dirty="0"/>
+              <a:t>základe </a:t>
+            </a:r>
+            <a:r>
+              <a:rPr lang="sk-SK" dirty="0" err="1"/>
+              <a:t>datasetu</a:t>
+            </a:r>
+            <a:r>
+              <a:rPr lang="sk-SK" dirty="0"/>
+              <a:t> zistiť, alebo predpovedať, či nádor nájdený v rakovine prsníka je zhubný </a:t>
+            </a:r>
+            <a:r>
+              <a:rPr lang="en-US" dirty="0"/>
+              <a:t>(M</a:t>
+            </a:r>
+            <a:r>
+              <a:rPr lang="en-US" dirty="0" smtClean="0"/>
+              <a:t>), </a:t>
+            </a:r>
+            <a:r>
+              <a:rPr lang="sk-SK" dirty="0"/>
+              <a:t>alebo</a:t>
+            </a:r>
+            <a:r>
+              <a:rPr lang="en-US" dirty="0"/>
+              <a:t> </a:t>
+            </a:r>
+            <a:r>
+              <a:rPr lang="sk-SK" dirty="0"/>
+              <a:t>nezhubný </a:t>
+            </a:r>
+            <a:r>
+              <a:rPr lang="en-US" dirty="0"/>
+              <a:t>(B</a:t>
+            </a:r>
+            <a:r>
+              <a:rPr lang="en-US" dirty="0" smtClean="0"/>
+              <a:t>)</a:t>
+            </a:r>
+            <a:endParaRPr lang="sk-SK" dirty="0" smtClean="0"/>
+          </a:p>
+          <a:p>
+            <a:r>
               <a:rPr lang="sk-SK" dirty="0" smtClean="0"/>
-              <a:t>základe </a:t>
-            </a:r>
-            <a:r>
-              <a:rPr lang="sk-SK" dirty="0" err="1" smtClean="0"/>
-              <a:t>datasetu</a:t>
-            </a:r>
-            <a:r>
-              <a:rPr lang="sk-SK" dirty="0" smtClean="0"/>
-              <a:t> určiť pravdepodobnosť výskytu rakoviny prsníka</a:t>
-            </a:r>
-          </a:p>
-          <a:p>
-            <a:r>
-              <a:rPr lang="sk-SK" dirty="0" smtClean="0"/>
-              <a:t>Zistiť, alebo predpovedať</a:t>
-            </a:r>
-            <a:r>
-              <a:rPr lang="sk-SK" dirty="0"/>
-              <a:t>, či nádor nájdený v rakovine prsníka je </a:t>
-            </a:r>
-            <a:r>
-              <a:rPr lang="sk-SK" dirty="0" smtClean="0"/>
-              <a:t>zhubný </a:t>
-            </a:r>
-            <a:r>
-              <a:rPr lang="en-US" dirty="0" smtClean="0"/>
-              <a:t>(M) </a:t>
-            </a:r>
-            <a:r>
-              <a:rPr lang="sk-SK" dirty="0" smtClean="0"/>
-              <a:t>alebo</a:t>
+              <a:t>Vyhodnotenie</a:t>
             </a:r>
             <a:r>
               <a:rPr lang="en-US" dirty="0" smtClean="0"/>
@@ -8002,43 +7670,7 @@
             </a:r>
             <a:r>
               <a:rPr lang="sk-SK" dirty="0" smtClean="0"/>
-              <a:t>nezhubný </a:t>
-            </a:r>
-            <a:r>
-              <a:rPr lang="en-US" dirty="0" smtClean="0"/>
-              <a:t>(B)</a:t>
-            </a:r>
-            <a:r>
-              <a:rPr lang="sk-SK" dirty="0" smtClean="0"/>
-              <a:t>. </a:t>
-            </a:r>
-          </a:p>
-          <a:p>
-            <a:r>
-              <a:rPr lang="sk-SK" dirty="0" smtClean="0"/>
-              <a:t>Použitie neurónových sieti na základe hlbokého učenia </a:t>
-            </a:r>
-            <a:r>
-              <a:rPr lang="en-US" dirty="0" smtClean="0"/>
-              <a:t>(Deep learning)</a:t>
-            </a:r>
-          </a:p>
-          <a:p>
-            <a:r>
-              <a:rPr lang="sk-SK" dirty="0" smtClean="0"/>
-              <a:t>Vyhodnotenie</a:t>
-            </a:r>
-            <a:r>
-              <a:rPr lang="en-US" dirty="0" smtClean="0"/>
-              <a:t> v</a:t>
-            </a:r>
-            <a:r>
-              <a:rPr lang="sk-SK" dirty="0" err="1" smtClean="0"/>
-              <a:t>ýsledkov</a:t>
-            </a:r>
-            <a:r>
-              <a:rPr lang="sk-SK" dirty="0" smtClean="0"/>
-              <a:t> </a:t>
+              <a:t>výsledkov </a:t>
             </a:r>
           </a:p>
           <a:p>
@@ -8056,6 +7688,14 @@
   <p:clrMapOvr>
     <a:masterClrMapping/>
   </p:clrMapOvr>
+  <mc:AlternateContent xmlns:mc="http://schemas.openxmlformats.org/markup-compatibility/2006" xmlns:p14="http://schemas.microsoft.com/office/powerpoint/2010/main">
+    <mc:Choice Requires="p14">
+      <p:transition p14:dur="0"/>
+    </mc:Choice>
+    <mc:Fallback xmlns="">
+      <p:transition/>
+    </mc:Fallback>
+  </mc:AlternateContent>
   <p:timing>
     <p:tnLst>
       <p:par>
@@ -8093,119 +7733,139 @@
             <p:ph type="title"/>
           </p:nvPr>
         </p:nvSpPr>
-        <p:spPr/>
+        <p:spPr>
+          <a:xfrm>
+            <a:off x="1295402" y="718815"/>
+            <a:ext cx="9601196" cy="1303867"/>
+          </a:xfrm>
+        </p:spPr>
+        <p:txBody>
+          <a:bodyPr/>
+          <a:lstStyle/>
+          <a:p>
+            <a:r>
+              <a:rPr lang="sk-SK" dirty="0" err="1" smtClean="0"/>
+              <a:t>Dataset</a:t>
+            </a:r>
+            <a:endParaRPr lang="sk-SK" dirty="0"/>
+          </a:p>
+        </p:txBody>
+      </p:sp>
+      <p:sp>
+        <p:nvSpPr>
+          <p:cNvPr id="3" name="Zástupný symbol obsahu 2"/>
+          <p:cNvSpPr>
+            <a:spLocks noGrp="1"/>
+          </p:cNvSpPr>
+          <p:nvPr>
+            <p:ph idx="1"/>
+          </p:nvPr>
+        </p:nvSpPr>
+        <p:spPr>
+          <a:xfrm>
+            <a:off x="802446" y="2419644"/>
+            <a:ext cx="10587108" cy="3713893"/>
+          </a:xfrm>
+        </p:spPr>
         <p:txBody>
           <a:bodyPr>
-            <a:normAutofit fontScale="90000"/>
+            <a:normAutofit/>
           </a:bodyPr>
           <a:lstStyle/>
           <a:p>
             <a:r>
+              <a:rPr lang="sk-SK" dirty="0"/>
+              <a:t>Súbor údajov o rakovine prsníka Wisconsin (</a:t>
+            </a:r>
+            <a:r>
+              <a:rPr lang="sk-SK" dirty="0" err="1"/>
+              <a:t>Diagnostic</a:t>
+            </a:r>
+            <a:r>
+              <a:rPr lang="sk-SK" dirty="0"/>
+              <a:t>) </a:t>
+            </a:r>
+            <a:endParaRPr lang="sk-SK" dirty="0" smtClean="0"/>
+          </a:p>
+          <a:p>
+            <a:r>
               <a:rPr lang="sk-SK" dirty="0" smtClean="0"/>
-              <a:t>Rakovina prsníka a umelé neurónové siete</a:t>
-            </a:r>
-            <a:br>
+              <a:t>Súbor </a:t>
+            </a:r>
+            <a:r>
+              <a:rPr lang="sk-SK" dirty="0"/>
+              <a:t>údajov má rozmer 569 x 32, má 30 reálnych </a:t>
+            </a:r>
+            <a:r>
               <a:rPr lang="sk-SK" dirty="0" smtClean="0"/>
-            </a:br>
+              <a:t>atribútov</a:t>
+            </a:r>
             <a:r>
               <a:rPr lang="en-US" dirty="0" smtClean="0"/>
-              <a:t>(ANN)</a:t>
-            </a:r>
-            <a:endParaRPr lang="sk-SK" dirty="0"/>
-          </a:p>
-        </p:txBody>
-      </p:sp>
-      <p:sp>
-        <p:nvSpPr>
-          <p:cNvPr id="3" name="Zástupný symbol obsahu 2"/>
-          <p:cNvSpPr>
-            <a:spLocks noGrp="1"/>
-          </p:cNvSpPr>
-          <p:nvPr>
-            <p:ph idx="1"/>
-          </p:nvPr>
-        </p:nvSpPr>
-        <p:spPr>
-          <a:xfrm>
-            <a:off x="1295402" y="2447750"/>
-            <a:ext cx="9601196" cy="3318936"/>
-          </a:xfrm>
-        </p:spPr>
-        <p:txBody>
-          <a:bodyPr/>
-          <a:lstStyle/>
-          <a:p>
+              <a:t>, </a:t>
+            </a:r>
+            <a:r>
+              <a:rPr lang="sk-SK" dirty="0" smtClean="0"/>
+              <a:t>jeden </a:t>
+            </a:r>
             <a:r>
               <a:rPr lang="sk-SK" dirty="0"/>
-              <a:t>Rakovina prsníka je druhou </a:t>
-            </a:r>
-            <a:r>
-              <a:rPr lang="sk-SK" dirty="0" smtClean="0"/>
-              <a:t>najčastejšou príčinou </a:t>
-            </a:r>
-            <a:r>
-              <a:rPr lang="sk-SK" dirty="0"/>
-              <a:t>úmrtia žien</a:t>
-            </a:r>
-            <a:r>
-              <a:rPr lang="sk-SK" dirty="0" smtClean="0"/>
-              <a:t>. </a:t>
-            </a:r>
-            <a:r>
-              <a:rPr lang="sk-SK" dirty="0"/>
-              <a:t>Skoršie zistenie, po ktorom nasleduje liečba, môže znížiť </a:t>
-            </a:r>
-            <a:r>
-              <a:rPr lang="sk-SK" dirty="0" smtClean="0"/>
-              <a:t>riziko, alebo zachrániť život. </a:t>
-            </a:r>
-          </a:p>
-          <a:p>
-            <a:r>
-              <a:rPr lang="sk-SK" dirty="0"/>
-              <a:t>Umelé neurónové siete </a:t>
-            </a:r>
-            <a:r>
-              <a:rPr lang="en-US" dirty="0" smtClean="0"/>
-              <a:t>(ANN) s</a:t>
-            </a:r>
-            <a:r>
-              <a:rPr lang="sk-SK" dirty="0" smtClean="0"/>
-              <a:t>ú v oblasti </a:t>
-            </a:r>
-            <a:r>
-              <a:rPr lang="sk-SK" dirty="0"/>
-              <a:t>zdravotnej starostlivosti široko </a:t>
-            </a:r>
-            <a:r>
-              <a:rPr lang="sk-SK" dirty="0" smtClean="0"/>
-              <a:t>rozšírené</a:t>
+              <a:t>číselný atribút (pole id) a jeden kategorický atribút, čo je označenie triedy</a:t>
             </a:r>
             <a:r>
               <a:rPr lang="sk-SK" dirty="0" smtClean="0"/>
               <a:t>.</a:t>
             </a:r>
           </a:p>
+          <a:p>
+            <a:r>
+              <a:rPr lang="sk-SK" dirty="0" smtClean="0"/>
+              <a:t>Obsahuje binárne triedenie, </a:t>
+            </a:r>
+            <a:r>
+              <a:rPr lang="sk-SK" dirty="0"/>
+              <a:t>má dve hodnoty pre diagnózu, ktoré </a:t>
+            </a:r>
+            <a:r>
+              <a:rPr lang="sk-SK" dirty="0" smtClean="0"/>
+              <a:t>sú </a:t>
+            </a:r>
+            <a:r>
+              <a:rPr lang="sk-SK" dirty="0"/>
+              <a:t>M </a:t>
+            </a:r>
+            <a:r>
+              <a:rPr lang="sk-SK" dirty="0" smtClean="0"/>
+              <a:t>(zhubný) </a:t>
+            </a:r>
+            <a:r>
+              <a:rPr lang="sk-SK" dirty="0"/>
+              <a:t>a B </a:t>
+            </a:r>
+            <a:r>
+              <a:rPr lang="sk-SK" dirty="0" smtClean="0"/>
+              <a:t>(nezhubný).</a:t>
+            </a:r>
+          </a:p>
         </p:txBody>
       </p:sp>
       <p:pic>
         <p:nvPicPr>
-          <p:cNvPr id="4" name="Zástupný symbol obsahu 3"/>
+          <p:cNvPr id="5" name="Obrázok 4"/>
           <p:cNvPicPr>
             <a:picLocks noChangeAspect="1"/>
           </p:cNvPicPr>
           <p:nvPr/>
         </p:nvPicPr>
-        <p:blipFill>
-          <a:blip r:embed="rId2"/>
-          <a:stretch>
-            <a:fillRect/>
-          </a:stretch>
+        <p:blipFill rotWithShape="1">
+          <a:blip r:embed="rId3"/>
+          <a:srcRect r="3333"/>
+          <a:stretch/>
         </p:blipFill>
         <p:spPr>
           <a:xfrm>
-            <a:off x="4902486" y="4107218"/>
-            <a:ext cx="4858603" cy="1889900"/>
+            <a:off x="3002088" y="4389738"/>
+            <a:ext cx="6654019" cy="1642571"/>
           </a:xfrm>
           <a:prstGeom prst="roundRect">
             <a:avLst>
@@ -8228,13 +7888,21 @@
     </p:spTree>
     <p:extLst>
       <p:ext uri="{BB962C8B-B14F-4D97-AF65-F5344CB8AC3E}">
-        <p14:creationId xmlns:p14="http://schemas.microsoft.com/office/powerpoint/2010/main" val="1478743616"/>
+        <p14:creationId xmlns:p14="http://schemas.microsoft.com/office/powerpoint/2010/main" val="429421096"/>
       </p:ext>
     </p:extLst>
   </p:cSld>
   <p:clrMapOvr>
     <a:masterClrMapping/>
   </p:clrMapOvr>
+  <mc:AlternateContent xmlns:mc="http://schemas.openxmlformats.org/markup-compatibility/2006" xmlns:p14="http://schemas.microsoft.com/office/powerpoint/2010/main">
+    <mc:Choice Requires="p14">
+      <p:transition p14:dur="0"/>
+    </mc:Choice>
+    <mc:Fallback xmlns="">
+      <p:transition/>
+    </mc:Fallback>
+  </mc:AlternateContent>
   <p:timing>
     <p:tnLst>
       <p:par>
@@ -8272,19 +7940,14 @@
             <p:ph type="title"/>
           </p:nvPr>
         </p:nvSpPr>
-        <p:spPr>
-          <a:xfrm>
-            <a:off x="1295402" y="718815"/>
-            <a:ext cx="9601196" cy="1303867"/>
-          </a:xfrm>
-        </p:spPr>
+        <p:spPr/>
         <p:txBody>
           <a:bodyPr/>
           <a:lstStyle/>
           <a:p>
             <a:r>
-              <a:rPr lang="sk-SK" dirty="0" err="1" smtClean="0"/>
-              <a:t>Dataset</a:t>
+              <a:rPr lang="sk-SK" dirty="0" smtClean="0"/>
+              <a:t>Princíp fungovania neurónovej siete</a:t>
             </a:r>
             <a:endParaRPr lang="sk-SK" dirty="0"/>
           </a:p>
@@ -8292,141 +7955,280 @@
       </p:sp>
       <p:sp>
         <p:nvSpPr>
-          <p:cNvPr id="3" name="Zástupný symbol obsahu 2"/>
-          <p:cNvSpPr>
-            <a:spLocks noGrp="1"/>
-          </p:cNvSpPr>
-          <p:nvPr>
-            <p:ph idx="1"/>
-          </p:nvPr>
-        </p:nvSpPr>
-        <p:spPr>
-          <a:xfrm>
-            <a:off x="802446" y="2419644"/>
-            <a:ext cx="10587108" cy="3713893"/>
-          </a:xfrm>
-        </p:spPr>
-        <p:txBody>
-          <a:bodyPr>
-            <a:normAutofit/>
+          <p:cNvPr id="7" name="Title 1">
+            <a:extLst>
+              <a:ext uri="{FF2B5EF4-FFF2-40B4-BE49-F238E27FC236}">
+                <a16:creationId xmlns:a16="http://schemas.microsoft.com/office/drawing/2014/main" xmlns="" id="{463A027C-73C1-4981-9828-05E25E0A63F0}"/>
+              </a:ext>
+            </a:extLst>
+          </p:cNvPr>
+          <p:cNvSpPr txBox="1">
+            <a:spLocks/>
+          </p:cNvSpPr>
+          <p:nvPr/>
+        </p:nvSpPr>
+        <p:spPr>
+          <a:xfrm>
+            <a:off x="1487302" y="2381533"/>
+            <a:ext cx="8370930" cy="3932775"/>
+          </a:xfrm>
+          <a:prstGeom prst="rect">
+            <a:avLst/>
+          </a:prstGeom>
+          <a:effectLst/>
+        </p:spPr>
+        <p:txBody>
+          <a:bodyPr vert="horz" lIns="91440" tIns="45720" rIns="91440" bIns="45720" rtlCol="0" anchor="ctr">
+            <a:normAutofit fontScale="62500" lnSpcReduction="20000"/>
           </a:bodyPr>
-          <a:lstStyle/>
-          <a:p>
-            <a:r>
-              <a:rPr lang="sk-SK" dirty="0"/>
-              <a:t>Súbor údajov o rakovine prsníka Wisconsin (</a:t>
-            </a:r>
-            <a:r>
-              <a:rPr lang="sk-SK" dirty="0" err="1"/>
-              <a:t>Diagnostic</a:t>
-            </a:r>
-            <a:r>
-              <a:rPr lang="sk-SK" dirty="0"/>
-              <a:t>) bol prevzatý </a:t>
-            </a:r>
+          <a:lstStyle>
+            <a:lvl1pPr algn="ctr" defTabSz="457200" rtl="0" eaLnBrk="1" latinLnBrk="0" hangingPunct="1">
+              <a:spcBef>
+                <a:spcPct val="0"/>
+              </a:spcBef>
+              <a:buNone/>
+              <a:defRPr sz="4400" kern="1200" cap="none">
+                <a:ln w="3175" cmpd="sng">
+                  <a:noFill/>
+                </a:ln>
+                <a:solidFill>
+                  <a:schemeClr val="tx1">
+                    <a:lumMod val="85000"/>
+                    <a:lumOff val="15000"/>
+                  </a:schemeClr>
+                </a:solidFill>
+                <a:effectLst/>
+                <a:latin typeface="+mj-lt"/>
+                <a:ea typeface="+mj-ea"/>
+                <a:cs typeface="+mj-cs"/>
+              </a:defRPr>
+            </a:lvl1pPr>
+            <a:lvl2pPr eaLnBrk="1" hangingPunct="1">
+              <a:defRPr>
+                <a:solidFill>
+                  <a:schemeClr val="tx2"/>
+                </a:solidFill>
+              </a:defRPr>
+            </a:lvl2pPr>
+            <a:lvl3pPr eaLnBrk="1" hangingPunct="1">
+              <a:defRPr>
+                <a:solidFill>
+                  <a:schemeClr val="tx2"/>
+                </a:solidFill>
+              </a:defRPr>
+            </a:lvl3pPr>
+            <a:lvl4pPr eaLnBrk="1" hangingPunct="1">
+              <a:defRPr>
+                <a:solidFill>
+                  <a:schemeClr val="tx2"/>
+                </a:solidFill>
+              </a:defRPr>
+            </a:lvl4pPr>
+            <a:lvl5pPr eaLnBrk="1" hangingPunct="1">
+              <a:defRPr>
+                <a:solidFill>
+                  <a:schemeClr val="tx2"/>
+                </a:solidFill>
+              </a:defRPr>
+            </a:lvl5pPr>
+            <a:lvl6pPr eaLnBrk="1" hangingPunct="1">
+              <a:defRPr>
+                <a:solidFill>
+                  <a:schemeClr val="tx2"/>
+                </a:solidFill>
+              </a:defRPr>
+            </a:lvl6pPr>
+            <a:lvl7pPr eaLnBrk="1" hangingPunct="1">
+              <a:defRPr>
+                <a:solidFill>
+                  <a:schemeClr val="tx2"/>
+                </a:solidFill>
+              </a:defRPr>
+            </a:lvl7pPr>
+            <a:lvl8pPr eaLnBrk="1" hangingPunct="1">
+              <a:defRPr>
+                <a:solidFill>
+                  <a:schemeClr val="tx2"/>
+                </a:solidFill>
+              </a:defRPr>
+            </a:lvl8pPr>
+            <a:lvl9pPr eaLnBrk="1" hangingPunct="1">
+              <a:defRPr>
+                <a:solidFill>
+                  <a:schemeClr val="tx2"/>
+                </a:solidFill>
+              </a:defRPr>
+            </a:lvl9pPr>
+          </a:lstStyle>
+          <a:p>
+            <a:pPr algn="l"/>
+            <a:r>
+              <a:rPr lang="en-US" dirty="0" smtClean="0"/>
+              <a:t/>
+            </a:r>
+            <a:br>
+              <a:rPr lang="en-US" dirty="0" smtClean="0"/>
+            </a:br>
             <a:r>
               <a:rPr lang="sk-SK" dirty="0" smtClean="0"/>
-              <a:t>zo </a:t>
-            </a:r>
-            <a:r>
-              <a:rPr lang="sk-SK" dirty="0"/>
-              <a:t>súťaže </a:t>
-            </a:r>
-            <a:r>
-              <a:rPr lang="sk-SK" dirty="0" err="1" smtClean="0"/>
-              <a:t>Kaggle</a:t>
-            </a:r>
-            <a:endParaRPr lang="sk-SK" dirty="0" smtClean="0"/>
-          </a:p>
-          <a:p>
-            <a:r>
-              <a:rPr lang="sk-SK" dirty="0"/>
-              <a:t>Súbor údajov má rozmer 569 x 32, má 30 reálnych atribútov a jeden číselný atribút (pole id) a jeden kategorický atribút, čo je označenie triedy</a:t>
+              <a:t>Predspracovanie</a:t>
+            </a:r>
+            <a:r>
+              <a:rPr lang="en-US" dirty="0" smtClean="0"/>
+              <a:t> </a:t>
             </a:r>
             <a:r>
               <a:rPr lang="sk-SK" dirty="0" smtClean="0"/>
-              <a:t>.</a:t>
-            </a:r>
-            <a:endParaRPr lang="sk-SK" dirty="0" smtClean="0"/>
-          </a:p>
-          <a:p>
+              <a:t>dát a Inicializácia siet</a:t>
+            </a:r>
+            <a:r>
+              <a:rPr lang="en-US" dirty="0" smtClean="0"/>
+              <a:t>e</a:t>
+            </a:r>
+            <a:br>
+              <a:rPr lang="en-US" dirty="0" smtClean="0"/>
+            </a:br>
+            <a:r>
+              <a:rPr lang="en-US" dirty="0" smtClean="0"/>
+              <a:t>           </a:t>
+            </a:r>
+            <a:r>
+              <a:rPr lang="en-US" sz="2500" dirty="0" smtClean="0"/>
+              <a:t>a) D</a:t>
+            </a:r>
+            <a:r>
+              <a:rPr lang="sk-SK" sz="2500" dirty="0" smtClean="0"/>
+              <a:t>á</a:t>
+            </a:r>
+            <a:r>
+              <a:rPr lang="en-US" sz="2500" dirty="0" smtClean="0"/>
+              <a:t>ta</a:t>
+            </a:r>
+            <a:br>
+              <a:rPr lang="en-US" sz="2500" dirty="0" smtClean="0"/>
+            </a:br>
+            <a:r>
+              <a:rPr lang="en-US" sz="2500" dirty="0" smtClean="0"/>
+              <a:t>                   b) </a:t>
+            </a:r>
+            <a:r>
+              <a:rPr lang="sk-SK" sz="2500" dirty="0" smtClean="0"/>
+              <a:t>Parametre</a:t>
+            </a:r>
+            <a:r>
+              <a:rPr lang="en-US" sz="2500" dirty="0" smtClean="0"/>
+              <a:t/>
+            </a:r>
+            <a:br>
+              <a:rPr lang="en-US" sz="2500" dirty="0" smtClean="0"/>
+            </a:br>
+            <a:r>
+              <a:rPr lang="en-US" sz="2500" dirty="0" smtClean="0"/>
+              <a:t>                   </a:t>
+            </a:r>
+            <a:r>
+              <a:rPr lang="sk-SK" sz="2500" dirty="0" smtClean="0"/>
+              <a:t>c</a:t>
+            </a:r>
+            <a:r>
+              <a:rPr lang="en-US" sz="2500" dirty="0" smtClean="0"/>
+              <a:t>) </a:t>
+            </a:r>
+            <a:r>
+              <a:rPr lang="sk-SK" sz="2500" dirty="0" smtClean="0"/>
+              <a:t>Váhy</a:t>
+            </a:r>
+            <a:r>
+              <a:rPr lang="en-US" sz="2500" dirty="0" smtClean="0"/>
+              <a:t/>
+            </a:r>
+            <a:br>
+              <a:rPr lang="en-US" sz="2500" dirty="0" smtClean="0"/>
+            </a:br>
             <a:r>
               <a:rPr lang="sk-SK" dirty="0" smtClean="0"/>
-              <a:t>Obsahuje binárne triedenie, </a:t>
-            </a:r>
-            <a:r>
-              <a:rPr lang="sk-SK" dirty="0"/>
-              <a:t>má dve hodnoty pre diagnózu, ktoré </a:t>
-            </a:r>
+              <a:t>Trénovanie</a:t>
+            </a:r>
+            <a:r>
+              <a:rPr lang="en-US" dirty="0" smtClean="0"/>
+              <a:t/>
+            </a:r>
+            <a:br>
+              <a:rPr lang="en-US" dirty="0" smtClean="0"/>
+            </a:br>
+            <a:r>
+              <a:rPr lang="en-US" dirty="0" smtClean="0"/>
+              <a:t>           </a:t>
+            </a:r>
+            <a:r>
+              <a:rPr lang="en-US" sz="2500" dirty="0" smtClean="0"/>
+              <a:t>a) Forward Propagation </a:t>
+            </a:r>
+            <a:br>
+              <a:rPr lang="en-US" sz="2500" dirty="0" smtClean="0"/>
+            </a:br>
+            <a:r>
+              <a:rPr lang="en-US" sz="2500" dirty="0" smtClean="0"/>
+              <a:t>                   b) Backward Propagation </a:t>
+            </a:r>
+            <a:br>
+              <a:rPr lang="en-US" sz="2500" dirty="0" smtClean="0"/>
+            </a:br>
+            <a:r>
+              <a:rPr lang="en-US" sz="2500" dirty="0" smtClean="0"/>
+              <a:t>                   c) </a:t>
+            </a:r>
+            <a:r>
+              <a:rPr lang="sk-SK" sz="2500" dirty="0" smtClean="0"/>
+              <a:t>Aktualizácia váh</a:t>
+            </a:r>
+            <a:r>
+              <a:rPr lang="en-US" dirty="0" smtClean="0"/>
+              <a:t/>
+            </a:r>
+            <a:br>
+              <a:rPr lang="en-US" dirty="0" smtClean="0"/>
+            </a:br>
             <a:r>
               <a:rPr lang="sk-SK" dirty="0" smtClean="0"/>
-              <a:t>sú </a:t>
-            </a:r>
-            <a:r>
-              <a:rPr lang="sk-SK" dirty="0"/>
-              <a:t>M </a:t>
-            </a:r>
-            <a:r>
-              <a:rPr lang="sk-SK" dirty="0" smtClean="0"/>
-              <a:t>(zhubný) </a:t>
-            </a:r>
-            <a:r>
-              <a:rPr lang="sk-SK" dirty="0"/>
-              <a:t>a B </a:t>
-            </a:r>
-            <a:r>
-              <a:rPr lang="sk-SK" dirty="0" smtClean="0"/>
-              <a:t>(nezhubný).</a:t>
-            </a:r>
-          </a:p>
-        </p:txBody>
-      </p:sp>
-      <p:pic>
-        <p:nvPicPr>
-          <p:cNvPr id="5" name="Obrázok 4"/>
-          <p:cNvPicPr>
-            <a:picLocks noChangeAspect="1"/>
-          </p:cNvPicPr>
-          <p:nvPr/>
-        </p:nvPicPr>
-        <p:blipFill rotWithShape="1">
-          <a:blip r:embed="rId3"/>
-          <a:srcRect r="3333"/>
-          <a:stretch/>
-        </p:blipFill>
-        <p:spPr>
-          <a:xfrm>
-            <a:off x="4557932" y="4608103"/>
-            <a:ext cx="6654019" cy="1525434"/>
-          </a:xfrm>
-          <a:prstGeom prst="roundRect">
-            <a:avLst>
-              <a:gd name="adj" fmla="val 8594"/>
-            </a:avLst>
-          </a:prstGeom>
-          <a:solidFill>
-            <a:srgbClr val="FFFFFF">
-              <a:shade val="85000"/>
-            </a:srgbClr>
-          </a:solidFill>
-          <a:ln>
-            <a:noFill/>
-          </a:ln>
-          <a:effectLst>
-            <a:reflection blurRad="12700" stA="38000" endPos="28000" dist="5000" dir="5400000" sy="-100000" algn="bl" rotWithShape="0"/>
-          </a:effectLst>
-        </p:spPr>
-      </p:pic>
+              <a:t>Testovanie a vyhodnotenie</a:t>
+            </a:r>
+            <a:r>
+              <a:rPr lang="en-US" dirty="0" smtClean="0"/>
+              <a:t/>
+            </a:r>
+            <a:br>
+              <a:rPr lang="en-US" dirty="0" smtClean="0"/>
+            </a:br>
+            <a:r>
+              <a:rPr lang="en-US" dirty="0" smtClean="0"/>
+              <a:t/>
+            </a:r>
+            <a:br>
+              <a:rPr lang="en-US" dirty="0" smtClean="0"/>
+            </a:br>
+            <a:endParaRPr lang="en-US" dirty="0"/>
+          </a:p>
+        </p:txBody>
+      </p:sp>
     </p:spTree>
     <p:extLst>
       <p:ext uri="{BB962C8B-B14F-4D97-AF65-F5344CB8AC3E}">
-        <p14:creationId xmlns:p14="http://schemas.microsoft.com/office/powerpoint/2010/main" val="429421096"/>
+        <p14:creationId xmlns:p14="http://schemas.microsoft.com/office/powerpoint/2010/main" val="4095939006"/>
       </p:ext>
     </p:extLst>
   </p:cSld>
   <p:clrMapOvr>
     <a:masterClrMapping/>
   </p:clrMapOvr>
+  <mc:AlternateContent xmlns:mc="http://schemas.openxmlformats.org/markup-compatibility/2006" xmlns:p14="http://schemas.microsoft.com/office/powerpoint/2010/main">
+    <mc:Choice Requires="p14">
+      <p:transition p14:dur="0"/>
+    </mc:Choice>
+    <mc:Fallback xmlns="">
+      <p:transition/>
+    </mc:Fallback>
+  </mc:AlternateContent>
   <p:timing>
     <p:tnLst>
       <p:par>
@@ -8470,266 +8272,70 @@
           <a:lstStyle/>
           <a:p>
             <a:r>
+              <a:rPr lang="sk-SK" dirty="0"/>
+              <a:t>Forward </a:t>
+            </a:r>
+            <a:r>
+              <a:rPr lang="sk-SK" dirty="0" err="1"/>
+              <a:t>Propagation</a:t>
+            </a:r>
+            <a:endParaRPr lang="sk-SK" dirty="0"/>
+          </a:p>
+        </p:txBody>
+      </p:sp>
+      <p:sp>
+        <p:nvSpPr>
+          <p:cNvPr id="3" name="Zástupný symbol obsahu 2"/>
+          <p:cNvSpPr>
+            <a:spLocks noGrp="1"/>
+          </p:cNvSpPr>
+          <p:nvPr>
+            <p:ph idx="1"/>
+          </p:nvPr>
+        </p:nvSpPr>
+        <p:spPr/>
+        <p:txBody>
+          <a:bodyPr/>
+          <a:lstStyle/>
+          <a:p>
+            <a:r>
               <a:rPr lang="sk-SK" dirty="0" smtClean="0"/>
-              <a:t>Princíp fungovania našej </a:t>
+              <a:t>Forward </a:t>
+            </a:r>
+            <a:r>
+              <a:rPr lang="sk-SK" dirty="0" err="1"/>
+              <a:t>Propagation</a:t>
+            </a:r>
+            <a:r>
+              <a:rPr lang="sk-SK" dirty="0"/>
+              <a:t> je prvým krokom </a:t>
             </a:r>
             <a:r>
               <a:rPr lang="sk-SK" dirty="0" smtClean="0"/>
-              <a:t>neurónovej siete</a:t>
-            </a:r>
-            <a:endParaRPr lang="sk-SK" dirty="0"/>
-          </a:p>
-        </p:txBody>
-      </p:sp>
-      <p:sp>
-        <p:nvSpPr>
-          <p:cNvPr id="7" name="Title 1">
-            <a:extLst>
-              <a:ext uri="{FF2B5EF4-FFF2-40B4-BE49-F238E27FC236}">
-                <a16:creationId xmlns:a16="http://schemas.microsoft.com/office/drawing/2014/main" xmlns="" id="{463A027C-73C1-4981-9828-05E25E0A63F0}"/>
-              </a:ext>
-            </a:extLst>
-          </p:cNvPr>
-          <p:cNvSpPr txBox="1">
-            <a:spLocks/>
-          </p:cNvSpPr>
-          <p:nvPr/>
-        </p:nvSpPr>
-        <p:spPr>
-          <a:xfrm>
-            <a:off x="892074" y="2395181"/>
-            <a:ext cx="8370930" cy="3932775"/>
-          </a:xfrm>
-          <a:prstGeom prst="rect">
-            <a:avLst/>
-          </a:prstGeom>
-          <a:effectLst/>
-        </p:spPr>
-        <p:txBody>
-          <a:bodyPr vert="horz" lIns="91440" tIns="45720" rIns="91440" bIns="45720" rtlCol="0" anchor="ctr">
-            <a:normAutofit fontScale="62500" lnSpcReduction="20000"/>
-          </a:bodyPr>
-          <a:lstStyle>
-            <a:lvl1pPr algn="ctr" defTabSz="457200" rtl="0" eaLnBrk="1" latinLnBrk="0" hangingPunct="1">
-              <a:spcBef>
-                <a:spcPct val="0"/>
-              </a:spcBef>
-              <a:buNone/>
-              <a:defRPr sz="4400" kern="1200" cap="none">
-                <a:ln w="3175" cmpd="sng">
-                  <a:noFill/>
-                </a:ln>
-                <a:solidFill>
-                  <a:schemeClr val="tx1">
-                    <a:lumMod val="85000"/>
-                    <a:lumOff val="15000"/>
-                  </a:schemeClr>
-                </a:solidFill>
-                <a:effectLst/>
-                <a:latin typeface="+mj-lt"/>
-                <a:ea typeface="+mj-ea"/>
-                <a:cs typeface="+mj-cs"/>
-              </a:defRPr>
-            </a:lvl1pPr>
-            <a:lvl2pPr eaLnBrk="1" hangingPunct="1">
-              <a:defRPr>
-                <a:solidFill>
-                  <a:schemeClr val="tx2"/>
-                </a:solidFill>
-              </a:defRPr>
-            </a:lvl2pPr>
-            <a:lvl3pPr eaLnBrk="1" hangingPunct="1">
-              <a:defRPr>
-                <a:solidFill>
-                  <a:schemeClr val="tx2"/>
-                </a:solidFill>
-              </a:defRPr>
-            </a:lvl3pPr>
-            <a:lvl4pPr eaLnBrk="1" hangingPunct="1">
-              <a:defRPr>
-                <a:solidFill>
-                  <a:schemeClr val="tx2"/>
-                </a:solidFill>
-              </a:defRPr>
-            </a:lvl4pPr>
-            <a:lvl5pPr eaLnBrk="1" hangingPunct="1">
-              <a:defRPr>
-                <a:solidFill>
-                  <a:schemeClr val="tx2"/>
-                </a:solidFill>
-              </a:defRPr>
-            </a:lvl5pPr>
-            <a:lvl6pPr eaLnBrk="1" hangingPunct="1">
-              <a:defRPr>
-                <a:solidFill>
-                  <a:schemeClr val="tx2"/>
-                </a:solidFill>
-              </a:defRPr>
-            </a:lvl6pPr>
-            <a:lvl7pPr eaLnBrk="1" hangingPunct="1">
-              <a:defRPr>
-                <a:solidFill>
-                  <a:schemeClr val="tx2"/>
-                </a:solidFill>
-              </a:defRPr>
-            </a:lvl7pPr>
-            <a:lvl8pPr eaLnBrk="1" hangingPunct="1">
-              <a:defRPr>
-                <a:solidFill>
-                  <a:schemeClr val="tx2"/>
-                </a:solidFill>
-              </a:defRPr>
-            </a:lvl8pPr>
-            <a:lvl9pPr eaLnBrk="1" hangingPunct="1">
-              <a:defRPr>
-                <a:solidFill>
-                  <a:schemeClr val="tx2"/>
-                </a:solidFill>
-              </a:defRPr>
-            </a:lvl9pPr>
-          </a:lstStyle>
-          <a:p>
-            <a:pPr algn="l"/>
-            <a:r>
-              <a:rPr lang="en-US" dirty="0" smtClean="0"/>
-              <a:t/>
-            </a:r>
-            <a:br>
-              <a:rPr lang="en-US" dirty="0" smtClean="0"/>
-            </a:br>
+              <a:t>ku </a:t>
+            </a:r>
+            <a:r>
+              <a:rPr lang="sk-SK" dirty="0"/>
+              <a:t>tréningu siete, </a:t>
+            </a:r>
             <a:r>
               <a:rPr lang="sk-SK" dirty="0" smtClean="0"/>
-              <a:t>Inicializácia </a:t>
+              <a:t>ktorý </a:t>
+            </a:r>
+            <a:r>
+              <a:rPr lang="sk-SK" dirty="0"/>
+              <a:t>znásobuje vstupný uzol váhami a má aktivačnú </a:t>
             </a:r>
             <a:r>
               <a:rPr lang="sk-SK" dirty="0" smtClean="0"/>
-              <a:t>siet</a:t>
-            </a:r>
-            <a:r>
-              <a:rPr lang="en-US" dirty="0" smtClean="0"/>
-              <a:t>e</a:t>
-            </a:r>
-            <a:br>
-              <a:rPr lang="en-US" dirty="0" smtClean="0"/>
-            </a:br>
-            <a:r>
-              <a:rPr lang="en-US" dirty="0" smtClean="0"/>
-              <a:t>           </a:t>
-            </a:r>
-            <a:r>
-              <a:rPr lang="en-US" sz="2500" dirty="0" smtClean="0"/>
-              <a:t>a)  Data</a:t>
-            </a:r>
-            <a:br>
-              <a:rPr lang="en-US" sz="2500" dirty="0" smtClean="0"/>
-            </a:br>
-            <a:r>
-              <a:rPr lang="en-US" sz="2500" dirty="0" smtClean="0"/>
-              <a:t>                   b) </a:t>
-            </a:r>
-            <a:r>
-              <a:rPr lang="sk-SK" sz="2500" dirty="0" smtClean="0"/>
-              <a:t>Parametre</a:t>
-            </a:r>
-            <a:r>
-              <a:rPr lang="en-US" sz="2500" dirty="0" smtClean="0"/>
-              <a:t/>
-            </a:r>
-            <a:br>
-              <a:rPr lang="en-US" sz="2500" dirty="0" smtClean="0"/>
-            </a:br>
-            <a:r>
-              <a:rPr lang="en-US" sz="2500" dirty="0" smtClean="0"/>
-              <a:t>                   </a:t>
-            </a:r>
-            <a:r>
-              <a:rPr lang="sk-SK" sz="2500" dirty="0" smtClean="0"/>
-              <a:t>c</a:t>
-            </a:r>
-            <a:r>
-              <a:rPr lang="en-US" sz="2500" dirty="0" smtClean="0"/>
-              <a:t>) </a:t>
-            </a:r>
-            <a:r>
-              <a:rPr lang="sk-SK" sz="2500" dirty="0" smtClean="0"/>
-              <a:t>Váhy</a:t>
-            </a:r>
-            <a:r>
-              <a:rPr lang="en-US" sz="2500" dirty="0" smtClean="0"/>
-              <a:t/>
-            </a:r>
-            <a:br>
-              <a:rPr lang="en-US" sz="2500" dirty="0" smtClean="0"/>
-            </a:br>
-            <a:r>
-              <a:rPr lang="sk-SK" dirty="0" smtClean="0"/>
-              <a:t>Trénovanie</a:t>
-            </a:r>
-            <a:r>
-              <a:rPr lang="en-US" dirty="0" smtClean="0"/>
-              <a:t/>
-            </a:r>
-            <a:br>
-              <a:rPr lang="en-US" dirty="0" smtClean="0"/>
-            </a:br>
-            <a:r>
-              <a:rPr lang="en-US" dirty="0" smtClean="0"/>
-              <a:t>           </a:t>
-            </a:r>
-            <a:r>
-              <a:rPr lang="en-US" sz="2500" dirty="0" smtClean="0"/>
-              <a:t>a) Forward Propagation </a:t>
-            </a:r>
-            <a:br>
-              <a:rPr lang="en-US" sz="2500" dirty="0" smtClean="0"/>
-            </a:br>
-            <a:r>
-              <a:rPr lang="en-US" sz="2500" dirty="0" smtClean="0"/>
-              <a:t>                   b) Backward Propagation </a:t>
-            </a:r>
-            <a:br>
-              <a:rPr lang="en-US" sz="2500" dirty="0" smtClean="0"/>
-            </a:br>
-            <a:r>
-              <a:rPr lang="en-US" sz="2500" dirty="0" smtClean="0"/>
-              <a:t>                   c) </a:t>
-            </a:r>
-            <a:r>
-              <a:rPr lang="sk-SK" sz="2500" dirty="0" smtClean="0"/>
-              <a:t>Aktualizácia váh</a:t>
-            </a:r>
-            <a:r>
-              <a:rPr lang="en-US" dirty="0" smtClean="0"/>
-              <a:t/>
-            </a:r>
-            <a:br>
-              <a:rPr lang="en-US" dirty="0" smtClean="0"/>
-            </a:br>
-            <a:r>
-              <a:rPr lang="sk-SK" dirty="0" smtClean="0"/>
-              <a:t>Testovanie a vyhodnotenie</a:t>
-            </a:r>
-            <a:r>
-              <a:rPr lang="en-US" dirty="0" smtClean="0"/>
-              <a:t/>
-            </a:r>
-            <a:br>
-              <a:rPr lang="en-US" dirty="0" smtClean="0"/>
-            </a:br>
-            <a:r>
-              <a:rPr lang="en-US" dirty="0" smtClean="0"/>
-              <a:t/>
-            </a:r>
-            <a:br>
-              <a:rPr lang="en-US" dirty="0" smtClean="0"/>
-            </a:br>
-            <a:endParaRPr lang="en-US" dirty="0"/>
+              <a:t>funkciu. </a:t>
+            </a:r>
           </a:p>
         </p:txBody>
       </p:sp>
       <p:pic>
         <p:nvPicPr>
-          <p:cNvPr id="9" name="Obrázok 8"/>
+          <p:cNvPr id="6" name="Obrázok 5"/>
           <p:cNvPicPr>
             <a:picLocks noChangeAspect="1"/>
           </p:cNvPicPr>
@@ -8743,8 +8349,8 @@
         </p:blipFill>
         <p:spPr>
           <a:xfrm>
-            <a:off x="5153080" y="2695788"/>
-            <a:ext cx="4513251" cy="2654134"/>
+            <a:off x="3801992" y="3427575"/>
+            <a:ext cx="4588013" cy="2448293"/>
           </a:xfrm>
           <a:prstGeom prst="rect">
             <a:avLst/>
@@ -8754,13 +8360,21 @@
     </p:spTree>
     <p:extLst>
       <p:ext uri="{BB962C8B-B14F-4D97-AF65-F5344CB8AC3E}">
-        <p14:creationId xmlns:p14="http://schemas.microsoft.com/office/powerpoint/2010/main" val="4095939006"/>
+        <p14:creationId xmlns:p14="http://schemas.microsoft.com/office/powerpoint/2010/main" val="3386855280"/>
       </p:ext>
     </p:extLst>
   </p:cSld>
   <p:clrMapOvr>
     <a:masterClrMapping/>
   </p:clrMapOvr>
+  <mc:AlternateContent xmlns:mc="http://schemas.openxmlformats.org/markup-compatibility/2006" xmlns:p14="http://schemas.microsoft.com/office/powerpoint/2010/main">
+    <mc:Choice Requires="p14">
+      <p:transition p14:dur="0"/>
+    </mc:Choice>
+    <mc:Fallback xmlns="">
+      <p:transition/>
+    </mc:Fallback>
+  </mc:AlternateContent>
   <p:timing>
     <p:tnLst>
       <p:par>
@@ -8804,74 +8418,77 @@
           <a:lstStyle/>
           <a:p>
             <a:r>
+              <a:rPr lang="sk-SK" dirty="0" smtClean="0"/>
+              <a:t>Použitá aktivačná funkcia</a:t>
+            </a:r>
+            <a:endParaRPr lang="sk-SK" dirty="0"/>
+          </a:p>
+        </p:txBody>
+      </p:sp>
+      <p:sp>
+        <p:nvSpPr>
+          <p:cNvPr id="3" name="Zástupný symbol obsahu 2"/>
+          <p:cNvSpPr>
+            <a:spLocks noGrp="1"/>
+          </p:cNvSpPr>
+          <p:nvPr>
+            <p:ph idx="1"/>
+          </p:nvPr>
+        </p:nvSpPr>
+        <p:spPr/>
+        <p:txBody>
+          <a:bodyPr/>
+          <a:lstStyle/>
+          <a:p>
+            <a:r>
               <a:rPr lang="sk-SK" dirty="0"/>
-              <a:t>Forward </a:t>
-            </a:r>
-            <a:r>
-              <a:rPr lang="sk-SK" dirty="0" err="1"/>
-              <a:t>Propagation</a:t>
+              <a:t>Ako </a:t>
+            </a:r>
+            <a:r>
+              <a:rPr lang="sk-SK" dirty="0" smtClean="0"/>
+              <a:t>aktivačná </a:t>
+            </a:r>
+            <a:r>
+              <a:rPr lang="sk-SK" dirty="0"/>
+              <a:t>funkciu </a:t>
+            </a:r>
+            <a:r>
+              <a:rPr lang="sk-SK" dirty="0" smtClean="0"/>
+              <a:t>bola použitá </a:t>
+            </a:r>
+            <a:r>
+              <a:rPr lang="sk-SK" dirty="0" err="1" smtClean="0"/>
+              <a:t>sigmoidná</a:t>
+            </a:r>
+            <a:r>
+              <a:rPr lang="sk-SK" dirty="0" smtClean="0"/>
+              <a:t> funkcia.</a:t>
+            </a:r>
+          </a:p>
+          <a:p>
+            <a:r>
+              <a:rPr lang="sk-SK" dirty="0"/>
+              <a:t>Akonáhle aplikujeme váhy na vstupy, </a:t>
+            </a:r>
+            <a:r>
+              <a:rPr lang="sk-SK" dirty="0" smtClean="0"/>
+              <a:t>potom </a:t>
+            </a:r>
+            <a:r>
+              <a:rPr lang="sk-SK" dirty="0"/>
+              <a:t>musíme použiť aktivačnú </a:t>
+            </a:r>
+            <a:r>
+              <a:rPr lang="sk-SK" dirty="0" smtClean="0"/>
+              <a:t>funkciu.</a:t>
+            </a:r>
+          </a:p>
+          <a:p>
+            <a:r>
+              <a:rPr lang="sk-SK" dirty="0" smtClean="0"/>
+              <a:t>Nutnosť použitia kvôli binárnej klasifikácii.</a:t>
             </a:r>
             <a:endParaRPr lang="sk-SK" dirty="0"/>
-          </a:p>
-        </p:txBody>
-      </p:sp>
-      <p:sp>
-        <p:nvSpPr>
-          <p:cNvPr id="3" name="Zástupný symbol obsahu 2"/>
-          <p:cNvSpPr>
-            <a:spLocks noGrp="1"/>
-          </p:cNvSpPr>
-          <p:nvPr>
-            <p:ph idx="1"/>
-          </p:nvPr>
-        </p:nvSpPr>
-        <p:spPr/>
-        <p:txBody>
-          <a:bodyPr/>
-          <a:lstStyle/>
-          <a:p>
-            <a:r>
-              <a:rPr lang="sk-SK" dirty="0" smtClean="0"/>
-              <a:t>Forward </a:t>
-            </a:r>
-            <a:r>
-              <a:rPr lang="sk-SK" dirty="0" err="1"/>
-              <a:t>Propagation</a:t>
-            </a:r>
-            <a:r>
-              <a:rPr lang="sk-SK" dirty="0"/>
-              <a:t> je prvým krokom </a:t>
-            </a:r>
-            <a:r>
-              <a:rPr lang="sk-SK" dirty="0" smtClean="0"/>
-              <a:t>ku </a:t>
-            </a:r>
-            <a:r>
-              <a:rPr lang="sk-SK" dirty="0"/>
-              <a:t>tréningu siete, </a:t>
-            </a:r>
-            <a:r>
-              <a:rPr lang="sk-SK" dirty="0" smtClean="0"/>
-              <a:t>ktorý </a:t>
-            </a:r>
-            <a:r>
-              <a:rPr lang="sk-SK" dirty="0"/>
-              <a:t>znásobuje vstupný uzol váhami a má aktivačnú </a:t>
-            </a:r>
-            <a:r>
-              <a:rPr lang="sk-SK" dirty="0" smtClean="0"/>
-              <a:t>funkciu. </a:t>
-            </a:r>
-          </a:p>
-          <a:p>
-            <a:r>
-              <a:rPr lang="sk-SK" dirty="0" smtClean="0"/>
-              <a:t>Výpočty </a:t>
-            </a:r>
-            <a:r>
-              <a:rPr lang="sk-SK" dirty="0"/>
-              <a:t>sa vykonali takto:</a:t>
-            </a:r>
           </a:p>
         </p:txBody>
       </p:sp>
@@ -8891,8 +8508,8 @@
         </p:blipFill>
         <p:spPr>
           <a:xfrm>
-            <a:off x="1628557" y="3973521"/>
-            <a:ext cx="2364631" cy="1902347"/>
+            <a:off x="7734591" y="3506873"/>
+            <a:ext cx="2867135" cy="1445665"/>
           </a:xfrm>
           <a:prstGeom prst="rect">
             <a:avLst/>
@@ -8901,349 +8518,85 @@
       </p:pic>
       <p:sp>
         <p:nvSpPr>
-          <p:cNvPr id="7" name="Zástupný symbol obsahu 2"/>
-          <p:cNvSpPr txBox="1">
-            <a:spLocks/>
-          </p:cNvSpPr>
+          <p:cNvPr id="5" name="BlokTextu 4"/>
+          <p:cNvSpPr txBox="1"/>
           <p:nvPr/>
         </p:nvSpPr>
         <p:spPr>
           <a:xfrm>
-            <a:off x="5431809" y="3626874"/>
-            <a:ext cx="6545236" cy="1730379"/>
+            <a:off x="8619402" y="4952538"/>
+            <a:ext cx="4093600" cy="923330"/>
           </a:xfrm>
           <a:prstGeom prst="rect">
             <a:avLst/>
           </a:prstGeom>
-        </p:spPr>
-        <p:txBody>
-          <a:bodyPr vert="horz" lIns="91440" tIns="45720" rIns="91440" bIns="45720" rtlCol="0" anchor="t">
-            <a:normAutofit fontScale="85000" lnSpcReduction="20000"/>
+          <a:noFill/>
+        </p:spPr>
+        <p:txBody>
+          <a:bodyPr wrap="square" rtlCol="0">
+            <a:spAutoFit/>
           </a:bodyPr>
-          <a:lstStyle>
-            <a:lvl1pPr marL="285750" indent="-285750" algn="l" defTabSz="457200" rtl="0" eaLnBrk="1" latinLnBrk="0" hangingPunct="1">
-              <a:spcBef>
-                <a:spcPct val="20000"/>
-              </a:spcBef>
-              <a:spcAft>
-                <a:spcPts val="600"/>
-              </a:spcAft>
-              <a:buClr>
-                <a:schemeClr val="accent1"/>
-              </a:buClr>
-              <a:buSzPct val="115000"/>
-              <a:buFont typeface="Arial"/>
-              <a:buChar char="•"/>
-              <a:defRPr sz="2400" kern="1200" cap="none">
-                <a:solidFill>
-                  <a:schemeClr val="tx1">
-                    <a:lumMod val="85000"/>
-                    <a:lumOff val="15000"/>
-                  </a:schemeClr>
-                </a:solidFill>
-                <a:effectLst/>
-                <a:latin typeface="+mn-lt"/>
-                <a:ea typeface="+mn-ea"/>
-                <a:cs typeface="+mn-cs"/>
-              </a:defRPr>
-            </a:lvl1pPr>
-            <a:lvl2pPr marL="742950" indent="-285750" algn="l" defTabSz="457200" rtl="0" eaLnBrk="1" latinLnBrk="0" hangingPunct="1">
-              <a:spcBef>
-                <a:spcPct val="20000"/>
-              </a:spcBef>
-              <a:spcAft>
-                <a:spcPts val="600"/>
-              </a:spcAft>
-              <a:buClr>
-                <a:schemeClr val="accent1"/>
-              </a:buClr>
-              <a:buSzPct val="115000"/>
-              <a:buFont typeface="Arial"/>
-              <a:buChar char="•"/>
-              <a:defRPr sz="2000" kern="1200" cap="none">
-                <a:solidFill>
-                  <a:schemeClr val="tx1">
-                    <a:lumMod val="85000"/>
-                    <a:lumOff val="15000"/>
-                  </a:schemeClr>
-                </a:solidFill>
-                <a:effectLst/>
-                <a:latin typeface="+mn-lt"/>
-                <a:ea typeface="+mn-ea"/>
-                <a:cs typeface="+mn-cs"/>
-              </a:defRPr>
-            </a:lvl2pPr>
-            <a:lvl3pPr marL="1200150" indent="-285750" algn="l" defTabSz="457200" rtl="0" eaLnBrk="1" latinLnBrk="0" hangingPunct="1">
-              <a:spcBef>
-                <a:spcPct val="20000"/>
-              </a:spcBef>
-              <a:spcAft>
-                <a:spcPts val="600"/>
-              </a:spcAft>
-              <a:buClr>
-                <a:schemeClr val="accent1"/>
-              </a:buClr>
-              <a:buSzPct val="115000"/>
-              <a:buFont typeface="Arial"/>
-              <a:buChar char="•"/>
-              <a:defRPr sz="1800" kern="1200" cap="none">
-                <a:solidFill>
-                  <a:schemeClr val="tx1">
-                    <a:lumMod val="85000"/>
-                    <a:lumOff val="15000"/>
-                  </a:schemeClr>
-                </a:solidFill>
-                <a:effectLst/>
-                <a:latin typeface="+mn-lt"/>
-                <a:ea typeface="+mn-ea"/>
-                <a:cs typeface="+mn-cs"/>
-              </a:defRPr>
-            </a:lvl3pPr>
-            <a:lvl4pPr marL="1543050" indent="-171450" algn="l" defTabSz="457200" rtl="0" eaLnBrk="1" latinLnBrk="0" hangingPunct="1">
-              <a:spcBef>
-                <a:spcPct val="20000"/>
-              </a:spcBef>
-              <a:spcAft>
-                <a:spcPts val="600"/>
-              </a:spcAft>
-              <a:buClr>
-                <a:schemeClr val="accent1"/>
-              </a:buClr>
-              <a:buSzPct val="115000"/>
-              <a:buFont typeface="Arial"/>
-              <a:buChar char="•"/>
-              <a:defRPr sz="1600" kern="1200" cap="none">
-                <a:solidFill>
-                  <a:schemeClr val="tx1">
-                    <a:lumMod val="85000"/>
-                    <a:lumOff val="15000"/>
-                  </a:schemeClr>
-                </a:solidFill>
-                <a:effectLst/>
-                <a:latin typeface="+mn-lt"/>
-                <a:ea typeface="+mn-ea"/>
-                <a:cs typeface="+mn-cs"/>
-              </a:defRPr>
-            </a:lvl4pPr>
-            <a:lvl5pPr marL="2000250" indent="-171450" algn="l" defTabSz="457200" rtl="0" eaLnBrk="1" latinLnBrk="0" hangingPunct="1">
-              <a:spcBef>
-                <a:spcPct val="20000"/>
-              </a:spcBef>
-              <a:spcAft>
-                <a:spcPts val="600"/>
-              </a:spcAft>
-              <a:buClr>
-                <a:schemeClr val="accent1"/>
-              </a:buClr>
-              <a:buSzPct val="115000"/>
-              <a:buFont typeface="Arial"/>
-              <a:buChar char="•"/>
-              <a:defRPr sz="1400" kern="1200" cap="none">
-                <a:solidFill>
-                  <a:schemeClr val="tx1">
-                    <a:lumMod val="85000"/>
-                    <a:lumOff val="15000"/>
-                  </a:schemeClr>
-                </a:solidFill>
-                <a:effectLst/>
-                <a:latin typeface="+mn-lt"/>
-                <a:ea typeface="+mn-ea"/>
-                <a:cs typeface="+mn-cs"/>
-              </a:defRPr>
-            </a:lvl5pPr>
-            <a:lvl6pPr marL="2514600" indent="-228600" algn="l" defTabSz="457200" rtl="0" eaLnBrk="1" latinLnBrk="0" hangingPunct="1">
-              <a:spcBef>
-                <a:spcPct val="20000"/>
-              </a:spcBef>
-              <a:spcAft>
-                <a:spcPts val="600"/>
-              </a:spcAft>
-              <a:buClr>
-                <a:schemeClr val="accent1"/>
-              </a:buClr>
-              <a:buSzPct val="115000"/>
-              <a:buFont typeface="Arial"/>
-              <a:buChar char="•"/>
-              <a:defRPr sz="1400" kern="1200" cap="none">
-                <a:solidFill>
-                  <a:schemeClr val="tx1">
-                    <a:lumMod val="85000"/>
-                    <a:lumOff val="15000"/>
-                  </a:schemeClr>
-                </a:solidFill>
-                <a:effectLst/>
-                <a:latin typeface="+mn-lt"/>
-                <a:ea typeface="+mn-ea"/>
-                <a:cs typeface="+mn-cs"/>
-              </a:defRPr>
-            </a:lvl6pPr>
-            <a:lvl7pPr marL="2971800" indent="-228600" algn="l" defTabSz="457200" rtl="0" eaLnBrk="1" latinLnBrk="0" hangingPunct="1">
-              <a:spcBef>
-                <a:spcPct val="20000"/>
-              </a:spcBef>
-              <a:spcAft>
-                <a:spcPts val="600"/>
-              </a:spcAft>
-              <a:buClr>
-                <a:schemeClr val="accent1"/>
-              </a:buClr>
-              <a:buSzPct val="115000"/>
-              <a:buFont typeface="Arial"/>
-              <a:buChar char="•"/>
-              <a:defRPr sz="1400" kern="1200" cap="none">
-                <a:solidFill>
-                  <a:schemeClr val="tx1">
-                    <a:lumMod val="85000"/>
-                    <a:lumOff val="15000"/>
-                  </a:schemeClr>
-                </a:solidFill>
-                <a:effectLst/>
-                <a:latin typeface="+mn-lt"/>
-                <a:ea typeface="+mn-ea"/>
-                <a:cs typeface="+mn-cs"/>
-              </a:defRPr>
-            </a:lvl7pPr>
-            <a:lvl8pPr marL="3429000" indent="-228600" algn="l" defTabSz="457200" rtl="0" eaLnBrk="1" latinLnBrk="0" hangingPunct="1">
-              <a:spcBef>
-                <a:spcPct val="20000"/>
-              </a:spcBef>
-              <a:spcAft>
-                <a:spcPts val="600"/>
-              </a:spcAft>
-              <a:buClr>
-                <a:schemeClr val="accent1"/>
-              </a:buClr>
-              <a:buSzPct val="115000"/>
-              <a:buFont typeface="Arial"/>
-              <a:buChar char="•"/>
-              <a:defRPr sz="1400" kern="1200" cap="none">
-                <a:solidFill>
-                  <a:schemeClr val="tx1">
-                    <a:lumMod val="85000"/>
-                    <a:lumOff val="15000"/>
-                  </a:schemeClr>
-                </a:solidFill>
-                <a:effectLst/>
-                <a:latin typeface="+mn-lt"/>
-                <a:ea typeface="+mn-ea"/>
-                <a:cs typeface="+mn-cs"/>
-              </a:defRPr>
-            </a:lvl8pPr>
-            <a:lvl9pPr marL="3886200" indent="-228600" algn="l" defTabSz="457200" rtl="0" eaLnBrk="1" latinLnBrk="0" hangingPunct="1">
-              <a:spcBef>
-                <a:spcPct val="20000"/>
-              </a:spcBef>
-              <a:spcAft>
-                <a:spcPts val="600"/>
-              </a:spcAft>
-              <a:buClr>
-                <a:schemeClr val="accent1"/>
-              </a:buClr>
-              <a:buSzPct val="115000"/>
-              <a:buFont typeface="Arial"/>
-              <a:buChar char="•"/>
-              <a:defRPr sz="1400" kern="1200" cap="none">
-                <a:solidFill>
-                  <a:schemeClr val="tx1">
-                    <a:lumMod val="85000"/>
-                    <a:lumOff val="15000"/>
-                  </a:schemeClr>
-                </a:solidFill>
-                <a:effectLst/>
-                <a:latin typeface="+mn-lt"/>
-                <a:ea typeface="+mn-ea"/>
-                <a:cs typeface="+mn-cs"/>
-              </a:defRPr>
-            </a:lvl9pPr>
-          </a:lstStyle>
-          <a:p>
-            <a:r>
-              <a:rPr lang="sk-SK" sz="1600" dirty="0" smtClean="0"/>
-              <a:t>x1 – vstupný vektor</a:t>
-            </a:r>
-          </a:p>
-          <a:p>
-            <a:r>
-              <a:rPr lang="sk-SK" sz="1600" dirty="0" err="1"/>
-              <a:t>W</a:t>
-            </a:r>
-            <a:r>
-              <a:rPr lang="sk-SK" sz="1600" dirty="0" err="1" smtClean="0"/>
-              <a:t>jk</a:t>
-            </a:r>
-            <a:r>
-              <a:rPr lang="sk-SK" sz="1600" dirty="0" smtClean="0"/>
-              <a:t> – hmotnosť spájajúca jednotku skrytej vrstvy k jednotke vstupnej</a:t>
-            </a:r>
-          </a:p>
-          <a:p>
-            <a:r>
-              <a:rPr lang="sk-SK" sz="1600" dirty="0" err="1" smtClean="0"/>
-              <a:t>Wij</a:t>
-            </a:r>
-            <a:r>
-              <a:rPr lang="sk-SK" sz="1600" dirty="0" smtClean="0"/>
-              <a:t> - </a:t>
-            </a:r>
-            <a:r>
-              <a:rPr lang="sk-SK" sz="1600" dirty="0"/>
-              <a:t>hmotnosť spájajúca jednotku </a:t>
-            </a:r>
-            <a:r>
-              <a:rPr lang="sk-SK" sz="1600" dirty="0" smtClean="0"/>
-              <a:t>výstupnej vrstvy </a:t>
-            </a:r>
-            <a:r>
-              <a:rPr lang="sk-SK" sz="1600" dirty="0"/>
-              <a:t>k jednotke </a:t>
-            </a:r>
-            <a:r>
-              <a:rPr lang="sk-SK" sz="1600" dirty="0" smtClean="0"/>
-              <a:t>skrytej</a:t>
-            </a:r>
-          </a:p>
-          <a:p>
-            <a:r>
-              <a:rPr lang="sk-SK" sz="1600" dirty="0" smtClean="0"/>
-              <a:t>Y: aktuálny výstup</a:t>
-            </a:r>
-          </a:p>
-          <a:p>
-            <a:r>
-              <a:rPr lang="sk-SK" sz="1600" dirty="0" err="1"/>
-              <a:t>yd</a:t>
-            </a:r>
-            <a:r>
-              <a:rPr lang="sk-SK" sz="1600" dirty="0" smtClean="0"/>
-              <a:t>: požadovaný výstup</a:t>
-            </a:r>
-          </a:p>
-          <a:p>
-            <a:r>
-              <a:rPr lang="sk-SK" sz="1600" dirty="0"/>
-              <a:t>h: </a:t>
-            </a:r>
-            <a:r>
-              <a:rPr lang="sk-SK" sz="1600" dirty="0" smtClean="0"/>
-              <a:t>vážený </a:t>
-            </a:r>
-            <a:r>
-              <a:rPr lang="sk-SK" sz="1600" dirty="0"/>
-              <a:t>súčet vstupného stimulu</a:t>
-            </a:r>
-          </a:p>
-        </p:txBody>
-      </p:sp>
+          <a:lstStyle/>
+          <a:p>
+            <a:r>
+              <a:rPr lang="sk-SK" dirty="0" smtClean="0"/>
+              <a:t>Po aplikovaní na </a:t>
+            </a:r>
+          </a:p>
+          <a:p>
+            <a:endParaRPr lang="sk-SK" dirty="0"/>
+          </a:p>
+          <a:p>
+            <a:r>
+              <a:rPr lang="sk-SK" dirty="0" smtClean="0"/>
+              <a:t>vracia 0, alebo 1</a:t>
+            </a:r>
+            <a:endParaRPr lang="sk-SK" dirty="0"/>
+          </a:p>
+        </p:txBody>
+      </p:sp>
+      <p:pic>
+        <p:nvPicPr>
+          <p:cNvPr id="7" name="Obrázok 6"/>
+          <p:cNvPicPr>
+            <a:picLocks noChangeAspect="1"/>
+          </p:cNvPicPr>
+          <p:nvPr/>
+        </p:nvPicPr>
+        <p:blipFill>
+          <a:blip r:embed="rId3"/>
+          <a:stretch>
+            <a:fillRect/>
+          </a:stretch>
+        </p:blipFill>
+        <p:spPr>
+          <a:xfrm>
+            <a:off x="8445082" y="5263816"/>
+            <a:ext cx="1990725" cy="295275"/>
+          </a:xfrm>
+          <a:prstGeom prst="rect">
+            <a:avLst/>
+          </a:prstGeom>
+        </p:spPr>
+      </p:pic>
     </p:spTree>
     <p:extLst>
       <p:ext uri="{BB962C8B-B14F-4D97-AF65-F5344CB8AC3E}">
-        <p14:creationId xmlns:p14="http://schemas.microsoft.com/office/powerpoint/2010/main" val="3386855280"/>
+        <p14:creationId xmlns:p14="http://schemas.microsoft.com/office/powerpoint/2010/main" val="1439969265"/>
       </p:ext>
     </p:extLst>
   </p:cSld>
   <p:clrMapOvr>
     <a:masterClrMapping/>
   </p:clrMapOvr>
+  <mc:AlternateContent xmlns:mc="http://schemas.openxmlformats.org/markup-compatibility/2006" xmlns:p14="http://schemas.microsoft.com/office/powerpoint/2010/main">
+    <mc:Choice Requires="p14">
+      <p:transition p14:dur="0"/>
+    </mc:Choice>
+    <mc:Fallback xmlns="">
+      <p:transition/>
+    </mc:Fallback>
+  </mc:AlternateContent>
   <p:timing>
     <p:tnLst>
       <p:par>
@@ -9287,72 +8640,114 @@
           <a:lstStyle/>
           <a:p>
             <a:r>
+              <a:rPr lang="sk-SK" dirty="0" err="1"/>
+              <a:t>Backward</a:t>
+            </a:r>
+            <a:r>
+              <a:rPr lang="sk-SK" dirty="0"/>
+              <a:t> </a:t>
+            </a:r>
+            <a:r>
+              <a:rPr lang="sk-SK" dirty="0" err="1"/>
+              <a:t>Propagation</a:t>
+            </a:r>
+            <a:endParaRPr lang="sk-SK" dirty="0"/>
+          </a:p>
+        </p:txBody>
+      </p:sp>
+      <p:sp>
+        <p:nvSpPr>
+          <p:cNvPr id="3" name="Zástupný symbol obsahu 2"/>
+          <p:cNvSpPr>
+            <a:spLocks noGrp="1"/>
+          </p:cNvSpPr>
+          <p:nvPr>
+            <p:ph idx="1"/>
+          </p:nvPr>
+        </p:nvSpPr>
+        <p:spPr>
+          <a:xfrm>
+            <a:off x="1295401" y="2556931"/>
+            <a:ext cx="9745638" cy="3461731"/>
+          </a:xfrm>
+        </p:spPr>
+        <p:txBody>
+          <a:bodyPr>
+            <a:normAutofit fontScale="92500" lnSpcReduction="10000"/>
+          </a:bodyPr>
+          <a:lstStyle/>
+          <a:p>
+            <a:r>
               <a:rPr lang="sk-SK" dirty="0" smtClean="0"/>
-              <a:t>Použitá aktivačná funkcia</a:t>
-            </a:r>
-            <a:endParaRPr lang="sk-SK" dirty="0"/>
-          </a:p>
-        </p:txBody>
-      </p:sp>
-      <p:sp>
-        <p:nvSpPr>
-          <p:cNvPr id="3" name="Zástupný symbol obsahu 2"/>
-          <p:cNvSpPr>
-            <a:spLocks noGrp="1"/>
-          </p:cNvSpPr>
-          <p:nvPr>
-            <p:ph idx="1"/>
-          </p:nvPr>
-        </p:nvSpPr>
-        <p:spPr/>
-        <p:txBody>
-          <a:bodyPr/>
-          <a:lstStyle/>
-          <a:p>
+              <a:t>Použitý bol gradient </a:t>
+            </a:r>
             <a:r>
               <a:rPr lang="sk-SK" dirty="0"/>
-              <a:t>Ako </a:t>
+              <a:t>zostup </a:t>
+            </a:r>
+            <a:r>
+              <a:rPr lang="sk-SK" dirty="0" err="1" smtClean="0"/>
+              <a:t>trénovací</a:t>
             </a:r>
             <a:r>
               <a:rPr lang="sk-SK" dirty="0" smtClean="0"/>
-              <a:t>aktivačná </a:t>
+              <a:t> </a:t>
             </a:r>
             <a:r>
               <a:rPr lang="sk-SK" dirty="0"/>
-              <a:t>funkciu </a:t>
-            </a:r>
+              <a:t>model. </a:t>
+            </a:r>
+            <a:endParaRPr lang="en-US" dirty="0" smtClean="0"/>
+          </a:p>
+          <a:p>
+            <a:pPr marL="0" indent="0">
+              <a:buNone/>
+            </a:pPr>
+            <a:endParaRPr lang="en-US" dirty="0" smtClean="0"/>
+          </a:p>
+          <a:p>
             <a:r>
               <a:rPr lang="sk-SK" dirty="0" smtClean="0"/>
-              <a:t>bola použitá </a:t>
-            </a:r>
-            <a:r>
-              <a:rPr lang="sk-SK" dirty="0" err="1" smtClean="0"/>
-              <a:t>sigmoidná</a:t>
-            </a:r>
+              <a:t>Potom sa aktualizujú váhy.</a:t>
+            </a:r>
+            <a:endParaRPr lang="en-US" dirty="0" smtClean="0"/>
+          </a:p>
+          <a:p>
+            <a:pPr marL="0" indent="0">
+              <a:buNone/>
+            </a:pPr>
+            <a:endParaRPr lang="sk-SK" dirty="0" smtClean="0"/>
+          </a:p>
+          <a:p>
             <a:r>
               <a:rPr lang="sk-SK" dirty="0" smtClean="0"/>
-              <a:t> funkcia.</a:t>
-            </a:r>
-          </a:p>
-          <a:p>
+              <a:t>Po </a:t>
+            </a:r>
             <a:r>
               <a:rPr lang="sk-SK" dirty="0"/>
-              <a:t>Akonáhle aplikujeme váhy na vstupy, </a:t>
+              <a:t>zaškolení siete </a:t>
             </a:r>
             <a:r>
               <a:rPr lang="sk-SK" dirty="0" smtClean="0"/>
-              <a:t>potom </a:t>
+              <a:t>s nastavenou epochou sa </a:t>
             </a:r>
             <a:r>
               <a:rPr lang="sk-SK" dirty="0"/>
-              <a:t>musíme použiť aktivačnú funkciu</a:t>
-            </a:r>
-            <a:endParaRPr lang="sk-SK" dirty="0" smtClean="0"/>
-          </a:p>
-          <a:p>
+              <a:t>sieť naučí údaje a upraví váhy podľa predpovede správnej hodnoty</a:t>
+            </a:r>
             <a:r>
               <a:rPr lang="sk-SK" dirty="0" smtClean="0"/>
-              <a:t>Nutnosť použitia kvôli binárnej klasifikácii</a:t>
+              <a:t>.</a:t>
+            </a:r>
+          </a:p>
+          <a:p>
+            <a:r>
+              <a:rPr lang="sk-SK" dirty="0"/>
+              <a:t>Vyhodnotenie siete sa vypočíta pomocou rôznych ukazovateľov výkonu, ako je </a:t>
+            </a:r>
+            <a:r>
+              <a:rPr lang="sk-SK" dirty="0" smtClean="0"/>
+              <a:t>napríklad presnosť.</a:t>
             </a:r>
             <a:endParaRPr lang="sk-SK" dirty="0"/>
           </a:p>
@@ -9374,56 +8769,17 @@
         </p:blipFill>
         <p:spPr>
           <a:xfrm>
-            <a:off x="7734591" y="3506873"/>
-            <a:ext cx="2867135" cy="1445665"/>
+            <a:off x="3985146" y="2947916"/>
+            <a:ext cx="2647666" cy="495227"/>
           </a:xfrm>
           <a:prstGeom prst="rect">
             <a:avLst/>
           </a:prstGeom>
         </p:spPr>
       </p:pic>
-      <p:sp>
-        <p:nvSpPr>
-          <p:cNvPr id="5" name="BlokTextu 4"/>
-          <p:cNvSpPr txBox="1"/>
-          <p:nvPr/>
-        </p:nvSpPr>
-        <p:spPr>
-          <a:xfrm>
-            <a:off x="8491021" y="4952538"/>
-            <a:ext cx="3474720" cy="923330"/>
-          </a:xfrm>
-          <a:prstGeom prst="rect">
-            <a:avLst/>
-          </a:prstGeom>
-          <a:noFill/>
-        </p:spPr>
-        <p:txBody>
-          <a:bodyPr wrap="square" rtlCol="0">
-            <a:spAutoFit/>
-          </a:bodyPr>
-          <a:lstStyle/>
-          <a:p>
-            <a:r>
-              <a:rPr lang="sk-SK" dirty="0" smtClean="0"/>
-              <a:t>Po aplikovaní na </a:t>
-            </a:r>
-          </a:p>
-          <a:p>
-            <a:endParaRPr lang="sk-SK" dirty="0"/>
-          </a:p>
-          <a:p>
-            <a:r>
-              <a:rPr lang="sk-SK" dirty="0" smtClean="0"/>
-              <a:t>vracia 0, alebo 1</a:t>
-            </a:r>
-            <a:endParaRPr lang="sk-SK" dirty="0"/>
-          </a:p>
-        </p:txBody>
-      </p:sp>
       <p:pic>
         <p:nvPicPr>
-          <p:cNvPr id="7" name="Obrázok 6"/>
+          <p:cNvPr id="5" name="Obrázok 4"/>
           <p:cNvPicPr>
             <a:picLocks noChangeAspect="1"/>
           </p:cNvPicPr>
@@ -9437,24 +8793,68 @@
         </p:blipFill>
         <p:spPr>
           <a:xfrm>
-            <a:off x="8445082" y="5263816"/>
-            <a:ext cx="1990725" cy="295275"/>
+            <a:off x="3857198" y="3832629"/>
+            <a:ext cx="2775614" cy="598849"/>
           </a:xfrm>
           <a:prstGeom prst="rect">
             <a:avLst/>
           </a:prstGeom>
         </p:spPr>
       </p:pic>
+      <p:sp>
+        <p:nvSpPr>
+          <p:cNvPr id="6" name="BlokTextu 5"/>
+          <p:cNvSpPr txBox="1"/>
+          <p:nvPr/>
+        </p:nvSpPr>
+        <p:spPr>
+          <a:xfrm>
+            <a:off x="6714697" y="4010797"/>
+            <a:ext cx="4353637" cy="553998"/>
+          </a:xfrm>
+          <a:prstGeom prst="rect">
+            <a:avLst/>
+          </a:prstGeom>
+          <a:noFill/>
+        </p:spPr>
+        <p:txBody>
+          <a:bodyPr wrap="square" rtlCol="0">
+            <a:spAutoFit/>
+          </a:bodyPr>
+          <a:lstStyle/>
+          <a:p>
+            <a:r>
+              <a:rPr lang="sk-SK" sz="1200" dirty="0" err="1"/>
+              <a:t>Wij</a:t>
+            </a:r>
+            <a:r>
+              <a:rPr lang="sk-SK" sz="1200" dirty="0"/>
+              <a:t> - hmotnosť spájajúca jednotku výstupnej vrstvy k jednotke skrytej</a:t>
+            </a:r>
+          </a:p>
+          <a:p>
+            <a:endParaRPr lang="sk-SK" dirty="0"/>
+          </a:p>
+        </p:txBody>
+      </p:sp>
     </p:spTree>
     <p:extLst>
       <p:ext uri="{BB962C8B-B14F-4D97-AF65-F5344CB8AC3E}">
-        <p14:creationId xmlns:p14="http://schemas.microsoft.com/office/powerpoint/2010/main" val="1439969265"/>
+        <p14:creationId xmlns:p14="http://schemas.microsoft.com/office/powerpoint/2010/main" val="3360498270"/>
       </p:ext>
     </p:extLst>
   </p:cSld>
   <p:clrMapOvr>
     <a:masterClrMapping/>
   </p:clrMapOvr>
+  <mc:AlternateContent xmlns:mc="http://schemas.openxmlformats.org/markup-compatibility/2006" xmlns:p14="http://schemas.microsoft.com/office/powerpoint/2010/main">
+    <mc:Choice Requires="p14">
+      <p:transition p14:dur="0"/>
+    </mc:Choice>
+    <mc:Fallback xmlns="">
+      <p:transition/>
+    </mc:Fallback>
+  </mc:AlternateContent>
   <p:timing>
     <p:tnLst>
       <p:par>
@@ -9498,151 +8898,16 @@
           <a:lstStyle/>
           <a:p>
             <a:r>
-              <a:rPr lang="sk-SK" dirty="0" err="1"/>
-              <a:t>Backward</a:t>
-            </a:r>
-            <a:r>
-              <a:rPr lang="sk-SK" dirty="0"/>
-              <a:t> </a:t>
-            </a:r>
-            <a:r>
-              <a:rPr lang="sk-SK" dirty="0" err="1"/>
-              <a:t>Propagation</a:t>
-            </a:r>
-            <a:endParaRPr lang="sk-SK" dirty="0"/>
-          </a:p>
-        </p:txBody>
-      </p:sp>
-      <p:sp>
-        <p:nvSpPr>
-          <p:cNvPr id="3" name="Zástupný symbol obsahu 2"/>
-          <p:cNvSpPr>
-            <a:spLocks noGrp="1"/>
-          </p:cNvSpPr>
-          <p:nvPr>
-            <p:ph idx="1"/>
-          </p:nvPr>
-        </p:nvSpPr>
-        <p:spPr/>
-        <p:txBody>
-          <a:bodyPr>
-            <a:normAutofit fontScale="92500" lnSpcReduction="20000"/>
-          </a:bodyPr>
-          <a:lstStyle/>
-          <a:p>
-            <a:r>
-              <a:rPr lang="sk-SK" dirty="0"/>
-              <a:t>Spätné šírenie je miesto, kde sa sieť skutočne </a:t>
-            </a:r>
-            <a:r>
               <a:rPr lang="sk-SK" dirty="0" smtClean="0"/>
-              <a:t>učí z </a:t>
-            </a:r>
-            <a:r>
-              <a:rPr lang="sk-SK" dirty="0"/>
-              <a:t>údajov. </a:t>
-            </a:r>
-            <a:r>
-              <a:rPr lang="sk-SK" dirty="0" smtClean="0"/>
-              <a:t>Použitý bol gradient </a:t>
-            </a:r>
-            <a:r>
-              <a:rPr lang="sk-SK" dirty="0"/>
-              <a:t>zostup </a:t>
+              <a:t>Predspracovanie</a:t>
+            </a:r>
+            <a:r>
+              <a:rPr lang="en-US" dirty="0" smtClean="0"/>
+              <a:t> d</a:t>
             </a:r>
             <a:r>
               <a:rPr lang="sk-SK" dirty="0" err="1" smtClean="0"/>
-              <a:t>trénovací</a:t>
-            </a:r>
-            <a:r>
-              <a:rPr lang="sk-SK" dirty="0" smtClean="0"/>
-              <a:t> </a:t>
-            </a:r>
-            <a:r>
-              <a:rPr lang="sk-SK" dirty="0"/>
-              <a:t>model. </a:t>
-            </a:r>
-            <a:r>
-              <a:rPr lang="sk-SK" dirty="0" smtClean="0"/>
-              <a:t>V </a:t>
-            </a:r>
-            <a:r>
-              <a:rPr lang="sk-SK" dirty="0"/>
-              <a:t>tejto fáze sieť najprv skontroluje chybu v sieti po šírení dopredu, </a:t>
-            </a:r>
-            <a:r>
-              <a:rPr lang="sk-SK" dirty="0" err="1"/>
-              <a:t>error</a:t>
-            </a:r>
-            <a:r>
-              <a:rPr lang="sk-SK" dirty="0"/>
-              <a:t> = </a:t>
-            </a:r>
-            <a:r>
-              <a:rPr lang="sk-SK" dirty="0" err="1"/>
-              <a:t>True</a:t>
-            </a:r>
-            <a:r>
-              <a:rPr lang="sk-SK" dirty="0"/>
-              <a:t>- </a:t>
-            </a:r>
-            <a:r>
-              <a:rPr lang="sk-SK" dirty="0" err="1"/>
-              <a:t>Predicted</a:t>
-            </a:r>
-            <a:r>
-              <a:rPr lang="sk-SK" dirty="0"/>
-              <a:t>. Potom skontroluje chybu v každej vrstve vynásobením chyby v predchádzajúcej vrstve, deriváciou aktuálnej vrstvy</a:t>
-            </a:r>
-            <a:r>
-              <a:rPr lang="sk-SK" dirty="0" smtClean="0"/>
-              <a:t>.</a:t>
-            </a:r>
-          </a:p>
-          <a:p>
-            <a:r>
-              <a:rPr lang="sk-SK" dirty="0"/>
-              <a:t>Potom </a:t>
-            </a:r>
-            <a:r>
-              <a:rPr lang="sk-SK" dirty="0" smtClean="0"/>
-              <a:t>aktualizuje </a:t>
-            </a:r>
-            <a:r>
-              <a:rPr lang="sk-SK" dirty="0"/>
-              <a:t>váhy, aby sa predpovede, ktoré sú tesne zhodné so skutočnou hodnotou</a:t>
-            </a:r>
-            <a:r>
-              <a:rPr lang="sk-SK" dirty="0" smtClean="0"/>
-              <a:t>.</a:t>
-            </a:r>
-          </a:p>
-          <a:p>
-            <a:r>
-              <a:rPr lang="sk-SK" dirty="0"/>
-              <a:t>Po zaškolení siete </a:t>
-            </a:r>
-            <a:r>
-              <a:rPr lang="sk-SK" dirty="0" smtClean="0"/>
-              <a:t>s nastavenou epochou sa </a:t>
-            </a:r>
-            <a:r>
-              <a:rPr lang="sk-SK" dirty="0"/>
-              <a:t>sieť naučí údaje a upraví váhy podľa predpovede správnej hodnoty</a:t>
-            </a:r>
-            <a:r>
-              <a:rPr lang="sk-SK" dirty="0" smtClean="0"/>
-              <a:t>.</a:t>
-            </a:r>
-          </a:p>
-          <a:p>
-            <a:r>
-              <a:rPr lang="sk-SK" dirty="0"/>
-              <a:t>Vyhodnotenie siete sa vypočíta pomocou rôznych ukazovateľov výkonu, ako je </a:t>
-            </a:r>
-            <a:r>
-              <a:rPr lang="sk-SK" dirty="0" smtClean="0"/>
-              <a:t>napríklad presnosť.</a:t>
+              <a:t>át</a:t>
             </a:r>
             <a:endParaRPr lang="sk-SK" dirty="0"/>
           </a:p>
@@ -9650,7 +8915,7 @@
       </p:sp>
       <p:pic>
         <p:nvPicPr>
-          <p:cNvPr id="4" name="Obrázok 3"/>
+          <p:cNvPr id="9" name="Obrázok 8"/>
           <p:cNvPicPr>
             <a:picLocks noChangeAspect="1"/>
           </p:cNvPicPr>
@@ -9664,17 +8929,55 @@
         </p:blipFill>
         <p:spPr>
           <a:xfrm>
-            <a:off x="3604999" y="4120865"/>
-            <a:ext cx="2359072" cy="390525"/>
+            <a:off x="839834" y="2489223"/>
+            <a:ext cx="4752975" cy="1743075"/>
           </a:xfrm>
           <a:prstGeom prst="rect">
             <a:avLst/>
           </a:prstGeom>
         </p:spPr>
       </p:pic>
+      <p:sp>
+        <p:nvSpPr>
+          <p:cNvPr id="10" name="BlokTextu 9"/>
+          <p:cNvSpPr txBox="1"/>
+          <p:nvPr/>
+        </p:nvSpPr>
+        <p:spPr>
+          <a:xfrm>
+            <a:off x="614150" y="2489223"/>
+            <a:ext cx="928048" cy="369332"/>
+          </a:xfrm>
+          <a:prstGeom prst="rect">
+            <a:avLst/>
+          </a:prstGeom>
+          <a:noFill/>
+        </p:spPr>
+        <p:txBody>
+          <a:bodyPr wrap="square" rtlCol="0">
+            <a:spAutoFit/>
+          </a:bodyPr>
+          <a:lstStyle/>
+          <a:p>
+            <a:r>
+              <a:rPr lang="sk-SK" b="1" dirty="0" smtClean="0">
+                <a:solidFill>
+                  <a:srgbClr val="FF0000"/>
+                </a:solidFill>
+              </a:rPr>
+              <a:t>1</a:t>
+            </a:r>
+            <a:endParaRPr lang="sk-SK" b="1" dirty="0">
+              <a:solidFill>
+                <a:srgbClr val="FF0000"/>
+              </a:solidFill>
+            </a:endParaRPr>
+          </a:p>
+        </p:txBody>
+      </p:sp>
       <p:pic>
         <p:nvPicPr>
-          <p:cNvPr id="5" name="Obrázok 4"/>
+          <p:cNvPr id="11" name="Obrázok 10"/>
           <p:cNvPicPr>
             <a:picLocks noChangeAspect="1"/>
           </p:cNvPicPr>
@@ -9688,8 +8991,336 @@
         </p:blipFill>
         <p:spPr>
           <a:xfrm>
-            <a:off x="4587638" y="5476473"/>
-            <a:ext cx="2552700" cy="598849"/>
+            <a:off x="839834" y="4309569"/>
+            <a:ext cx="3857625" cy="609600"/>
+          </a:xfrm>
+          <a:prstGeom prst="rect">
+            <a:avLst/>
+          </a:prstGeom>
+        </p:spPr>
+      </p:pic>
+      <p:sp>
+        <p:nvSpPr>
+          <p:cNvPr id="12" name="BlokTextu 11"/>
+          <p:cNvSpPr txBox="1"/>
+          <p:nvPr/>
+        </p:nvSpPr>
+        <p:spPr>
+          <a:xfrm>
+            <a:off x="650544" y="4355880"/>
+            <a:ext cx="928048" cy="369332"/>
+          </a:xfrm>
+          <a:prstGeom prst="rect">
+            <a:avLst/>
+          </a:prstGeom>
+          <a:noFill/>
+        </p:spPr>
+        <p:txBody>
+          <a:bodyPr wrap="square" rtlCol="0">
+            <a:spAutoFit/>
+          </a:bodyPr>
+          <a:lstStyle/>
+          <a:p>
+            <a:r>
+              <a:rPr lang="sk-SK" b="1" dirty="0">
+                <a:solidFill>
+                  <a:srgbClr val="FF0000"/>
+                </a:solidFill>
+              </a:rPr>
+              <a:t>2</a:t>
+            </a:r>
+          </a:p>
+        </p:txBody>
+      </p:sp>
+      <p:pic>
+        <p:nvPicPr>
+          <p:cNvPr id="17" name="Obrázok 16"/>
+          <p:cNvPicPr>
+            <a:picLocks noChangeAspect="1"/>
+          </p:cNvPicPr>
+          <p:nvPr/>
+        </p:nvPicPr>
+        <p:blipFill>
+          <a:blip r:embed="rId4"/>
+          <a:stretch>
+            <a:fillRect/>
+          </a:stretch>
+        </p:blipFill>
+        <p:spPr>
+          <a:xfrm>
+            <a:off x="1078174" y="5108463"/>
+            <a:ext cx="1905000" cy="219075"/>
+          </a:xfrm>
+          <a:prstGeom prst="rect">
+            <a:avLst/>
+          </a:prstGeom>
+        </p:spPr>
+      </p:pic>
+      <p:sp>
+        <p:nvSpPr>
+          <p:cNvPr id="18" name="BlokTextu 17"/>
+          <p:cNvSpPr txBox="1"/>
+          <p:nvPr/>
+        </p:nvSpPr>
+        <p:spPr>
+          <a:xfrm>
+            <a:off x="650544" y="5049037"/>
+            <a:ext cx="928048" cy="369332"/>
+          </a:xfrm>
+          <a:prstGeom prst="rect">
+            <a:avLst/>
+          </a:prstGeom>
+          <a:noFill/>
+        </p:spPr>
+        <p:txBody>
+          <a:bodyPr wrap="square" rtlCol="0">
+            <a:spAutoFit/>
+          </a:bodyPr>
+          <a:lstStyle/>
+          <a:p>
+            <a:r>
+              <a:rPr lang="sk-SK" b="1" dirty="0" smtClean="0">
+                <a:solidFill>
+                  <a:srgbClr val="FF0000"/>
+                </a:solidFill>
+              </a:rPr>
+              <a:t>3</a:t>
+            </a:r>
+            <a:endParaRPr lang="sk-SK" b="1" dirty="0">
+              <a:solidFill>
+                <a:srgbClr val="FF0000"/>
+              </a:solidFill>
+            </a:endParaRPr>
+          </a:p>
+        </p:txBody>
+      </p:sp>
+      <p:pic>
+        <p:nvPicPr>
+          <p:cNvPr id="19" name="Obrázok 18"/>
+          <p:cNvPicPr>
+            <a:picLocks noChangeAspect="1"/>
+          </p:cNvPicPr>
+          <p:nvPr/>
+        </p:nvPicPr>
+        <p:blipFill>
+          <a:blip r:embed="rId5"/>
+          <a:stretch>
+            <a:fillRect/>
+          </a:stretch>
+        </p:blipFill>
+        <p:spPr>
+          <a:xfrm>
+            <a:off x="1078174" y="5565981"/>
+            <a:ext cx="2171700" cy="352425"/>
+          </a:xfrm>
+          <a:prstGeom prst="rect">
+            <a:avLst/>
+          </a:prstGeom>
+        </p:spPr>
+      </p:pic>
+      <p:sp>
+        <p:nvSpPr>
+          <p:cNvPr id="20" name="BlokTextu 19"/>
+          <p:cNvSpPr txBox="1"/>
+          <p:nvPr/>
+        </p:nvSpPr>
+        <p:spPr>
+          <a:xfrm>
+            <a:off x="659643" y="5614790"/>
+            <a:ext cx="928048" cy="369332"/>
+          </a:xfrm>
+          <a:prstGeom prst="rect">
+            <a:avLst/>
+          </a:prstGeom>
+          <a:noFill/>
+        </p:spPr>
+        <p:txBody>
+          <a:bodyPr wrap="square" rtlCol="0">
+            <a:spAutoFit/>
+          </a:bodyPr>
+          <a:lstStyle/>
+          <a:p>
+            <a:r>
+              <a:rPr lang="sk-SK" b="1" dirty="0">
+                <a:solidFill>
+                  <a:srgbClr val="FF0000"/>
+                </a:solidFill>
+              </a:rPr>
+              <a:t>4</a:t>
+            </a:r>
+          </a:p>
+        </p:txBody>
+      </p:sp>
+      <p:pic>
+        <p:nvPicPr>
+          <p:cNvPr id="21" name="Obrázok 20"/>
+          <p:cNvPicPr>
+            <a:picLocks noChangeAspect="1"/>
+          </p:cNvPicPr>
+          <p:nvPr/>
+        </p:nvPicPr>
+        <p:blipFill>
+          <a:blip r:embed="rId6"/>
+          <a:stretch>
+            <a:fillRect/>
+          </a:stretch>
+        </p:blipFill>
+        <p:spPr>
+          <a:xfrm>
+            <a:off x="6560024" y="2506130"/>
+            <a:ext cx="2305050" cy="352425"/>
+          </a:xfrm>
+          <a:prstGeom prst="rect">
+            <a:avLst/>
+          </a:prstGeom>
+        </p:spPr>
+      </p:pic>
+      <p:sp>
+        <p:nvSpPr>
+          <p:cNvPr id="22" name="BlokTextu 21"/>
+          <p:cNvSpPr txBox="1"/>
+          <p:nvPr/>
+        </p:nvSpPr>
+        <p:spPr>
+          <a:xfrm>
+            <a:off x="6096000" y="2489223"/>
+            <a:ext cx="928048" cy="369332"/>
+          </a:xfrm>
+          <a:prstGeom prst="rect">
+            <a:avLst/>
+          </a:prstGeom>
+          <a:noFill/>
+        </p:spPr>
+        <p:txBody>
+          <a:bodyPr wrap="square" rtlCol="0">
+            <a:spAutoFit/>
+          </a:bodyPr>
+          <a:lstStyle/>
+          <a:p>
+            <a:r>
+              <a:rPr lang="sk-SK" b="1" dirty="0" smtClean="0">
+                <a:solidFill>
+                  <a:srgbClr val="FF0000"/>
+                </a:solidFill>
+              </a:rPr>
+              <a:t>5</a:t>
+            </a:r>
+            <a:endParaRPr lang="sk-SK" b="1" dirty="0">
+              <a:solidFill>
+                <a:srgbClr val="FF0000"/>
+              </a:solidFill>
+            </a:endParaRPr>
+          </a:p>
+        </p:txBody>
+      </p:sp>
+      <p:sp>
+        <p:nvSpPr>
+          <p:cNvPr id="24" name="BlokTextu 23"/>
+          <p:cNvSpPr txBox="1"/>
+          <p:nvPr/>
+        </p:nvSpPr>
+        <p:spPr>
+          <a:xfrm>
+            <a:off x="6096000" y="2999989"/>
+            <a:ext cx="928048" cy="369332"/>
+          </a:xfrm>
+          <a:prstGeom prst="rect">
+            <a:avLst/>
+          </a:prstGeom>
+          <a:noFill/>
+        </p:spPr>
+        <p:txBody>
+          <a:bodyPr wrap="square" rtlCol="0">
+            <a:spAutoFit/>
+          </a:bodyPr>
+          <a:lstStyle/>
+          <a:p>
+            <a:r>
+              <a:rPr lang="sk-SK" b="1" dirty="0">
+                <a:solidFill>
+                  <a:srgbClr val="FF0000"/>
+                </a:solidFill>
+              </a:rPr>
+              <a:t>6</a:t>
+            </a:r>
+          </a:p>
+        </p:txBody>
+      </p:sp>
+      <p:pic>
+        <p:nvPicPr>
+          <p:cNvPr id="25" name="Obrázok 24"/>
+          <p:cNvPicPr>
+            <a:picLocks noChangeAspect="1"/>
+          </p:cNvPicPr>
+          <p:nvPr/>
+        </p:nvPicPr>
+        <p:blipFill>
+          <a:blip r:embed="rId7"/>
+          <a:stretch>
+            <a:fillRect/>
+          </a:stretch>
+        </p:blipFill>
+        <p:spPr>
+          <a:xfrm>
+            <a:off x="6585257" y="3465274"/>
+            <a:ext cx="2733675" cy="657225"/>
+          </a:xfrm>
+          <a:prstGeom prst="rect">
+            <a:avLst/>
+          </a:prstGeom>
+        </p:spPr>
+      </p:pic>
+      <p:sp>
+        <p:nvSpPr>
+          <p:cNvPr id="26" name="BlokTextu 25"/>
+          <p:cNvSpPr txBox="1"/>
+          <p:nvPr/>
+        </p:nvSpPr>
+        <p:spPr>
+          <a:xfrm>
+            <a:off x="6096000" y="3609220"/>
+            <a:ext cx="928048" cy="369332"/>
+          </a:xfrm>
+          <a:prstGeom prst="rect">
+            <a:avLst/>
+          </a:prstGeom>
+          <a:noFill/>
+        </p:spPr>
+        <p:txBody>
+          <a:bodyPr wrap="square" rtlCol="0">
+            <a:spAutoFit/>
+          </a:bodyPr>
+          <a:lstStyle/>
+          <a:p>
+            <a:r>
+              <a:rPr lang="sk-SK" b="1" dirty="0">
+                <a:solidFill>
+                  <a:srgbClr val="FF0000"/>
+                </a:solidFill>
+              </a:rPr>
+              <a:t>7</a:t>
+            </a:r>
+          </a:p>
+        </p:txBody>
+      </p:sp>
+      <p:pic>
+        <p:nvPicPr>
+          <p:cNvPr id="27" name="Obrázok 26"/>
+          <p:cNvPicPr>
+            <a:picLocks noChangeAspect="1"/>
+          </p:cNvPicPr>
+          <p:nvPr/>
+        </p:nvPicPr>
+        <p:blipFill>
+          <a:blip r:embed="rId8"/>
+          <a:stretch>
+            <a:fillRect/>
+          </a:stretch>
+        </p:blipFill>
+        <p:spPr>
+          <a:xfrm>
+            <a:off x="6560024" y="2999989"/>
+            <a:ext cx="4200525" cy="323850"/>
           </a:xfrm>
           <a:prstGeom prst="rect">
             <a:avLst/>
@@ -9699,13 +9330,21 @@
     </p:spTree>
     <p:extLst>
       <p:ext uri="{BB962C8B-B14F-4D97-AF65-F5344CB8AC3E}">
-        <p14:creationId xmlns:p14="http://schemas.microsoft.com/office/powerpoint/2010/main" val="3360498270"/>
+        <p14:creationId xmlns:p14="http://schemas.microsoft.com/office/powerpoint/2010/main" val="3531833650"/>
       </p:ext>
     </p:extLst>
   </p:cSld>
   <p:clrMapOvr>
     <a:masterClrMapping/>
   </p:clrMapOvr>
+  <mc:AlternateContent xmlns:mc="http://schemas.openxmlformats.org/markup-compatibility/2006" xmlns:p14="http://schemas.microsoft.com/office/powerpoint/2010/main">
+    <mc:Choice Requires="p14">
+      <p:transition p14:dur="0"/>
+    </mc:Choice>
+    <mc:Fallback xmlns="">
+      <p:transition/>
+    </mc:Fallback>
+  </mc:AlternateContent>
   <p:timing>
     <p:tnLst>
       <p:par>
@@ -9750,15 +9389,7 @@
           <a:p>
             <a:r>
               <a:rPr lang="sk-SK" dirty="0" smtClean="0"/>
-              <a:t>Predspracovanie</a:t>
-            </a:r>
-            <a:r>
-              <a:rPr lang="en-US" dirty="0" smtClean="0"/>
-              <a:t> d</a:t>
-            </a:r>
-            <a:r>
-              <a:rPr lang="sk-SK" dirty="0" smtClean="0"/>
-              <a:t>at</a:t>
+              <a:t>Vytvorenie neurónovej siete</a:t>
             </a:r>
             <a:endParaRPr lang="sk-SK" dirty="0"/>
           </a:p>
@@ -9766,7 +9397,7 @@
       </p:sp>
       <p:pic>
         <p:nvPicPr>
-          <p:cNvPr id="9" name="Obrázok 8"/>
+          <p:cNvPr id="6" name="Obrázok 5"/>
           <p:cNvPicPr>
             <a:picLocks noChangeAspect="1"/>
           </p:cNvPicPr>
@@ -9780,8 +9411,8 @@
         </p:blipFill>
         <p:spPr>
           <a:xfrm>
-            <a:off x="839834" y="2489223"/>
-            <a:ext cx="4752975" cy="1743075"/>
+            <a:off x="1279477" y="2489293"/>
+            <a:ext cx="7362825" cy="371475"/>
           </a:xfrm>
           <a:prstGeom prst="rect">
             <a:avLst/>
@@ -9790,13 +9421,13 @@
       </p:pic>
       <p:sp>
         <p:nvSpPr>
-          <p:cNvPr id="10" name="BlokTextu 9"/>
+          <p:cNvPr id="7" name="BlokTextu 6"/>
           <p:cNvSpPr txBox="1"/>
           <p:nvPr/>
         </p:nvSpPr>
         <p:spPr>
           <a:xfrm>
-            <a:off x="614150" y="2489223"/>
+            <a:off x="941696" y="2535721"/>
             <a:ext cx="928048" cy="369332"/>
           </a:xfrm>
           <a:prstGeom prst="rect">
@@ -9828,7 +9459,7 @@
       </p:sp>
       <p:pic>
         <p:nvPicPr>
-          <p:cNvPr id="11" name="Obrázok 10"/>
+          <p:cNvPr id="8" name="Obrázok 7"/>
           <p:cNvPicPr>
             <a:picLocks noChangeAspect="1"/>
           </p:cNvPicPr>
@@ -9842,50 +9473,17 @@
         </p:blipFill>
         <p:spPr>
           <a:xfrm>
-            <a:off x="839834" y="4309569"/>
-            <a:ext cx="3857625" cy="609600"/>
+            <a:off x="1245428" y="2945251"/>
+            <a:ext cx="1724025" cy="704850"/>
           </a:xfrm>
           <a:prstGeom prst="rect">
             <a:avLst/>
           </a:prstGeom>
         </p:spPr>
       </p:pic>
-      <p:sp>
-        <p:nvSpPr>
-          <p:cNvPr id="12" name="BlokTextu 11"/>
-          <p:cNvSpPr txBox="1"/>
-          <p:nvPr/>
-        </p:nvSpPr>
-        <p:spPr>
-          <a:xfrm>
-            <a:off x="650544" y="4355880"/>
-            <a:ext cx="928048" cy="369332"/>
-          </a:xfrm>
-          <a:prstGeom prst="rect">
-            <a:avLst/>
-          </a:prstGeom>
-          <a:noFill/>
-        </p:spPr>
-        <p:txBody>
-          <a:bodyPr wrap="square" rtlCol="0">
-            <a:spAutoFit/>
-          </a:bodyPr>
-          <a:lstStyle/>
-          <a:p>
-            <a:r>
-              <a:rPr lang="sk-SK" b="1" dirty="0">
-                <a:solidFill>
-                  <a:srgbClr val="FF0000"/>
-                </a:solidFill>
-              </a:rPr>
-              <a:t>2</a:t>
-            </a:r>
-          </a:p>
-        </p:txBody>
-      </p:sp>
       <p:pic>
         <p:nvPicPr>
-          <p:cNvPr id="17" name="Obrázok 16"/>
+          <p:cNvPr id="9" name="Obrázok 8"/>
           <p:cNvPicPr>
             <a:picLocks noChangeAspect="1"/>
           </p:cNvPicPr>
@@ -9899,55 +9497,17 @@
         </p:blipFill>
         <p:spPr>
           <a:xfrm>
-            <a:off x="1078174" y="5108463"/>
-            <a:ext cx="1905000" cy="219075"/>
+            <a:off x="1131698" y="3626646"/>
+            <a:ext cx="3324225" cy="1000125"/>
           </a:xfrm>
           <a:prstGeom prst="rect">
             <a:avLst/>
           </a:prstGeom>
         </p:spPr>
       </p:pic>
-      <p:sp>
-        <p:nvSpPr>
-          <p:cNvPr id="18" name="BlokTextu 17"/>
-          <p:cNvSpPr txBox="1"/>
-          <p:nvPr/>
-        </p:nvSpPr>
-        <p:spPr>
-          <a:xfrm>
-            <a:off x="650544" y="5049037"/>
-            <a:ext cx="928048" cy="369332"/>
-          </a:xfrm>
-          <a:prstGeom prst="rect">
-            <a:avLst/>
-          </a:prstGeom>
-          <a:noFill/>
-        </p:spPr>
-        <p:txBody>
-          <a:bodyPr wrap="square" rtlCol="0">
-            <a:spAutoFit/>
-          </a:bodyPr>
-          <a:lstStyle/>
-          <a:p>
-            <a:r>
-              <a:rPr lang="sk-SK" b="1" dirty="0" smtClean="0">
-                <a:solidFill>
-                  <a:srgbClr val="FF0000"/>
-                </a:solidFill>
-              </a:rPr>
-              <a:t>3</a:t>
-            </a:r>
-            <a:endParaRPr lang="sk-SK" b="1" dirty="0">
-              <a:solidFill>
-                <a:srgbClr val="FF0000"/>
-              </a:solidFill>
-            </a:endParaRPr>
-          </a:p>
-        </p:txBody>
-      </p:sp>
       <p:pic>
         <p:nvPicPr>
-          <p:cNvPr id="19" name="Obrázok 18"/>
+          <p:cNvPr id="10" name="Obrázok 9"/>
           <p:cNvPicPr>
             <a:picLocks noChangeAspect="1"/>
           </p:cNvPicPr>
@@ -9961,50 +9521,17 @@
         </p:blipFill>
         <p:spPr>
           <a:xfrm>
-            <a:off x="1078174" y="5565981"/>
-            <a:ext cx="2171700" cy="352425"/>
+            <a:off x="1279477" y="4626771"/>
+            <a:ext cx="5086350" cy="476250"/>
           </a:xfrm>
           <a:prstGeom prst="rect">
             <a:avLst/>
           </a:prstGeom>
         </p:spPr>
       </p:pic>
-      <p:sp>
-        <p:nvSpPr>
-          <p:cNvPr id="20" name="BlokTextu 19"/>
-          <p:cNvSpPr txBox="1"/>
-          <p:nvPr/>
-        </p:nvSpPr>
-        <p:spPr>
-          <a:xfrm>
-            <a:off x="659643" y="5614790"/>
-            <a:ext cx="928048" cy="369332"/>
-          </a:xfrm>
-          <a:prstGeom prst="rect">
-            <a:avLst/>
-          </a:prstGeom>
-          <a:noFill/>
-        </p:spPr>
-        <p:txBody>
-          <a:bodyPr wrap="square" rtlCol="0">
-            <a:spAutoFit/>
-          </a:bodyPr>
-          <a:lstStyle/>
-          <a:p>
-            <a:r>
-              <a:rPr lang="sk-SK" b="1" dirty="0">
-                <a:solidFill>
-                  <a:srgbClr val="FF0000"/>
-                </a:solidFill>
-              </a:rPr>
-              <a:t>4</a:t>
-            </a:r>
-          </a:p>
-        </p:txBody>
-      </p:sp>
       <p:pic>
         <p:nvPicPr>
-          <p:cNvPr id="21" name="Obrázok 20"/>
+          <p:cNvPr id="11" name="Obrázok 10"/>
           <p:cNvPicPr>
             <a:picLocks noChangeAspect="1"/>
           </p:cNvPicPr>
@@ -10018,88 +9545,17 @@
         </p:blipFill>
         <p:spPr>
           <a:xfrm>
-            <a:off x="6560024" y="2506130"/>
-            <a:ext cx="2305050" cy="352425"/>
+            <a:off x="1186997" y="5143473"/>
+            <a:ext cx="1733550" cy="400050"/>
           </a:xfrm>
           <a:prstGeom prst="rect">
             <a:avLst/>
           </a:prstGeom>
         </p:spPr>
       </p:pic>
-      <p:sp>
-        <p:nvSpPr>
-          <p:cNvPr id="22" name="BlokTextu 21"/>
-          <p:cNvSpPr txBox="1"/>
-          <p:nvPr/>
-        </p:nvSpPr>
-        <p:spPr>
-          <a:xfrm>
-            <a:off x="6096000" y="2489223"/>
-            <a:ext cx="928048" cy="369332"/>
-          </a:xfrm>
-          <a:prstGeom prst="rect">
-            <a:avLst/>
-          </a:prstGeom>
-          <a:noFill/>
-        </p:spPr>
-        <p:txBody>
-          <a:bodyPr wrap="square" rtlCol="0">
-            <a:spAutoFit/>
-          </a:bodyPr>
-          <a:lstStyle/>
-          <a:p>
-            <a:r>
-              <a:rPr lang="sk-SK" b="1" dirty="0" smtClean="0">
-                <a:solidFill>
-                  <a:srgbClr val="FF0000"/>
-                </a:solidFill>
-              </a:rPr>
-              <a:t>5</a:t>
-            </a:r>
-            <a:endParaRPr lang="sk-SK" b="1" dirty="0">
-              <a:solidFill>
-                <a:srgbClr val="FF0000"/>
-              </a:solidFill>
-            </a:endParaRPr>
-          </a:p>
-        </p:txBody>
-      </p:sp>
-      <p:sp>
-        <p:nvSpPr>
-          <p:cNvPr id="24" name="BlokTextu 23"/>
-          <p:cNvSpPr txBox="1"/>
-          <p:nvPr/>
-        </p:nvSpPr>
-        <p:spPr>
-          <a:xfrm>
-            <a:off x="6096000" y="2999989"/>
-            <a:ext cx="928048" cy="369332"/>
-          </a:xfrm>
-          <a:prstGeom prst="rect">
-            <a:avLst/>
-          </a:prstGeom>
-          <a:noFill/>
-        </p:spPr>
-        <p:txBody>
-          <a:bodyPr wrap="square" rtlCol="0">
-            <a:spAutoFit/>
-          </a:bodyPr>
-          <a:lstStyle/>
-          <a:p>
-            <a:r>
-              <a:rPr lang="sk-SK" b="1" dirty="0">
-                <a:solidFill>
-                  <a:srgbClr val="FF0000"/>
-                </a:solidFill>
-              </a:rPr>
-              <a:t>6</a:t>
-            </a:r>
-          </a:p>
-        </p:txBody>
-      </p:sp>
       <p:pic>
         <p:nvPicPr>
-          <p:cNvPr id="25" name="Obrázok 24"/>
+          <p:cNvPr id="12" name="Obrázok 11"/>
           <p:cNvPicPr>
             <a:picLocks noChangeAspect="1"/>
           </p:cNvPicPr>
@@ -10113,8 +9569,8 @@
         </p:blipFill>
         <p:spPr>
           <a:xfrm>
-            <a:off x="6585257" y="3465274"/>
-            <a:ext cx="2733675" cy="657225"/>
+            <a:off x="2210579" y="5416104"/>
+            <a:ext cx="2409825" cy="710497"/>
           </a:xfrm>
           <a:prstGeom prst="rect">
             <a:avLst/>
@@ -10123,13 +9579,13 @@
       </p:pic>
       <p:sp>
         <p:nvSpPr>
-          <p:cNvPr id="26" name="BlokTextu 25"/>
+          <p:cNvPr id="13" name="BlokTextu 12"/>
           <p:cNvSpPr txBox="1"/>
           <p:nvPr/>
         </p:nvSpPr>
         <p:spPr>
           <a:xfrm>
-            <a:off x="6096000" y="3609220"/>
+            <a:off x="5329165" y="3493503"/>
             <a:ext cx="928048" cy="369332"/>
           </a:xfrm>
           <a:prstGeom prst="rect">
@@ -10149,14 +9605,14 @@
                   <a:srgbClr val="FF0000"/>
                 </a:solidFill>
               </a:rPr>
-              <a:t>7</a:t>
+              <a:t>2</a:t>
             </a:r>
           </a:p>
         </p:txBody>
       </p:sp>
       <p:pic>
         <p:nvPicPr>
-          <p:cNvPr id="27" name="Obrázok 26"/>
+          <p:cNvPr id="15" name="Obrázok 14"/>
           <p:cNvPicPr>
             <a:picLocks noChangeAspect="1"/>
           </p:cNvPicPr>
@@ -10170,8 +9626,8 @@
         </p:blipFill>
         <p:spPr>
           <a:xfrm>
-            <a:off x="6560024" y="2999989"/>
-            <a:ext cx="4200525" cy="323850"/>
+            <a:off x="5643986" y="3580602"/>
+            <a:ext cx="5710951" cy="2190750"/>
           </a:xfrm>
           <a:prstGeom prst="rect">
             <a:avLst/>
@@ -10181,13 +9637,21 @@
     </p:spTree>
     <p:extLst>
       <p:ext uri="{BB962C8B-B14F-4D97-AF65-F5344CB8AC3E}">
-        <p14:creationId xmlns:p14="http://schemas.microsoft.com/office/powerpoint/2010/main" val="3531833650"/>
+        <p14:creationId xmlns:p14="http://schemas.microsoft.com/office/powerpoint/2010/main" val="1691866668"/>
       </p:ext>
     </p:extLst>
   </p:cSld>
   <p:clrMapOvr>
     <a:masterClrMapping/>
   </p:clrMapOvr>
+  <mc:AlternateContent xmlns:mc="http://schemas.openxmlformats.org/markup-compatibility/2006" xmlns:p14="http://schemas.microsoft.com/office/powerpoint/2010/main">
+    <mc:Choice Requires="p14">
+      <p:transition p14:dur="0"/>
+    </mc:Choice>
+    <mc:Fallback xmlns="">
+      <p:transition/>
+    </mc:Fallback>
+  </mc:AlternateContent>
   <p:timing>
     <p:tnLst>
       <p:par>

</xml_diff>

<commit_message>
Pridaný  HTML súbor na projekt v Pythone,  úprava popisu v prezentácii
</commit_message>
<xml_diff>
--- a/Kysucky_prezentacia.pptx
+++ b/Kysucky_prezentacia.pptx
@@ -210,7 +210,7 @@
           <a:p>
             <a:fld id="{46A8F120-1D0A-4458-9AE0-951F6CA5DC5F}" type="datetimeFigureOut">
               <a:rPr lang="sk-SK" smtClean="0"/>
-              <a:t>10. 5. 2019</a:t>
+              <a:t>11. 5. 2019</a:t>
             </a:fld>
             <a:endParaRPr lang="sk-SK"/>
           </a:p>
@@ -977,7 +977,7 @@
           <a:p>
             <a:fld id="{8D947004-56A1-4DA2-BCFE-7FFBE302870C}" type="datetimeFigureOut">
               <a:rPr lang="sk-SK" smtClean="0"/>
-              <a:t>10. 5. 2019</a:t>
+              <a:t>11. 5. 2019</a:t>
             </a:fld>
             <a:endParaRPr lang="sk-SK" dirty="0"/>
           </a:p>
@@ -1309,7 +1309,7 @@
           <a:p>
             <a:fld id="{8D947004-56A1-4DA2-BCFE-7FFBE302870C}" type="datetimeFigureOut">
               <a:rPr lang="sk-SK" smtClean="0"/>
-              <a:t>10. 5. 2019</a:t>
+              <a:t>11. 5. 2019</a:t>
             </a:fld>
             <a:endParaRPr lang="sk-SK" dirty="0"/>
           </a:p>
@@ -1565,7 +1565,7 @@
           <a:p>
             <a:fld id="{8D947004-56A1-4DA2-BCFE-7FFBE302870C}" type="datetimeFigureOut">
               <a:rPr lang="sk-SK" smtClean="0"/>
-              <a:t>10. 5. 2019</a:t>
+              <a:t>11. 5. 2019</a:t>
             </a:fld>
             <a:endParaRPr lang="sk-SK" dirty="0"/>
           </a:p>
@@ -1912,7 +1912,7 @@
           <a:p>
             <a:fld id="{8D947004-56A1-4DA2-BCFE-7FFBE302870C}" type="datetimeFigureOut">
               <a:rPr lang="sk-SK" smtClean="0"/>
-              <a:t>10. 5. 2019</a:t>
+              <a:t>11. 5. 2019</a:t>
             </a:fld>
             <a:endParaRPr lang="sk-SK" dirty="0"/>
           </a:p>
@@ -2267,7 +2267,7 @@
           <a:p>
             <a:fld id="{8D947004-56A1-4DA2-BCFE-7FFBE302870C}" type="datetimeFigureOut">
               <a:rPr lang="sk-SK" smtClean="0"/>
-              <a:t>10. 5. 2019</a:t>
+              <a:t>11. 5. 2019</a:t>
             </a:fld>
             <a:endParaRPr lang="sk-SK" dirty="0"/>
           </a:p>
@@ -2649,7 +2649,7 @@
           <a:p>
             <a:fld id="{8D947004-56A1-4DA2-BCFE-7FFBE302870C}" type="datetimeFigureOut">
               <a:rPr lang="sk-SK" smtClean="0"/>
-              <a:t>10. 5. 2019</a:t>
+              <a:t>11. 5. 2019</a:t>
             </a:fld>
             <a:endParaRPr lang="sk-SK" dirty="0"/>
           </a:p>
@@ -3127,7 +3127,7 @@
           <a:p>
             <a:fld id="{8D947004-56A1-4DA2-BCFE-7FFBE302870C}" type="datetimeFigureOut">
               <a:rPr lang="sk-SK" smtClean="0"/>
-              <a:t>10. 5. 2019</a:t>
+              <a:t>11. 5. 2019</a:t>
             </a:fld>
             <a:endParaRPr lang="sk-SK" dirty="0"/>
           </a:p>
@@ -3340,7 +3340,7 @@
           <a:p>
             <a:fld id="{8D947004-56A1-4DA2-BCFE-7FFBE302870C}" type="datetimeFigureOut">
               <a:rPr lang="sk-SK" smtClean="0"/>
-              <a:t>10. 5. 2019</a:t>
+              <a:t>11. 5. 2019</a:t>
             </a:fld>
             <a:endParaRPr lang="sk-SK" dirty="0"/>
           </a:p>
@@ -3559,7 +3559,7 @@
           <a:p>
             <a:fld id="{8D947004-56A1-4DA2-BCFE-7FFBE302870C}" type="datetimeFigureOut">
               <a:rPr lang="sk-SK" smtClean="0"/>
-              <a:t>10. 5. 2019</a:t>
+              <a:t>11. 5. 2019</a:t>
             </a:fld>
             <a:endParaRPr lang="sk-SK" dirty="0"/>
           </a:p>
@@ -3799,7 +3799,7 @@
           <a:p>
             <a:fld id="{8D947004-56A1-4DA2-BCFE-7FFBE302870C}" type="datetimeFigureOut">
               <a:rPr lang="sk-SK" smtClean="0"/>
-              <a:t>10. 5. 2019</a:t>
+              <a:t>11. 5. 2019</a:t>
             </a:fld>
             <a:endParaRPr lang="sk-SK" dirty="0"/>
           </a:p>
@@ -4055,7 +4055,7 @@
           <a:p>
             <a:fld id="{8D947004-56A1-4DA2-BCFE-7FFBE302870C}" type="datetimeFigureOut">
               <a:rPr lang="sk-SK" smtClean="0"/>
-              <a:t>10. 5. 2019</a:t>
+              <a:t>11. 5. 2019</a:t>
             </a:fld>
             <a:endParaRPr lang="sk-SK" dirty="0"/>
           </a:p>
@@ -4361,7 +4361,7 @@
           <a:p>
             <a:fld id="{8D947004-56A1-4DA2-BCFE-7FFBE302870C}" type="datetimeFigureOut">
               <a:rPr lang="sk-SK" smtClean="0"/>
-              <a:t>10. 5. 2019</a:t>
+              <a:t>11. 5. 2019</a:t>
             </a:fld>
             <a:endParaRPr lang="sk-SK" dirty="0"/>
           </a:p>
@@ -4763,7 +4763,7 @@
           <a:p>
             <a:fld id="{8D947004-56A1-4DA2-BCFE-7FFBE302870C}" type="datetimeFigureOut">
               <a:rPr lang="sk-SK" smtClean="0"/>
-              <a:t>10. 5. 2019</a:t>
+              <a:t>11. 5. 2019</a:t>
             </a:fld>
             <a:endParaRPr lang="sk-SK" dirty="0"/>
           </a:p>
@@ -4920,7 +4920,7 @@
           <a:p>
             <a:fld id="{8D947004-56A1-4DA2-BCFE-7FFBE302870C}" type="datetimeFigureOut">
               <a:rPr lang="sk-SK" smtClean="0"/>
-              <a:t>10. 5. 2019</a:t>
+              <a:t>11. 5. 2019</a:t>
             </a:fld>
             <a:endParaRPr lang="sk-SK" dirty="0"/>
           </a:p>
@@ -5054,7 +5054,7 @@
           <a:p>
             <a:fld id="{8D947004-56A1-4DA2-BCFE-7FFBE302870C}" type="datetimeFigureOut">
               <a:rPr lang="sk-SK" smtClean="0"/>
-              <a:t>10. 5. 2019</a:t>
+              <a:t>11. 5. 2019</a:t>
             </a:fld>
             <a:endParaRPr lang="sk-SK" dirty="0"/>
           </a:p>
@@ -5317,7 +5317,7 @@
           <a:p>
             <a:fld id="{8D947004-56A1-4DA2-BCFE-7FFBE302870C}" type="datetimeFigureOut">
               <a:rPr lang="sk-SK" smtClean="0"/>
-              <a:t>10. 5. 2019</a:t>
+              <a:t>11. 5. 2019</a:t>
             </a:fld>
             <a:endParaRPr lang="sk-SK" dirty="0"/>
           </a:p>
@@ -5640,7 +5640,7 @@
           <a:p>
             <a:fld id="{8D947004-56A1-4DA2-BCFE-7FFBE302870C}" type="datetimeFigureOut">
               <a:rPr lang="sk-SK" smtClean="0"/>
-              <a:t>10. 5. 2019</a:t>
+              <a:t>11. 5. 2019</a:t>
             </a:fld>
             <a:endParaRPr lang="sk-SK" dirty="0"/>
           </a:p>
@@ -5999,7 +5999,7 @@
           <a:p>
             <a:fld id="{8D947004-56A1-4DA2-BCFE-7FFBE302870C}" type="datetimeFigureOut">
               <a:rPr lang="sk-SK" smtClean="0"/>
-              <a:t>10. 5. 2019</a:t>
+              <a:t>11. 5. 2019</a:t>
             </a:fld>
             <a:endParaRPr lang="sk-SK" dirty="0"/>
           </a:p>
@@ -7503,8 +7503,13 @@
             </a:r>
             <a:r>
               <a:rPr lang="sk-SK" dirty="0"/>
-              <a:t>za pozornosť.</a:t>
-            </a:r>
+              <a:t>za </a:t>
+            </a:r>
+            <a:r>
+              <a:rPr lang="sk-SK" dirty="0" smtClean="0"/>
+              <a:t>pozornosť</a:t>
+            </a:r>
+            <a:endParaRPr lang="sk-SK" dirty="0"/>
           </a:p>
         </p:txBody>
       </p:sp>
@@ -7627,15 +7632,39 @@
             </a:r>
             <a:r>
               <a:rPr lang="sk-SK" dirty="0"/>
-              <a:t> zistiť, alebo predpovedať, či nádor nájdený v rakovine prsníka je zhubný </a:t>
-            </a:r>
-            <a:r>
-              <a:rPr lang="en-US" dirty="0"/>
-              <a:t>(M</a:t>
+              <a:t> </a:t>
+            </a:r>
+            <a:r>
+              <a:rPr lang="sk-SK" dirty="0" smtClean="0"/>
+              <a:t>zistiť</a:t>
+            </a:r>
+            <a:r>
+              <a:rPr lang="en-US" smtClean="0"/>
+              <a:t> </a:t>
+            </a:r>
+            <a:r>
+              <a:rPr lang="sk-SK" smtClean="0"/>
+              <a:t>počet </a:t>
+            </a:r>
+            <a:r>
+              <a:rPr lang="sk-SK" dirty="0" smtClean="0"/>
+              <a:t>nálezov</a:t>
+            </a:r>
+            <a:r>
+              <a:rPr lang="sk-SK" dirty="0" smtClean="0"/>
+              <a:t>, </a:t>
+            </a:r>
+            <a:r>
+              <a:rPr lang="sk-SK" dirty="0" smtClean="0"/>
+              <a:t>a určiť či nálezy nájdené </a:t>
+            </a:r>
+            <a:r>
+              <a:rPr lang="sk-SK" dirty="0" smtClean="0"/>
+              <a:t>v rakovine prsníka sú zhubné </a:t>
             </a:r>
             <a:r>
               <a:rPr lang="en-US" dirty="0" smtClean="0"/>
-              <a:t>), </a:t>
+              <a:t>(M), </a:t>
             </a:r>
             <a:r>
               <a:rPr lang="sk-SK" dirty="0"/>
@@ -7646,8 +7675,8 @@
               <a:t> </a:t>
             </a:r>
             <a:r>
-              <a:rPr lang="sk-SK" dirty="0"/>
-              <a:t>nezhubný </a:t>
+              <a:rPr lang="sk-SK" dirty="0" smtClean="0"/>
+              <a:t>nezhubné </a:t>
             </a:r>
             <a:r>
               <a:rPr lang="en-US" dirty="0"/>

</xml_diff>

<commit_message>
Upravená prezentácia, gramatické chyby + bola pridaná ilustračná fotka sieti
</commit_message>
<xml_diff>
--- a/Kysucky_prezentacia.pptx
+++ b/Kysucky_prezentacia.pptx
@@ -563,6 +563,90 @@
 </file>
 
 <file path=ppt/notesSlides/notesSlide2.xml><?xml version="1.0" encoding="utf-8"?>
+<p:notes xmlns:a="http://schemas.openxmlformats.org/drawingml/2006/main" xmlns:r="http://schemas.openxmlformats.org/officeDocument/2006/relationships" xmlns:p="http://schemas.openxmlformats.org/presentationml/2006/main">
+  <p:cSld>
+    <p:spTree>
+      <p:nvGrpSpPr>
+        <p:cNvPr id="1" name=""/>
+        <p:cNvGrpSpPr/>
+        <p:nvPr/>
+      </p:nvGrpSpPr>
+      <p:grpSpPr>
+        <a:xfrm>
+          <a:off x="0" y="0"/>
+          <a:ext cx="0" cy="0"/>
+          <a:chOff x="0" y="0"/>
+          <a:chExt cx="0" cy="0"/>
+        </a:xfrm>
+      </p:grpSpPr>
+      <p:sp>
+        <p:nvSpPr>
+          <p:cNvPr id="2" name="Zástupný symbol obrazu snímky 1"/>
+          <p:cNvSpPr>
+            <a:spLocks noGrp="1" noRot="1" noChangeAspect="1"/>
+          </p:cNvSpPr>
+          <p:nvPr>
+            <p:ph type="sldImg"/>
+          </p:nvPr>
+        </p:nvSpPr>
+        <p:spPr/>
+      </p:sp>
+      <p:sp>
+        <p:nvSpPr>
+          <p:cNvPr id="3" name="Zástupný symbol poznámok 2"/>
+          <p:cNvSpPr>
+            <a:spLocks noGrp="1"/>
+          </p:cNvSpPr>
+          <p:nvPr>
+            <p:ph type="body" idx="1"/>
+          </p:nvPr>
+        </p:nvSpPr>
+        <p:spPr/>
+        <p:txBody>
+          <a:bodyPr/>
+          <a:lstStyle/>
+          <a:p>
+            <a:endParaRPr lang="sk-SK"/>
+          </a:p>
+        </p:txBody>
+      </p:sp>
+      <p:sp>
+        <p:nvSpPr>
+          <p:cNvPr id="4" name="Zástupný symbol čísla snímky 3"/>
+          <p:cNvSpPr>
+            <a:spLocks noGrp="1"/>
+          </p:cNvSpPr>
+          <p:nvPr>
+            <p:ph type="sldNum" sz="quarter" idx="10"/>
+          </p:nvPr>
+        </p:nvSpPr>
+        <p:spPr/>
+        <p:txBody>
+          <a:bodyPr/>
+          <a:lstStyle/>
+          <a:p>
+            <a:fld id="{4FC03B4A-B7B1-49D7-B27D-E3631D99B103}" type="slidenum">
+              <a:rPr lang="sk-SK" smtClean="0"/>
+              <a:t>7</a:t>
+            </a:fld>
+            <a:endParaRPr lang="sk-SK"/>
+          </a:p>
+        </p:txBody>
+      </p:sp>
+    </p:spTree>
+    <p:extLst>
+      <p:ext uri="{BB962C8B-B14F-4D97-AF65-F5344CB8AC3E}">
+        <p14:creationId xmlns:p14="http://schemas.microsoft.com/office/powerpoint/2010/main" val="4080108339"/>
+      </p:ext>
+    </p:extLst>
+  </p:cSld>
+  <p:clrMapOvr>
+    <a:masterClrMapping/>
+  </p:clrMapOvr>
+</p:notes>
+</file>
+
+<file path=ppt/notesSlides/notesSlide3.xml><?xml version="1.0" encoding="utf-8"?>
 <p:notes xmlns:a="http://schemas.openxmlformats.org/drawingml/2006/main" xmlns:r="http://schemas.openxmlformats.org/officeDocument/2006/relationships" xmlns:p="http://schemas.openxmlformats.org/presentationml/2006/main">
   <p:cSld>
     <p:spTree>
@@ -6575,12 +6659,16 @@
               <a:t>Neurónov</a:t>
             </a:r>
             <a:r>
-              <a:rPr lang="en-US" dirty="0" smtClean="0"/>
-              <a:t>e</a:t>
+              <a:rPr lang="sk-SK" dirty="0"/>
+              <a:t>é</a:t>
             </a:r>
             <a:r>
               <a:rPr lang="sk-SK" dirty="0" smtClean="0"/>
-              <a:t> siete</a:t>
+              <a:t> </a:t>
+            </a:r>
+            <a:r>
+              <a:rPr lang="sk-SK" dirty="0" smtClean="0"/>
+              <a:t>siete</a:t>
             </a:r>
             <a:endParaRPr lang="sk-SK" dirty="0"/>
           </a:p>
@@ -7260,6 +7348,13 @@
       <p:transition/>
     </mc:Fallback>
   </mc:AlternateContent>
+  <p:timing>
+    <p:tnLst>
+      <p:par>
+        <p:cTn id="1" dur="indefinite" restart="never" nodeType="tmRoot"/>
+      </p:par>
+    </p:tnLst>
+  </p:timing>
 </p:sld>
 </file>
 
@@ -7648,19 +7743,7 @@
             </a:r>
             <a:r>
               <a:rPr lang="sk-SK" dirty="0" smtClean="0"/>
-              <a:t>nálezov</a:t>
-            </a:r>
-            <a:r>
-              <a:rPr lang="sk-SK" dirty="0" smtClean="0"/>
-              <a:t>, </a:t>
-            </a:r>
-            <a:r>
-              <a:rPr lang="sk-SK" dirty="0" smtClean="0"/>
-              <a:t>a určiť či nálezy nájdené </a:t>
-            </a:r>
-            <a:r>
-              <a:rPr lang="sk-SK" dirty="0" smtClean="0"/>
-              <a:t>v rakovine prsníka sú zhubné </a:t>
+              <a:t>nálezov, a určiť či nálezy nájdené v rakovine prsníka sú zhubné </a:t>
             </a:r>
             <a:r>
               <a:rPr lang="en-US" dirty="0" smtClean="0"/>
@@ -7987,7 +8070,7 @@
           <p:cNvPr id="7" name="Title 1">
             <a:extLst>
               <a:ext uri="{FF2B5EF4-FFF2-40B4-BE49-F238E27FC236}">
-                <a16:creationId xmlns:a16="http://schemas.microsoft.com/office/drawing/2014/main" xmlns="" id="{463A027C-73C1-4981-9828-05E25E0A63F0}"/>
+                <a16:creationId xmlns="" xmlns:a16="http://schemas.microsoft.com/office/drawing/2014/main" id="{463A027C-73C1-4981-9828-05E25E0A63F0}"/>
               </a:ext>
             </a:extLst>
           </p:cNvPr>
@@ -8240,6 +8323,32 @@
           </a:p>
         </p:txBody>
       </p:sp>
+      <p:pic>
+        <p:nvPicPr>
+          <p:cNvPr id="5" name="Zástupný symbol obsahu 3"/>
+          <p:cNvPicPr>
+            <a:picLocks noGrp="1" noChangeAspect="1"/>
+          </p:cNvPicPr>
+          <p:nvPr>
+            <p:ph idx="1"/>
+          </p:nvPr>
+        </p:nvPicPr>
+        <p:blipFill>
+          <a:blip r:embed="rId2"/>
+          <a:stretch>
+            <a:fillRect/>
+          </a:stretch>
+        </p:blipFill>
+        <p:spPr>
+          <a:xfrm>
+            <a:off x="6185794" y="3446248"/>
+            <a:ext cx="4479705" cy="2326755"/>
+          </a:xfrm>
+          <a:prstGeom prst="rect">
+            <a:avLst/>
+          </a:prstGeom>
+        </p:spPr>
+      </p:pic>
     </p:spTree>
     <p:extLst>
       <p:ext uri="{BB962C8B-B14F-4D97-AF65-F5344CB8AC3E}">
@@ -8791,7 +8900,7 @@
           <p:nvPr/>
         </p:nvPicPr>
         <p:blipFill>
-          <a:blip r:embed="rId2"/>
+          <a:blip r:embed="rId3"/>
           <a:stretch>
             <a:fillRect/>
           </a:stretch>
@@ -8815,7 +8924,7 @@
           <p:nvPr/>
         </p:nvPicPr>
         <p:blipFill>
-          <a:blip r:embed="rId3"/>
+          <a:blip r:embed="rId4"/>
           <a:stretch>
             <a:fillRect/>
           </a:stretch>

</xml_diff>